<commit_message>
updates to SSD slides and course agenda page
</commit_message>
<xml_diff>
--- a/slides/cds431_week1_2.pptx
+++ b/slides/cds431_week1_2.pptx
@@ -5,7 +5,7 @@
     <p:sldMasterId id="2147483648" r:id="rId1"/>
   </p:sldMasterIdLst>
   <p:notesMasterIdLst>
-    <p:notesMasterId r:id="rId18"/>
+    <p:notesMasterId r:id="rId22"/>
   </p:notesMasterIdLst>
   <p:sldIdLst>
     <p:sldId id="280" r:id="rId2"/>
@@ -24,6 +24,10 @@
     <p:sldId id="501" r:id="rId15"/>
     <p:sldId id="504" r:id="rId16"/>
     <p:sldId id="508" r:id="rId17"/>
+    <p:sldId id="291" r:id="rId18"/>
+    <p:sldId id="284" r:id="rId19"/>
+    <p:sldId id="295" r:id="rId20"/>
+    <p:sldId id="307" r:id="rId21"/>
   </p:sldIdLst>
   <p:sldSz cx="12192000" cy="6858000"/>
   <p:notesSz cx="6858000" cy="9144000"/>
@@ -1695,6 +1699,753 @@
 </file>
 
 <file path=ppt/diagrams/colors3.xml><?xml version="1.0" encoding="utf-8"?>
+<dgm:colorsDef xmlns:dgm="http://schemas.openxmlformats.org/drawingml/2006/diagram" xmlns:a="http://schemas.openxmlformats.org/drawingml/2006/main" uniqueId="urn:microsoft.com/office/officeart/2005/8/colors/accent1_2">
+  <dgm:title val=""/>
+  <dgm:desc val=""/>
+  <dgm:catLst>
+    <dgm:cat type="accent1" pri="11200"/>
+  </dgm:catLst>
+  <dgm:styleLbl name="node0">
+    <dgm:fillClrLst meth="repeat">
+      <a:schemeClr val="accent1"/>
+    </dgm:fillClrLst>
+    <dgm:linClrLst meth="repeat">
+      <a:schemeClr val="lt1"/>
+    </dgm:linClrLst>
+    <dgm:effectClrLst/>
+    <dgm:txLinClrLst/>
+    <dgm:txFillClrLst/>
+    <dgm:txEffectClrLst/>
+  </dgm:styleLbl>
+  <dgm:styleLbl name="alignNode1">
+    <dgm:fillClrLst meth="repeat">
+      <a:schemeClr val="accent1"/>
+    </dgm:fillClrLst>
+    <dgm:linClrLst meth="repeat">
+      <a:schemeClr val="accent1"/>
+    </dgm:linClrLst>
+    <dgm:effectClrLst/>
+    <dgm:txLinClrLst/>
+    <dgm:txFillClrLst/>
+    <dgm:txEffectClrLst/>
+  </dgm:styleLbl>
+  <dgm:styleLbl name="node1">
+    <dgm:fillClrLst meth="repeat">
+      <a:schemeClr val="accent1"/>
+    </dgm:fillClrLst>
+    <dgm:linClrLst meth="repeat">
+      <a:schemeClr val="lt1"/>
+    </dgm:linClrLst>
+    <dgm:effectClrLst/>
+    <dgm:txLinClrLst/>
+    <dgm:txFillClrLst/>
+    <dgm:txEffectClrLst/>
+  </dgm:styleLbl>
+  <dgm:styleLbl name="lnNode1">
+    <dgm:fillClrLst meth="repeat">
+      <a:schemeClr val="accent1"/>
+    </dgm:fillClrLst>
+    <dgm:linClrLst meth="repeat">
+      <a:schemeClr val="lt1"/>
+    </dgm:linClrLst>
+    <dgm:effectClrLst/>
+    <dgm:txLinClrLst/>
+    <dgm:txFillClrLst/>
+    <dgm:txEffectClrLst/>
+  </dgm:styleLbl>
+  <dgm:styleLbl name="vennNode1">
+    <dgm:fillClrLst meth="repeat">
+      <a:schemeClr val="accent1">
+        <a:alpha val="50000"/>
+      </a:schemeClr>
+    </dgm:fillClrLst>
+    <dgm:linClrLst meth="repeat">
+      <a:schemeClr val="lt1"/>
+    </dgm:linClrLst>
+    <dgm:effectClrLst/>
+    <dgm:txLinClrLst/>
+    <dgm:txFillClrLst/>
+    <dgm:txEffectClrLst/>
+  </dgm:styleLbl>
+  <dgm:styleLbl name="node2">
+    <dgm:fillClrLst meth="repeat">
+      <a:schemeClr val="accent1"/>
+    </dgm:fillClrLst>
+    <dgm:linClrLst meth="repeat">
+      <a:schemeClr val="lt1"/>
+    </dgm:linClrLst>
+    <dgm:effectClrLst/>
+    <dgm:txLinClrLst/>
+    <dgm:txFillClrLst/>
+    <dgm:txEffectClrLst/>
+  </dgm:styleLbl>
+  <dgm:styleLbl name="node3">
+    <dgm:fillClrLst meth="repeat">
+      <a:schemeClr val="accent1"/>
+    </dgm:fillClrLst>
+    <dgm:linClrLst meth="repeat">
+      <a:schemeClr val="lt1"/>
+    </dgm:linClrLst>
+    <dgm:effectClrLst/>
+    <dgm:txLinClrLst/>
+    <dgm:txFillClrLst/>
+    <dgm:txEffectClrLst/>
+  </dgm:styleLbl>
+  <dgm:styleLbl name="node4">
+    <dgm:fillClrLst meth="repeat">
+      <a:schemeClr val="accent1"/>
+    </dgm:fillClrLst>
+    <dgm:linClrLst meth="repeat">
+      <a:schemeClr val="lt1"/>
+    </dgm:linClrLst>
+    <dgm:effectClrLst/>
+    <dgm:txLinClrLst/>
+    <dgm:txFillClrLst/>
+    <dgm:txEffectClrLst/>
+  </dgm:styleLbl>
+  <dgm:styleLbl name="fgImgPlace1">
+    <dgm:fillClrLst meth="repeat">
+      <a:schemeClr val="accent1">
+        <a:tint val="50000"/>
+      </a:schemeClr>
+    </dgm:fillClrLst>
+    <dgm:linClrLst meth="repeat">
+      <a:schemeClr val="lt1"/>
+    </dgm:linClrLst>
+    <dgm:effectClrLst/>
+    <dgm:txLinClrLst/>
+    <dgm:txFillClrLst meth="repeat">
+      <a:schemeClr val="lt1"/>
+    </dgm:txFillClrLst>
+    <dgm:txEffectClrLst/>
+  </dgm:styleLbl>
+  <dgm:styleLbl name="alignImgPlace1">
+    <dgm:fillClrLst meth="repeat">
+      <a:schemeClr val="accent1">
+        <a:tint val="50000"/>
+      </a:schemeClr>
+    </dgm:fillClrLst>
+    <dgm:linClrLst meth="repeat">
+      <a:schemeClr val="lt1"/>
+    </dgm:linClrLst>
+    <dgm:effectClrLst/>
+    <dgm:txLinClrLst/>
+    <dgm:txFillClrLst meth="repeat">
+      <a:schemeClr val="lt1"/>
+    </dgm:txFillClrLst>
+    <dgm:txEffectClrLst/>
+  </dgm:styleLbl>
+  <dgm:styleLbl name="bgImgPlace1">
+    <dgm:fillClrLst meth="repeat">
+      <a:schemeClr val="accent1">
+        <a:tint val="50000"/>
+      </a:schemeClr>
+    </dgm:fillClrLst>
+    <dgm:linClrLst meth="repeat">
+      <a:schemeClr val="lt1"/>
+    </dgm:linClrLst>
+    <dgm:effectClrLst/>
+    <dgm:txLinClrLst/>
+    <dgm:txFillClrLst meth="repeat">
+      <a:schemeClr val="lt1"/>
+    </dgm:txFillClrLst>
+    <dgm:txEffectClrLst/>
+  </dgm:styleLbl>
+  <dgm:styleLbl name="sibTrans2D1">
+    <dgm:fillClrLst meth="repeat">
+      <a:schemeClr val="accent1">
+        <a:tint val="60000"/>
+      </a:schemeClr>
+    </dgm:fillClrLst>
+    <dgm:linClrLst meth="repeat">
+      <a:schemeClr val="accent1">
+        <a:tint val="60000"/>
+      </a:schemeClr>
+    </dgm:linClrLst>
+    <dgm:effectClrLst/>
+    <dgm:txLinClrLst/>
+    <dgm:txFillClrLst/>
+    <dgm:txEffectClrLst/>
+  </dgm:styleLbl>
+  <dgm:styleLbl name="fgSibTrans2D1">
+    <dgm:fillClrLst meth="repeat">
+      <a:schemeClr val="accent1">
+        <a:tint val="60000"/>
+      </a:schemeClr>
+    </dgm:fillClrLst>
+    <dgm:linClrLst meth="repeat">
+      <a:schemeClr val="accent1">
+        <a:tint val="60000"/>
+      </a:schemeClr>
+    </dgm:linClrLst>
+    <dgm:effectClrLst/>
+    <dgm:txLinClrLst/>
+    <dgm:txFillClrLst/>
+    <dgm:txEffectClrLst/>
+  </dgm:styleLbl>
+  <dgm:styleLbl name="bgSibTrans2D1">
+    <dgm:fillClrLst meth="repeat">
+      <a:schemeClr val="accent1">
+        <a:tint val="60000"/>
+      </a:schemeClr>
+    </dgm:fillClrLst>
+    <dgm:linClrLst meth="repeat">
+      <a:schemeClr val="accent1">
+        <a:tint val="60000"/>
+      </a:schemeClr>
+    </dgm:linClrLst>
+    <dgm:effectClrLst/>
+    <dgm:txLinClrLst/>
+    <dgm:txFillClrLst/>
+    <dgm:txEffectClrLst/>
+  </dgm:styleLbl>
+  <dgm:styleLbl name="sibTrans1D1">
+    <dgm:fillClrLst meth="repeat">
+      <a:schemeClr val="accent1"/>
+    </dgm:fillClrLst>
+    <dgm:linClrLst meth="repeat">
+      <a:schemeClr val="accent1"/>
+    </dgm:linClrLst>
+    <dgm:effectClrLst/>
+    <dgm:txLinClrLst/>
+    <dgm:txFillClrLst meth="repeat">
+      <a:schemeClr val="tx1"/>
+    </dgm:txFillClrLst>
+    <dgm:txEffectClrLst/>
+  </dgm:styleLbl>
+  <dgm:styleLbl name="callout">
+    <dgm:fillClrLst meth="repeat">
+      <a:schemeClr val="accent1"/>
+    </dgm:fillClrLst>
+    <dgm:linClrLst meth="repeat">
+      <a:schemeClr val="accent1">
+        <a:tint val="50000"/>
+      </a:schemeClr>
+    </dgm:linClrLst>
+    <dgm:effectClrLst/>
+    <dgm:txLinClrLst/>
+    <dgm:txFillClrLst meth="repeat">
+      <a:schemeClr val="tx1"/>
+    </dgm:txFillClrLst>
+    <dgm:txEffectClrLst/>
+  </dgm:styleLbl>
+  <dgm:styleLbl name="asst0">
+    <dgm:fillClrLst meth="repeat">
+      <a:schemeClr val="accent1"/>
+    </dgm:fillClrLst>
+    <dgm:linClrLst meth="repeat">
+      <a:schemeClr val="lt1"/>
+    </dgm:linClrLst>
+    <dgm:effectClrLst/>
+    <dgm:txLinClrLst/>
+    <dgm:txFillClrLst/>
+    <dgm:txEffectClrLst/>
+  </dgm:styleLbl>
+  <dgm:styleLbl name="asst1">
+    <dgm:fillClrLst meth="repeat">
+      <a:schemeClr val="accent1"/>
+    </dgm:fillClrLst>
+    <dgm:linClrLst meth="repeat">
+      <a:schemeClr val="lt1"/>
+    </dgm:linClrLst>
+    <dgm:effectClrLst/>
+    <dgm:txLinClrLst/>
+    <dgm:txFillClrLst/>
+    <dgm:txEffectClrLst/>
+  </dgm:styleLbl>
+  <dgm:styleLbl name="asst2">
+    <dgm:fillClrLst meth="repeat">
+      <a:schemeClr val="accent1"/>
+    </dgm:fillClrLst>
+    <dgm:linClrLst meth="repeat">
+      <a:schemeClr val="lt1"/>
+    </dgm:linClrLst>
+    <dgm:effectClrLst/>
+    <dgm:txLinClrLst/>
+    <dgm:txFillClrLst/>
+    <dgm:txEffectClrLst/>
+  </dgm:styleLbl>
+  <dgm:styleLbl name="asst3">
+    <dgm:fillClrLst meth="repeat">
+      <a:schemeClr val="accent1"/>
+    </dgm:fillClrLst>
+    <dgm:linClrLst meth="repeat">
+      <a:schemeClr val="lt1"/>
+    </dgm:linClrLst>
+    <dgm:effectClrLst/>
+    <dgm:txLinClrLst/>
+    <dgm:txFillClrLst/>
+    <dgm:txEffectClrLst/>
+  </dgm:styleLbl>
+  <dgm:styleLbl name="asst4">
+    <dgm:fillClrLst meth="repeat">
+      <a:schemeClr val="accent1"/>
+    </dgm:fillClrLst>
+    <dgm:linClrLst meth="repeat">
+      <a:schemeClr val="lt1"/>
+    </dgm:linClrLst>
+    <dgm:effectClrLst/>
+    <dgm:txLinClrLst/>
+    <dgm:txFillClrLst/>
+    <dgm:txEffectClrLst/>
+  </dgm:styleLbl>
+  <dgm:styleLbl name="parChTrans2D1">
+    <dgm:fillClrLst meth="repeat">
+      <a:schemeClr val="accent1">
+        <a:tint val="60000"/>
+      </a:schemeClr>
+    </dgm:fillClrLst>
+    <dgm:linClrLst meth="repeat">
+      <a:schemeClr val="accent1">
+        <a:tint val="60000"/>
+      </a:schemeClr>
+    </dgm:linClrLst>
+    <dgm:effectClrLst/>
+    <dgm:txLinClrLst/>
+    <dgm:txFillClrLst meth="repeat">
+      <a:schemeClr val="lt1"/>
+    </dgm:txFillClrLst>
+    <dgm:txEffectClrLst/>
+  </dgm:styleLbl>
+  <dgm:styleLbl name="parChTrans2D2">
+    <dgm:fillClrLst meth="repeat">
+      <a:schemeClr val="accent1"/>
+    </dgm:fillClrLst>
+    <dgm:linClrLst meth="repeat">
+      <a:schemeClr val="accent1"/>
+    </dgm:linClrLst>
+    <dgm:effectClrLst/>
+    <dgm:txLinClrLst/>
+    <dgm:txFillClrLst meth="repeat">
+      <a:schemeClr val="lt1"/>
+    </dgm:txFillClrLst>
+    <dgm:txEffectClrLst/>
+  </dgm:styleLbl>
+  <dgm:styleLbl name="parChTrans2D3">
+    <dgm:fillClrLst meth="repeat">
+      <a:schemeClr val="accent1"/>
+    </dgm:fillClrLst>
+    <dgm:linClrLst meth="repeat">
+      <a:schemeClr val="accent1"/>
+    </dgm:linClrLst>
+    <dgm:effectClrLst/>
+    <dgm:txLinClrLst/>
+    <dgm:txFillClrLst meth="repeat">
+      <a:schemeClr val="lt1"/>
+    </dgm:txFillClrLst>
+    <dgm:txEffectClrLst/>
+  </dgm:styleLbl>
+  <dgm:styleLbl name="parChTrans2D4">
+    <dgm:fillClrLst meth="repeat">
+      <a:schemeClr val="accent1"/>
+    </dgm:fillClrLst>
+    <dgm:linClrLst meth="repeat">
+      <a:schemeClr val="accent1"/>
+    </dgm:linClrLst>
+    <dgm:effectClrLst/>
+    <dgm:txLinClrLst/>
+    <dgm:txFillClrLst meth="repeat">
+      <a:schemeClr val="lt1"/>
+    </dgm:txFillClrLst>
+    <dgm:txEffectClrLst/>
+  </dgm:styleLbl>
+  <dgm:styleLbl name="parChTrans1D1">
+    <dgm:fillClrLst meth="repeat">
+      <a:schemeClr val="accent1"/>
+    </dgm:fillClrLst>
+    <dgm:linClrLst meth="repeat">
+      <a:schemeClr val="accent1">
+        <a:shade val="60000"/>
+      </a:schemeClr>
+    </dgm:linClrLst>
+    <dgm:effectClrLst/>
+    <dgm:txLinClrLst/>
+    <dgm:txFillClrLst meth="repeat">
+      <a:schemeClr val="tx1"/>
+    </dgm:txFillClrLst>
+    <dgm:txEffectClrLst/>
+  </dgm:styleLbl>
+  <dgm:styleLbl name="parChTrans1D2">
+    <dgm:fillClrLst meth="repeat">
+      <a:schemeClr val="accent1"/>
+    </dgm:fillClrLst>
+    <dgm:linClrLst meth="repeat">
+      <a:schemeClr val="accent1">
+        <a:shade val="60000"/>
+      </a:schemeClr>
+    </dgm:linClrLst>
+    <dgm:effectClrLst/>
+    <dgm:txLinClrLst/>
+    <dgm:txFillClrLst meth="repeat">
+      <a:schemeClr val="tx1"/>
+    </dgm:txFillClrLst>
+    <dgm:txEffectClrLst/>
+  </dgm:styleLbl>
+  <dgm:styleLbl name="parChTrans1D3">
+    <dgm:fillClrLst meth="repeat">
+      <a:schemeClr val="accent1"/>
+    </dgm:fillClrLst>
+    <dgm:linClrLst meth="repeat">
+      <a:schemeClr val="accent1">
+        <a:shade val="80000"/>
+      </a:schemeClr>
+    </dgm:linClrLst>
+    <dgm:effectClrLst/>
+    <dgm:txLinClrLst/>
+    <dgm:txFillClrLst meth="repeat">
+      <a:schemeClr val="tx1"/>
+    </dgm:txFillClrLst>
+    <dgm:txEffectClrLst/>
+  </dgm:styleLbl>
+  <dgm:styleLbl name="parChTrans1D4">
+    <dgm:fillClrLst meth="repeat">
+      <a:schemeClr val="accent1"/>
+    </dgm:fillClrLst>
+    <dgm:linClrLst meth="repeat">
+      <a:schemeClr val="accent1">
+        <a:shade val="80000"/>
+      </a:schemeClr>
+    </dgm:linClrLst>
+    <dgm:effectClrLst/>
+    <dgm:txLinClrLst/>
+    <dgm:txFillClrLst meth="repeat">
+      <a:schemeClr val="tx1"/>
+    </dgm:txFillClrLst>
+    <dgm:txEffectClrLst/>
+  </dgm:styleLbl>
+  <dgm:styleLbl name="fgAcc1">
+    <dgm:fillClrLst meth="repeat">
+      <a:schemeClr val="lt1">
+        <a:alpha val="90000"/>
+      </a:schemeClr>
+    </dgm:fillClrLst>
+    <dgm:linClrLst meth="repeat">
+      <a:schemeClr val="accent1"/>
+    </dgm:linClrLst>
+    <dgm:effectClrLst/>
+    <dgm:txLinClrLst/>
+    <dgm:txFillClrLst meth="repeat">
+      <a:schemeClr val="dk1"/>
+    </dgm:txFillClrLst>
+    <dgm:txEffectClrLst/>
+  </dgm:styleLbl>
+  <dgm:styleLbl name="conFgAcc1">
+    <dgm:fillClrLst meth="repeat">
+      <a:schemeClr val="lt1">
+        <a:alpha val="90000"/>
+      </a:schemeClr>
+    </dgm:fillClrLst>
+    <dgm:linClrLst meth="repeat">
+      <a:schemeClr val="accent1"/>
+    </dgm:linClrLst>
+    <dgm:effectClrLst/>
+    <dgm:txLinClrLst/>
+    <dgm:txFillClrLst meth="repeat">
+      <a:schemeClr val="dk1"/>
+    </dgm:txFillClrLst>
+    <dgm:txEffectClrLst/>
+  </dgm:styleLbl>
+  <dgm:styleLbl name="alignAcc1">
+    <dgm:fillClrLst meth="repeat">
+      <a:schemeClr val="lt1">
+        <a:alpha val="90000"/>
+      </a:schemeClr>
+    </dgm:fillClrLst>
+    <dgm:linClrLst meth="repeat">
+      <a:schemeClr val="accent1"/>
+    </dgm:linClrLst>
+    <dgm:effectClrLst/>
+    <dgm:txLinClrLst/>
+    <dgm:txFillClrLst meth="repeat">
+      <a:schemeClr val="dk1"/>
+    </dgm:txFillClrLst>
+    <dgm:txEffectClrLst/>
+  </dgm:styleLbl>
+  <dgm:styleLbl name="trAlignAcc1">
+    <dgm:fillClrLst meth="repeat">
+      <a:schemeClr val="lt1">
+        <a:alpha val="40000"/>
+      </a:schemeClr>
+    </dgm:fillClrLst>
+    <dgm:linClrLst meth="repeat">
+      <a:schemeClr val="accent1"/>
+    </dgm:linClrLst>
+    <dgm:effectClrLst/>
+    <dgm:txLinClrLst/>
+    <dgm:txFillClrLst meth="repeat">
+      <a:schemeClr val="dk1"/>
+    </dgm:txFillClrLst>
+    <dgm:txEffectClrLst/>
+  </dgm:styleLbl>
+  <dgm:styleLbl name="bgAcc1">
+    <dgm:fillClrLst meth="repeat">
+      <a:schemeClr val="lt1">
+        <a:alpha val="90000"/>
+      </a:schemeClr>
+    </dgm:fillClrLst>
+    <dgm:linClrLst meth="repeat">
+      <a:schemeClr val="accent1"/>
+    </dgm:linClrLst>
+    <dgm:effectClrLst/>
+    <dgm:txLinClrLst/>
+    <dgm:txFillClrLst meth="repeat">
+      <a:schemeClr val="dk1"/>
+    </dgm:txFillClrLst>
+    <dgm:txEffectClrLst/>
+  </dgm:styleLbl>
+  <dgm:styleLbl name="solidFgAcc1">
+    <dgm:fillClrLst meth="repeat">
+      <a:schemeClr val="lt1"/>
+    </dgm:fillClrLst>
+    <dgm:linClrLst meth="repeat">
+      <a:schemeClr val="accent1"/>
+    </dgm:linClrLst>
+    <dgm:effectClrLst/>
+    <dgm:txLinClrLst/>
+    <dgm:txFillClrLst meth="repeat">
+      <a:schemeClr val="dk1"/>
+    </dgm:txFillClrLst>
+    <dgm:txEffectClrLst/>
+  </dgm:styleLbl>
+  <dgm:styleLbl name="solidAlignAcc1">
+    <dgm:fillClrLst meth="repeat">
+      <a:schemeClr val="lt1"/>
+    </dgm:fillClrLst>
+    <dgm:linClrLst meth="repeat">
+      <a:schemeClr val="accent1"/>
+    </dgm:linClrLst>
+    <dgm:effectClrLst/>
+    <dgm:txLinClrLst/>
+    <dgm:txFillClrLst meth="repeat">
+      <a:schemeClr val="dk1"/>
+    </dgm:txFillClrLst>
+    <dgm:txEffectClrLst/>
+  </dgm:styleLbl>
+  <dgm:styleLbl name="solidBgAcc1">
+    <dgm:fillClrLst meth="repeat">
+      <a:schemeClr val="lt1"/>
+    </dgm:fillClrLst>
+    <dgm:linClrLst meth="repeat">
+      <a:schemeClr val="accent1"/>
+    </dgm:linClrLst>
+    <dgm:effectClrLst/>
+    <dgm:txLinClrLst/>
+    <dgm:txFillClrLst meth="repeat">
+      <a:schemeClr val="dk1"/>
+    </dgm:txFillClrLst>
+    <dgm:txEffectClrLst/>
+  </dgm:styleLbl>
+  <dgm:styleLbl name="fgAccFollowNode1">
+    <dgm:fillClrLst meth="repeat">
+      <a:schemeClr val="accent1">
+        <a:alpha val="90000"/>
+        <a:tint val="40000"/>
+      </a:schemeClr>
+    </dgm:fillClrLst>
+    <dgm:linClrLst meth="repeat">
+      <a:schemeClr val="accent1">
+        <a:alpha val="90000"/>
+        <a:tint val="40000"/>
+      </a:schemeClr>
+    </dgm:linClrLst>
+    <dgm:effectClrLst/>
+    <dgm:txLinClrLst/>
+    <dgm:txFillClrLst meth="repeat">
+      <a:schemeClr val="dk1"/>
+    </dgm:txFillClrLst>
+    <dgm:txEffectClrLst/>
+  </dgm:styleLbl>
+  <dgm:styleLbl name="alignAccFollowNode1">
+    <dgm:fillClrLst meth="repeat">
+      <a:schemeClr val="accent1">
+        <a:alpha val="90000"/>
+        <a:tint val="40000"/>
+      </a:schemeClr>
+    </dgm:fillClrLst>
+    <dgm:linClrLst meth="repeat">
+      <a:schemeClr val="accent1">
+        <a:alpha val="90000"/>
+        <a:tint val="40000"/>
+      </a:schemeClr>
+    </dgm:linClrLst>
+    <dgm:effectClrLst/>
+    <dgm:txLinClrLst/>
+    <dgm:txFillClrLst meth="repeat">
+      <a:schemeClr val="dk1"/>
+    </dgm:txFillClrLst>
+    <dgm:txEffectClrLst/>
+  </dgm:styleLbl>
+  <dgm:styleLbl name="bgAccFollowNode1">
+    <dgm:fillClrLst meth="repeat">
+      <a:schemeClr val="accent1">
+        <a:alpha val="90000"/>
+        <a:tint val="40000"/>
+      </a:schemeClr>
+    </dgm:fillClrLst>
+    <dgm:linClrLst meth="repeat">
+      <a:schemeClr val="accent1">
+        <a:alpha val="90000"/>
+        <a:tint val="40000"/>
+      </a:schemeClr>
+    </dgm:linClrLst>
+    <dgm:effectClrLst/>
+    <dgm:txLinClrLst/>
+    <dgm:txFillClrLst meth="repeat">
+      <a:schemeClr val="dk1"/>
+    </dgm:txFillClrLst>
+    <dgm:txEffectClrLst/>
+  </dgm:styleLbl>
+  <dgm:styleLbl name="fgAcc0">
+    <dgm:fillClrLst meth="repeat">
+      <a:schemeClr val="lt1">
+        <a:alpha val="90000"/>
+      </a:schemeClr>
+    </dgm:fillClrLst>
+    <dgm:linClrLst meth="repeat">
+      <a:schemeClr val="accent1"/>
+    </dgm:linClrLst>
+    <dgm:effectClrLst/>
+    <dgm:txLinClrLst/>
+    <dgm:txFillClrLst meth="repeat">
+      <a:schemeClr val="dk1"/>
+    </dgm:txFillClrLst>
+    <dgm:txEffectClrLst/>
+  </dgm:styleLbl>
+  <dgm:styleLbl name="fgAcc2">
+    <dgm:fillClrLst meth="repeat">
+      <a:schemeClr val="lt1">
+        <a:alpha val="90000"/>
+      </a:schemeClr>
+    </dgm:fillClrLst>
+    <dgm:linClrLst meth="repeat">
+      <a:schemeClr val="accent1"/>
+    </dgm:linClrLst>
+    <dgm:effectClrLst/>
+    <dgm:txLinClrLst/>
+    <dgm:txFillClrLst meth="repeat">
+      <a:schemeClr val="dk1"/>
+    </dgm:txFillClrLst>
+    <dgm:txEffectClrLst/>
+  </dgm:styleLbl>
+  <dgm:styleLbl name="fgAcc3">
+    <dgm:fillClrLst meth="repeat">
+      <a:schemeClr val="lt1">
+        <a:alpha val="90000"/>
+      </a:schemeClr>
+    </dgm:fillClrLst>
+    <dgm:linClrLst meth="repeat">
+      <a:schemeClr val="accent1"/>
+    </dgm:linClrLst>
+    <dgm:effectClrLst/>
+    <dgm:txLinClrLst/>
+    <dgm:txFillClrLst meth="repeat">
+      <a:schemeClr val="dk1"/>
+    </dgm:txFillClrLst>
+    <dgm:txEffectClrLst/>
+  </dgm:styleLbl>
+  <dgm:styleLbl name="fgAcc4">
+    <dgm:fillClrLst meth="repeat">
+      <a:schemeClr val="lt1">
+        <a:alpha val="90000"/>
+      </a:schemeClr>
+    </dgm:fillClrLst>
+    <dgm:linClrLst meth="repeat">
+      <a:schemeClr val="accent1"/>
+    </dgm:linClrLst>
+    <dgm:effectClrLst/>
+    <dgm:txLinClrLst/>
+    <dgm:txFillClrLst meth="repeat">
+      <a:schemeClr val="dk1"/>
+    </dgm:txFillClrLst>
+    <dgm:txEffectClrLst/>
+  </dgm:styleLbl>
+  <dgm:styleLbl name="bgShp">
+    <dgm:fillClrLst meth="repeat">
+      <a:schemeClr val="accent1">
+        <a:tint val="40000"/>
+      </a:schemeClr>
+    </dgm:fillClrLst>
+    <dgm:linClrLst meth="repeat">
+      <a:schemeClr val="accent1"/>
+    </dgm:linClrLst>
+    <dgm:effectClrLst/>
+    <dgm:txLinClrLst/>
+    <dgm:txFillClrLst meth="repeat">
+      <a:schemeClr val="dk1"/>
+    </dgm:txFillClrLst>
+    <dgm:txEffectClrLst/>
+  </dgm:styleLbl>
+  <dgm:styleLbl name="dkBgShp">
+    <dgm:fillClrLst meth="repeat">
+      <a:schemeClr val="accent1">
+        <a:shade val="80000"/>
+      </a:schemeClr>
+    </dgm:fillClrLst>
+    <dgm:linClrLst meth="repeat">
+      <a:schemeClr val="accent1"/>
+    </dgm:linClrLst>
+    <dgm:effectClrLst/>
+    <dgm:txLinClrLst/>
+    <dgm:txFillClrLst meth="repeat">
+      <a:schemeClr val="lt1"/>
+    </dgm:txFillClrLst>
+    <dgm:txEffectClrLst/>
+  </dgm:styleLbl>
+  <dgm:styleLbl name="trBgShp">
+    <dgm:fillClrLst meth="repeat">
+      <a:schemeClr val="accent1">
+        <a:tint val="50000"/>
+        <a:alpha val="40000"/>
+      </a:schemeClr>
+    </dgm:fillClrLst>
+    <dgm:linClrLst meth="repeat">
+      <a:schemeClr val="accent1"/>
+    </dgm:linClrLst>
+    <dgm:effectClrLst/>
+    <dgm:txLinClrLst/>
+    <dgm:txFillClrLst meth="repeat">
+      <a:schemeClr val="lt1"/>
+    </dgm:txFillClrLst>
+    <dgm:txEffectClrLst/>
+  </dgm:styleLbl>
+  <dgm:styleLbl name="fgShp">
+    <dgm:fillClrLst meth="repeat">
+      <a:schemeClr val="accent1">
+        <a:tint val="60000"/>
+      </a:schemeClr>
+    </dgm:fillClrLst>
+    <dgm:linClrLst meth="repeat">
+      <a:schemeClr val="lt1"/>
+    </dgm:linClrLst>
+    <dgm:effectClrLst/>
+    <dgm:txLinClrLst/>
+    <dgm:txFillClrLst meth="repeat">
+      <a:schemeClr val="dk1"/>
+    </dgm:txFillClrLst>
+    <dgm:txEffectClrLst/>
+  </dgm:styleLbl>
+  <dgm:styleLbl name="revTx">
+    <dgm:fillClrLst meth="repeat">
+      <a:schemeClr val="lt1">
+        <a:alpha val="0"/>
+      </a:schemeClr>
+    </dgm:fillClrLst>
+    <dgm:linClrLst meth="repeat">
+      <a:schemeClr val="dk1">
+        <a:alpha val="0"/>
+      </a:schemeClr>
+    </dgm:linClrLst>
+    <dgm:effectClrLst/>
+    <dgm:txLinClrLst/>
+    <dgm:txFillClrLst meth="repeat">
+      <a:schemeClr val="tx1"/>
+    </dgm:txFillClrLst>
+    <dgm:txEffectClrLst/>
+  </dgm:styleLbl>
+</dgm:colorsDef>
+</file>
+
+<file path=ppt/diagrams/colors4.xml><?xml version="1.0" encoding="utf-8"?>
 <dgm:colorsDef xmlns:dgm="http://schemas.openxmlformats.org/drawingml/2006/diagram" xmlns:a="http://schemas.openxmlformats.org/drawingml/2006/main" uniqueId="urn:microsoft.com/office/officeart/2005/8/colors/accent1_2">
   <dgm:title val=""/>
   <dgm:desc val=""/>
@@ -3063,6 +3814,219 @@
     <dgm:cxn modelId="{4B6BE833-B09F-7B42-98BB-FDF310A32598}" type="presParOf" srcId="{B2FDF035-9EBC-E042-905D-748F9189B14E}" destId="{A0E2125D-9980-4A4E-A04F-2A89DE331803}" srcOrd="3" destOrd="0" presId="urn:microsoft.com/office/officeart/2005/8/layout/process4"/>
     <dgm:cxn modelId="{81FA7AA3-83EF-1042-8B4C-CDD018A815F6}" type="presParOf" srcId="{B2FDF035-9EBC-E042-905D-748F9189B14E}" destId="{5F433FA9-DF44-8043-94A8-37993E19AF75}" srcOrd="4" destOrd="0" presId="urn:microsoft.com/office/officeart/2005/8/layout/process4"/>
     <dgm:cxn modelId="{3EBC8F46-A3F9-CB4C-BD3E-FA2AD717DEE0}" type="presParOf" srcId="{5F433FA9-DF44-8043-94A8-37993E19AF75}" destId="{058DE872-3ABD-9942-B529-932F5D736CE8}" srcOrd="0" destOrd="0" presId="urn:microsoft.com/office/officeart/2005/8/layout/process4"/>
+  </dgm:cxnLst>
+  <dgm:bg/>
+  <dgm:whole/>
+  <dgm:extLst>
+    <a:ext uri="http://schemas.microsoft.com/office/drawing/2008/diagram">
+      <dsp:dataModelExt xmlns:dsp="http://schemas.microsoft.com/office/drawing/2008/diagram" relId="rId6" minVer="http://schemas.openxmlformats.org/drawingml/2006/diagram"/>
+    </a:ext>
+  </dgm:extLst>
+</dgm:dataModel>
+</file>
+
+<file path=ppt/diagrams/data4.xml><?xml version="1.0" encoding="utf-8"?>
+<dgm:dataModel xmlns:dgm="http://schemas.openxmlformats.org/drawingml/2006/diagram" xmlns:a="http://schemas.openxmlformats.org/drawingml/2006/main">
+  <dgm:ptLst>
+    <dgm:pt modelId="{F30E1DB9-D72A-0B45-9E65-3210E1CCA7B3}" type="doc">
+      <dgm:prSet loTypeId="urn:microsoft.com/office/officeart/2005/8/layout/process4" loCatId="" qsTypeId="urn:microsoft.com/office/officeart/2005/8/quickstyle/simple4" qsCatId="simple" csTypeId="urn:microsoft.com/office/officeart/2005/8/colors/accent1_2" csCatId="accent1" phldr="1"/>
+      <dgm:spPr/>
+      <dgm:t>
+        <a:bodyPr/>
+        <a:lstStyle/>
+        <a:p>
+          <a:endParaRPr lang="en-US"/>
+        </a:p>
+      </dgm:t>
+    </dgm:pt>
+    <dgm:pt modelId="{EFF701C5-F972-1B43-B3DC-E3C57A9067FD}">
+      <dgm:prSet phldrT="[Text]"/>
+      <dgm:spPr/>
+      <dgm:t>
+        <a:bodyPr/>
+        <a:lstStyle/>
+        <a:p>
+          <a:r>
+            <a:rPr lang="en-US" dirty="0"/>
+            <a:t>1.  Referral, Intake, and Screening</a:t>
+          </a:r>
+        </a:p>
+      </dgm:t>
+    </dgm:pt>
+    <dgm:pt modelId="{DB3141F6-12DB-584F-9560-D4D281309941}" type="parTrans" cxnId="{1F03A48E-6089-5E40-9BD5-8BC9460ADF18}">
+      <dgm:prSet/>
+      <dgm:spPr/>
+      <dgm:t>
+        <a:bodyPr/>
+        <a:lstStyle/>
+        <a:p>
+          <a:endParaRPr lang="en-US"/>
+        </a:p>
+      </dgm:t>
+    </dgm:pt>
+    <dgm:pt modelId="{874DF312-6D7B-0A46-A5DB-8B10A65B6A8D}" type="sibTrans" cxnId="{1F03A48E-6089-5E40-9BD5-8BC9460ADF18}">
+      <dgm:prSet/>
+      <dgm:spPr/>
+      <dgm:t>
+        <a:bodyPr/>
+        <a:lstStyle/>
+        <a:p>
+          <a:endParaRPr lang="en-US"/>
+        </a:p>
+      </dgm:t>
+    </dgm:pt>
+    <dgm:pt modelId="{8AC72EF8-6C4E-3540-BAA2-0BBB941BF3DE}">
+      <dgm:prSet phldrT="[Text]"/>
+      <dgm:spPr/>
+      <dgm:t>
+        <a:bodyPr/>
+        <a:lstStyle/>
+        <a:p>
+          <a:r>
+            <a:rPr lang="en-US" dirty="0"/>
+            <a:t>2.  </a:t>
+          </a:r>
+          <a:r>
+            <a:rPr lang="en-US" b="1" dirty="0">
+              <a:solidFill>
+                <a:srgbClr val="FF0000"/>
+              </a:solidFill>
+            </a:rPr>
+            <a:t>Designing</a:t>
+          </a:r>
+          <a:r>
+            <a:rPr lang="en-US" b="1" baseline="0" dirty="0">
+              <a:solidFill>
+                <a:srgbClr val="FF0000"/>
+              </a:solidFill>
+            </a:rPr>
+            <a:t> and Administering the Assessment Protocol</a:t>
+          </a:r>
+          <a:endParaRPr lang="en-US" b="1" dirty="0">
+            <a:solidFill>
+              <a:srgbClr val="FF0000"/>
+            </a:solidFill>
+          </a:endParaRPr>
+        </a:p>
+      </dgm:t>
+    </dgm:pt>
+    <dgm:pt modelId="{23FFF365-8699-C04D-8A75-6104FDA7CFDF}" type="parTrans" cxnId="{1762CCE7-505D-AA4B-A9A9-1015C8FF3A98}">
+      <dgm:prSet/>
+      <dgm:spPr/>
+      <dgm:t>
+        <a:bodyPr/>
+        <a:lstStyle/>
+        <a:p>
+          <a:endParaRPr lang="en-US"/>
+        </a:p>
+      </dgm:t>
+    </dgm:pt>
+    <dgm:pt modelId="{7F27B5E4-260C-324A-A342-89CF270B2159}" type="sibTrans" cxnId="{1762CCE7-505D-AA4B-A9A9-1015C8FF3A98}">
+      <dgm:prSet/>
+      <dgm:spPr/>
+      <dgm:t>
+        <a:bodyPr/>
+        <a:lstStyle/>
+        <a:p>
+          <a:endParaRPr lang="en-US"/>
+        </a:p>
+      </dgm:t>
+    </dgm:pt>
+    <dgm:pt modelId="{5A688512-C850-9848-B451-F6615CFC53F5}">
+      <dgm:prSet/>
+      <dgm:spPr/>
+      <dgm:t>
+        <a:bodyPr/>
+        <a:lstStyle/>
+        <a:p>
+          <a:r>
+            <a:rPr lang="en-US" dirty="0"/>
+            <a:t>3.  Interpreting Assessment Findings</a:t>
+          </a:r>
+        </a:p>
+      </dgm:t>
+    </dgm:pt>
+    <dgm:pt modelId="{6B8F4E3E-DCD8-AC4E-A39A-46D67A9796EA}" type="parTrans" cxnId="{6FD92084-41E2-2849-A149-09389FC70F2B}">
+      <dgm:prSet/>
+      <dgm:spPr/>
+      <dgm:t>
+        <a:bodyPr/>
+        <a:lstStyle/>
+        <a:p>
+          <a:endParaRPr lang="en-US"/>
+        </a:p>
+      </dgm:t>
+    </dgm:pt>
+    <dgm:pt modelId="{848F69C5-9B45-794B-80C4-8EAC3CC5C2D3}" type="sibTrans" cxnId="{6FD92084-41E2-2849-A149-09389FC70F2B}">
+      <dgm:prSet/>
+      <dgm:spPr/>
+      <dgm:t>
+        <a:bodyPr/>
+        <a:lstStyle/>
+        <a:p>
+          <a:endParaRPr lang="en-US"/>
+        </a:p>
+      </dgm:t>
+    </dgm:pt>
+    <dgm:pt modelId="{B2FDF035-9EBC-E042-905D-748F9189B14E}" type="pres">
+      <dgm:prSet presAssocID="{F30E1DB9-D72A-0B45-9E65-3210E1CCA7B3}" presName="Name0" presStyleCnt="0">
+        <dgm:presLayoutVars>
+          <dgm:dir/>
+          <dgm:animLvl val="lvl"/>
+          <dgm:resizeHandles val="exact"/>
+        </dgm:presLayoutVars>
+      </dgm:prSet>
+      <dgm:spPr/>
+    </dgm:pt>
+    <dgm:pt modelId="{837E7024-49DF-8645-93E5-81EE5B5A1F75}" type="pres">
+      <dgm:prSet presAssocID="{5A688512-C850-9848-B451-F6615CFC53F5}" presName="boxAndChildren" presStyleCnt="0"/>
+      <dgm:spPr/>
+    </dgm:pt>
+    <dgm:pt modelId="{4E77CA8B-980A-9E41-982B-C9C05A2966A0}" type="pres">
+      <dgm:prSet presAssocID="{5A688512-C850-9848-B451-F6615CFC53F5}" presName="parentTextBox" presStyleLbl="node1" presStyleIdx="0" presStyleCnt="3"/>
+      <dgm:spPr/>
+    </dgm:pt>
+    <dgm:pt modelId="{639E36CB-CBEB-FE43-965F-4086488D60F2}" type="pres">
+      <dgm:prSet presAssocID="{7F27B5E4-260C-324A-A342-89CF270B2159}" presName="sp" presStyleCnt="0"/>
+      <dgm:spPr/>
+    </dgm:pt>
+    <dgm:pt modelId="{D38C047E-8BBB-8F4B-8B73-09FA898F4C56}" type="pres">
+      <dgm:prSet presAssocID="{8AC72EF8-6C4E-3540-BAA2-0BBB941BF3DE}" presName="arrowAndChildren" presStyleCnt="0"/>
+      <dgm:spPr/>
+    </dgm:pt>
+    <dgm:pt modelId="{33F85367-CF91-DE44-A3ED-A73AAB76C065}" type="pres">
+      <dgm:prSet presAssocID="{8AC72EF8-6C4E-3540-BAA2-0BBB941BF3DE}" presName="parentTextArrow" presStyleLbl="node1" presStyleIdx="1" presStyleCnt="3"/>
+      <dgm:spPr/>
+    </dgm:pt>
+    <dgm:pt modelId="{A0E2125D-9980-4A4E-A04F-2A89DE331803}" type="pres">
+      <dgm:prSet presAssocID="{874DF312-6D7B-0A46-A5DB-8B10A65B6A8D}" presName="sp" presStyleCnt="0"/>
+      <dgm:spPr/>
+    </dgm:pt>
+    <dgm:pt modelId="{5F433FA9-DF44-8043-94A8-37993E19AF75}" type="pres">
+      <dgm:prSet presAssocID="{EFF701C5-F972-1B43-B3DC-E3C57A9067FD}" presName="arrowAndChildren" presStyleCnt="0"/>
+      <dgm:spPr/>
+    </dgm:pt>
+    <dgm:pt modelId="{058DE872-3ABD-9942-B529-932F5D736CE8}" type="pres">
+      <dgm:prSet presAssocID="{EFF701C5-F972-1B43-B3DC-E3C57A9067FD}" presName="parentTextArrow" presStyleLbl="node1" presStyleIdx="2" presStyleCnt="3"/>
+      <dgm:spPr/>
+    </dgm:pt>
+  </dgm:ptLst>
+  <dgm:cxnLst>
+    <dgm:cxn modelId="{4BD92407-A900-9947-A4EF-9D1D336EE094}" type="presOf" srcId="{8AC72EF8-6C4E-3540-BAA2-0BBB941BF3DE}" destId="{33F85367-CF91-DE44-A3ED-A73AAB76C065}" srcOrd="0" destOrd="0" presId="urn:microsoft.com/office/officeart/2005/8/layout/process4"/>
+    <dgm:cxn modelId="{D9F87140-51A0-B247-BB96-1FE6088C4F17}" type="presOf" srcId="{EFF701C5-F972-1B43-B3DC-E3C57A9067FD}" destId="{058DE872-3ABD-9942-B529-932F5D736CE8}" srcOrd="0" destOrd="0" presId="urn:microsoft.com/office/officeart/2005/8/layout/process4"/>
+    <dgm:cxn modelId="{6FD92084-41E2-2849-A149-09389FC70F2B}" srcId="{F30E1DB9-D72A-0B45-9E65-3210E1CCA7B3}" destId="{5A688512-C850-9848-B451-F6615CFC53F5}" srcOrd="2" destOrd="0" parTransId="{6B8F4E3E-DCD8-AC4E-A39A-46D67A9796EA}" sibTransId="{848F69C5-9B45-794B-80C4-8EAC3CC5C2D3}"/>
+    <dgm:cxn modelId="{1F03A48E-6089-5E40-9BD5-8BC9460ADF18}" srcId="{F30E1DB9-D72A-0B45-9E65-3210E1CCA7B3}" destId="{EFF701C5-F972-1B43-B3DC-E3C57A9067FD}" srcOrd="0" destOrd="0" parTransId="{DB3141F6-12DB-584F-9560-D4D281309941}" sibTransId="{874DF312-6D7B-0A46-A5DB-8B10A65B6A8D}"/>
+    <dgm:cxn modelId="{DCC547BA-2E2B-FF46-99A9-5332F95EF7C5}" type="presOf" srcId="{F30E1DB9-D72A-0B45-9E65-3210E1CCA7B3}" destId="{B2FDF035-9EBC-E042-905D-748F9189B14E}" srcOrd="0" destOrd="0" presId="urn:microsoft.com/office/officeart/2005/8/layout/process4"/>
+    <dgm:cxn modelId="{1762CCE7-505D-AA4B-A9A9-1015C8FF3A98}" srcId="{F30E1DB9-D72A-0B45-9E65-3210E1CCA7B3}" destId="{8AC72EF8-6C4E-3540-BAA2-0BBB941BF3DE}" srcOrd="1" destOrd="0" parTransId="{23FFF365-8699-C04D-8A75-6104FDA7CFDF}" sibTransId="{7F27B5E4-260C-324A-A342-89CF270B2159}"/>
+    <dgm:cxn modelId="{C51B86ED-22A4-ED41-B984-7917B8E13364}" type="presOf" srcId="{5A688512-C850-9848-B451-F6615CFC53F5}" destId="{4E77CA8B-980A-9E41-982B-C9C05A2966A0}" srcOrd="0" destOrd="0" presId="urn:microsoft.com/office/officeart/2005/8/layout/process4"/>
+    <dgm:cxn modelId="{D711D140-A492-FD47-885F-AB83DB88B725}" type="presParOf" srcId="{B2FDF035-9EBC-E042-905D-748F9189B14E}" destId="{837E7024-49DF-8645-93E5-81EE5B5A1F75}" srcOrd="0" destOrd="0" presId="urn:microsoft.com/office/officeart/2005/8/layout/process4"/>
+    <dgm:cxn modelId="{DB112A87-0FD1-D848-AE64-6FAEF5AD9F6D}" type="presParOf" srcId="{837E7024-49DF-8645-93E5-81EE5B5A1F75}" destId="{4E77CA8B-980A-9E41-982B-C9C05A2966A0}" srcOrd="0" destOrd="0" presId="urn:microsoft.com/office/officeart/2005/8/layout/process4"/>
+    <dgm:cxn modelId="{90F0D664-D5F1-7F42-933E-319994C9EFF6}" type="presParOf" srcId="{B2FDF035-9EBC-E042-905D-748F9189B14E}" destId="{639E36CB-CBEB-FE43-965F-4086488D60F2}" srcOrd="1" destOrd="0" presId="urn:microsoft.com/office/officeart/2005/8/layout/process4"/>
+    <dgm:cxn modelId="{B50AF3BD-716A-4444-8011-54F332A899A7}" type="presParOf" srcId="{B2FDF035-9EBC-E042-905D-748F9189B14E}" destId="{D38C047E-8BBB-8F4B-8B73-09FA898F4C56}" srcOrd="2" destOrd="0" presId="urn:microsoft.com/office/officeart/2005/8/layout/process4"/>
+    <dgm:cxn modelId="{1EDBDD6C-524E-E845-A19F-34854BA508E9}" type="presParOf" srcId="{D38C047E-8BBB-8F4B-8B73-09FA898F4C56}" destId="{33F85367-CF91-DE44-A3ED-A73AAB76C065}" srcOrd="0" destOrd="0" presId="urn:microsoft.com/office/officeart/2005/8/layout/process4"/>
+    <dgm:cxn modelId="{A0ED4B9E-74D6-594B-AF4E-30BA667ADE52}" type="presParOf" srcId="{B2FDF035-9EBC-E042-905D-748F9189B14E}" destId="{A0E2125D-9980-4A4E-A04F-2A89DE331803}" srcOrd="3" destOrd="0" presId="urn:microsoft.com/office/officeart/2005/8/layout/process4"/>
+    <dgm:cxn modelId="{D7C5651F-3866-1940-9A77-525BBA606CA4}" type="presParOf" srcId="{B2FDF035-9EBC-E042-905D-748F9189B14E}" destId="{5F433FA9-DF44-8043-94A8-37993E19AF75}" srcOrd="4" destOrd="0" presId="urn:microsoft.com/office/officeart/2005/8/layout/process4"/>
+    <dgm:cxn modelId="{3844F7DD-C278-E948-88E5-CE13C23A55F2}" type="presParOf" srcId="{5F433FA9-DF44-8043-94A8-37993E19AF75}" destId="{058DE872-3ABD-9942-B529-932F5D736CE8}" srcOrd="0" destOrd="0" presId="urn:microsoft.com/office/officeart/2005/8/layout/process4"/>
   </dgm:cxnLst>
   <dgm:bg/>
   <dgm:whole/>
@@ -4242,6 +5206,336 @@
 </dsp:drawing>
 </file>
 
+<file path=ppt/diagrams/drawing4.xml><?xml version="1.0" encoding="utf-8"?>
+<dsp:drawing xmlns:dgm="http://schemas.openxmlformats.org/drawingml/2006/diagram" xmlns:dsp="http://schemas.microsoft.com/office/drawing/2008/diagram" xmlns:a="http://schemas.openxmlformats.org/drawingml/2006/main">
+  <dsp:spTree>
+    <dsp:nvGrpSpPr>
+      <dsp:cNvPr id="0" name=""/>
+      <dsp:cNvGrpSpPr/>
+    </dsp:nvGrpSpPr>
+    <dsp:grpSpPr/>
+    <dsp:sp modelId="{4E77CA8B-980A-9E41-982B-C9C05A2966A0}">
+      <dsp:nvSpPr>
+        <dsp:cNvPr id="0" name=""/>
+        <dsp:cNvSpPr/>
+      </dsp:nvSpPr>
+      <dsp:spPr>
+        <a:xfrm>
+          <a:off x="0" y="3275482"/>
+          <a:ext cx="7675562" cy="1075086"/>
+        </a:xfrm>
+        <a:prstGeom prst="rect">
+          <a:avLst/>
+        </a:prstGeom>
+        <a:gradFill rotWithShape="0">
+          <a:gsLst>
+            <a:gs pos="0">
+              <a:schemeClr val="accent1">
+                <a:hueOff val="0"/>
+                <a:satOff val="0"/>
+                <a:lumOff val="0"/>
+                <a:alphaOff val="0"/>
+                <a:satMod val="103000"/>
+                <a:lumMod val="102000"/>
+                <a:tint val="94000"/>
+              </a:schemeClr>
+            </a:gs>
+            <a:gs pos="50000">
+              <a:schemeClr val="accent1">
+                <a:hueOff val="0"/>
+                <a:satOff val="0"/>
+                <a:lumOff val="0"/>
+                <a:alphaOff val="0"/>
+                <a:satMod val="110000"/>
+                <a:lumMod val="100000"/>
+                <a:shade val="100000"/>
+              </a:schemeClr>
+            </a:gs>
+            <a:gs pos="100000">
+              <a:schemeClr val="accent1">
+                <a:hueOff val="0"/>
+                <a:satOff val="0"/>
+                <a:lumOff val="0"/>
+                <a:alphaOff val="0"/>
+                <a:lumMod val="99000"/>
+                <a:satMod val="120000"/>
+                <a:shade val="78000"/>
+              </a:schemeClr>
+            </a:gs>
+          </a:gsLst>
+          <a:lin ang="5400000" scaled="0"/>
+        </a:gradFill>
+        <a:ln>
+          <a:noFill/>
+        </a:ln>
+        <a:effectLst/>
+      </dsp:spPr>
+      <dsp:style>
+        <a:lnRef idx="0">
+          <a:scrgbClr r="0" g="0" b="0"/>
+        </a:lnRef>
+        <a:fillRef idx="3">
+          <a:scrgbClr r="0" g="0" b="0"/>
+        </a:fillRef>
+        <a:effectRef idx="2">
+          <a:scrgbClr r="0" g="0" b="0"/>
+        </a:effectRef>
+        <a:fontRef idx="minor">
+          <a:schemeClr val="lt1"/>
+        </a:fontRef>
+      </dsp:style>
+      <dsp:txBody>
+        <a:bodyPr spcFirstLastPara="0" vert="horz" wrap="square" lIns="177800" tIns="177800" rIns="177800" bIns="177800" numCol="1" spcCol="1270" anchor="ctr" anchorCtr="0">
+          <a:noAutofit/>
+        </a:bodyPr>
+        <a:lstStyle/>
+        <a:p>
+          <a:pPr marL="0" lvl="0" indent="0" algn="ctr" defTabSz="1111250">
+            <a:lnSpc>
+              <a:spcPct val="90000"/>
+            </a:lnSpc>
+            <a:spcBef>
+              <a:spcPct val="0"/>
+            </a:spcBef>
+            <a:spcAft>
+              <a:spcPct val="35000"/>
+            </a:spcAft>
+            <a:buNone/>
+          </a:pPr>
+          <a:r>
+            <a:rPr lang="en-US" sz="2500" kern="1200" dirty="0"/>
+            <a:t>3.  Interpreting Assessment Findings</a:t>
+          </a:r>
+        </a:p>
+      </dsp:txBody>
+      <dsp:txXfrm>
+        <a:off x="0" y="3275482"/>
+        <a:ext cx="7675562" cy="1075086"/>
+      </dsp:txXfrm>
+    </dsp:sp>
+    <dsp:sp modelId="{33F85367-CF91-DE44-A3ED-A73AAB76C065}">
+      <dsp:nvSpPr>
+        <dsp:cNvPr id="0" name=""/>
+        <dsp:cNvSpPr/>
+      </dsp:nvSpPr>
+      <dsp:spPr>
+        <a:xfrm rot="10800000">
+          <a:off x="0" y="1638125"/>
+          <a:ext cx="7675562" cy="1653482"/>
+        </a:xfrm>
+        <a:prstGeom prst="upArrowCallout">
+          <a:avLst/>
+        </a:prstGeom>
+        <a:gradFill rotWithShape="0">
+          <a:gsLst>
+            <a:gs pos="0">
+              <a:schemeClr val="accent1">
+                <a:hueOff val="0"/>
+                <a:satOff val="0"/>
+                <a:lumOff val="0"/>
+                <a:alphaOff val="0"/>
+                <a:satMod val="103000"/>
+                <a:lumMod val="102000"/>
+                <a:tint val="94000"/>
+              </a:schemeClr>
+            </a:gs>
+            <a:gs pos="50000">
+              <a:schemeClr val="accent1">
+                <a:hueOff val="0"/>
+                <a:satOff val="0"/>
+                <a:lumOff val="0"/>
+                <a:alphaOff val="0"/>
+                <a:satMod val="110000"/>
+                <a:lumMod val="100000"/>
+                <a:shade val="100000"/>
+              </a:schemeClr>
+            </a:gs>
+            <a:gs pos="100000">
+              <a:schemeClr val="accent1">
+                <a:hueOff val="0"/>
+                <a:satOff val="0"/>
+                <a:lumOff val="0"/>
+                <a:alphaOff val="0"/>
+                <a:lumMod val="99000"/>
+                <a:satMod val="120000"/>
+                <a:shade val="78000"/>
+              </a:schemeClr>
+            </a:gs>
+          </a:gsLst>
+          <a:lin ang="5400000" scaled="0"/>
+        </a:gradFill>
+        <a:ln>
+          <a:noFill/>
+        </a:ln>
+        <a:effectLst/>
+      </dsp:spPr>
+      <dsp:style>
+        <a:lnRef idx="0">
+          <a:scrgbClr r="0" g="0" b="0"/>
+        </a:lnRef>
+        <a:fillRef idx="3">
+          <a:scrgbClr r="0" g="0" b="0"/>
+        </a:fillRef>
+        <a:effectRef idx="2">
+          <a:scrgbClr r="0" g="0" b="0"/>
+        </a:effectRef>
+        <a:fontRef idx="minor">
+          <a:schemeClr val="lt1"/>
+        </a:fontRef>
+      </dsp:style>
+      <dsp:txBody>
+        <a:bodyPr spcFirstLastPara="0" vert="horz" wrap="square" lIns="177800" tIns="177800" rIns="177800" bIns="177800" numCol="1" spcCol="1270" anchor="ctr" anchorCtr="0">
+          <a:noAutofit/>
+        </a:bodyPr>
+        <a:lstStyle/>
+        <a:p>
+          <a:pPr marL="0" lvl="0" indent="0" algn="ctr" defTabSz="1111250">
+            <a:lnSpc>
+              <a:spcPct val="90000"/>
+            </a:lnSpc>
+            <a:spcBef>
+              <a:spcPct val="0"/>
+            </a:spcBef>
+            <a:spcAft>
+              <a:spcPct val="35000"/>
+            </a:spcAft>
+            <a:buNone/>
+          </a:pPr>
+          <a:r>
+            <a:rPr lang="en-US" sz="2500" kern="1200" dirty="0"/>
+            <a:t>2.  </a:t>
+          </a:r>
+          <a:r>
+            <a:rPr lang="en-US" sz="2500" b="1" kern="1200" dirty="0">
+              <a:solidFill>
+                <a:srgbClr val="FF0000"/>
+              </a:solidFill>
+            </a:rPr>
+            <a:t>Designing</a:t>
+          </a:r>
+          <a:r>
+            <a:rPr lang="en-US" sz="2500" b="1" kern="1200" baseline="0" dirty="0">
+              <a:solidFill>
+                <a:srgbClr val="FF0000"/>
+              </a:solidFill>
+            </a:rPr>
+            <a:t> and Administering the Assessment Protocol</a:t>
+          </a:r>
+          <a:endParaRPr lang="en-US" sz="2500" b="1" kern="1200" dirty="0">
+            <a:solidFill>
+              <a:srgbClr val="FF0000"/>
+            </a:solidFill>
+          </a:endParaRPr>
+        </a:p>
+      </dsp:txBody>
+      <dsp:txXfrm rot="10800000">
+        <a:off x="0" y="1638125"/>
+        <a:ext cx="7675562" cy="1074383"/>
+      </dsp:txXfrm>
+    </dsp:sp>
+    <dsp:sp modelId="{058DE872-3ABD-9942-B529-932F5D736CE8}">
+      <dsp:nvSpPr>
+        <dsp:cNvPr id="0" name=""/>
+        <dsp:cNvSpPr/>
+      </dsp:nvSpPr>
+      <dsp:spPr>
+        <a:xfrm rot="10800000">
+          <a:off x="0" y="769"/>
+          <a:ext cx="7675562" cy="1653482"/>
+        </a:xfrm>
+        <a:prstGeom prst="upArrowCallout">
+          <a:avLst/>
+        </a:prstGeom>
+        <a:gradFill rotWithShape="0">
+          <a:gsLst>
+            <a:gs pos="0">
+              <a:schemeClr val="accent1">
+                <a:hueOff val="0"/>
+                <a:satOff val="0"/>
+                <a:lumOff val="0"/>
+                <a:alphaOff val="0"/>
+                <a:satMod val="103000"/>
+                <a:lumMod val="102000"/>
+                <a:tint val="94000"/>
+              </a:schemeClr>
+            </a:gs>
+            <a:gs pos="50000">
+              <a:schemeClr val="accent1">
+                <a:hueOff val="0"/>
+                <a:satOff val="0"/>
+                <a:lumOff val="0"/>
+                <a:alphaOff val="0"/>
+                <a:satMod val="110000"/>
+                <a:lumMod val="100000"/>
+                <a:shade val="100000"/>
+              </a:schemeClr>
+            </a:gs>
+            <a:gs pos="100000">
+              <a:schemeClr val="accent1">
+                <a:hueOff val="0"/>
+                <a:satOff val="0"/>
+                <a:lumOff val="0"/>
+                <a:alphaOff val="0"/>
+                <a:lumMod val="99000"/>
+                <a:satMod val="120000"/>
+                <a:shade val="78000"/>
+              </a:schemeClr>
+            </a:gs>
+          </a:gsLst>
+          <a:lin ang="5400000" scaled="0"/>
+        </a:gradFill>
+        <a:ln>
+          <a:noFill/>
+        </a:ln>
+        <a:effectLst/>
+      </dsp:spPr>
+      <dsp:style>
+        <a:lnRef idx="0">
+          <a:scrgbClr r="0" g="0" b="0"/>
+        </a:lnRef>
+        <a:fillRef idx="3">
+          <a:scrgbClr r="0" g="0" b="0"/>
+        </a:fillRef>
+        <a:effectRef idx="2">
+          <a:scrgbClr r="0" g="0" b="0"/>
+        </a:effectRef>
+        <a:fontRef idx="minor">
+          <a:schemeClr val="lt1"/>
+        </a:fontRef>
+      </dsp:style>
+      <dsp:txBody>
+        <a:bodyPr spcFirstLastPara="0" vert="horz" wrap="square" lIns="177800" tIns="177800" rIns="177800" bIns="177800" numCol="1" spcCol="1270" anchor="ctr" anchorCtr="0">
+          <a:noAutofit/>
+        </a:bodyPr>
+        <a:lstStyle/>
+        <a:p>
+          <a:pPr marL="0" lvl="0" indent="0" algn="ctr" defTabSz="1111250">
+            <a:lnSpc>
+              <a:spcPct val="90000"/>
+            </a:lnSpc>
+            <a:spcBef>
+              <a:spcPct val="0"/>
+            </a:spcBef>
+            <a:spcAft>
+              <a:spcPct val="35000"/>
+            </a:spcAft>
+            <a:buNone/>
+          </a:pPr>
+          <a:r>
+            <a:rPr lang="en-US" sz="2500" kern="1200" dirty="0"/>
+            <a:t>1.  Referral, Intake, and Screening</a:t>
+          </a:r>
+        </a:p>
+      </dsp:txBody>
+      <dsp:txXfrm rot="10800000">
+        <a:off x="0" y="769"/>
+        <a:ext cx="7675562" cy="1074383"/>
+      </dsp:txXfrm>
+    </dsp:sp>
+  </dsp:spTree>
+</dsp:drawing>
+</file>
+
 <file path=ppt/diagrams/layout1.xml><?xml version="1.0" encoding="utf-8"?>
 <dgm:layoutDef xmlns:dgm="http://schemas.openxmlformats.org/drawingml/2006/diagram" xmlns:a="http://schemas.openxmlformats.org/drawingml/2006/main" uniqueId="urn:microsoft.com/office/officeart/2005/8/layout/cycle1">
   <dgm:title val=""/>
@@ -4991,6 +6285,359 @@
 </dgm:layoutDef>
 </file>
 
+<file path=ppt/diagrams/layout4.xml><?xml version="1.0" encoding="utf-8"?>
+<dgm:layoutDef xmlns:dgm="http://schemas.openxmlformats.org/drawingml/2006/diagram" xmlns:a="http://schemas.openxmlformats.org/drawingml/2006/main" uniqueId="urn:microsoft.com/office/officeart/2005/8/layout/process4">
+  <dgm:title val=""/>
+  <dgm:desc val=""/>
+  <dgm:catLst>
+    <dgm:cat type="process" pri="16000"/>
+    <dgm:cat type="list" pri="20000"/>
+  </dgm:catLst>
+  <dgm:sampData>
+    <dgm:dataModel>
+      <dgm:ptLst>
+        <dgm:pt modelId="0" type="doc"/>
+        <dgm:pt modelId="1">
+          <dgm:prSet phldr="1"/>
+        </dgm:pt>
+        <dgm:pt modelId="11">
+          <dgm:prSet phldr="1"/>
+        </dgm:pt>
+        <dgm:pt modelId="12">
+          <dgm:prSet phldr="1"/>
+        </dgm:pt>
+        <dgm:pt modelId="2">
+          <dgm:prSet phldr="1"/>
+        </dgm:pt>
+        <dgm:pt modelId="21">
+          <dgm:prSet phldr="1"/>
+        </dgm:pt>
+        <dgm:pt modelId="22">
+          <dgm:prSet phldr="1"/>
+        </dgm:pt>
+        <dgm:pt modelId="3">
+          <dgm:prSet phldr="1"/>
+        </dgm:pt>
+        <dgm:pt modelId="31">
+          <dgm:prSet phldr="1"/>
+        </dgm:pt>
+        <dgm:pt modelId="32">
+          <dgm:prSet phldr="1"/>
+        </dgm:pt>
+      </dgm:ptLst>
+      <dgm:cxnLst>
+        <dgm:cxn modelId="4" srcId="0" destId="1" srcOrd="0" destOrd="0"/>
+        <dgm:cxn modelId="5" srcId="0" destId="2" srcOrd="1" destOrd="0"/>
+        <dgm:cxn modelId="6" srcId="0" destId="3" srcOrd="2" destOrd="0"/>
+        <dgm:cxn modelId="13" srcId="1" destId="11" srcOrd="0" destOrd="0"/>
+        <dgm:cxn modelId="14" srcId="1" destId="12" srcOrd="1" destOrd="0"/>
+        <dgm:cxn modelId="23" srcId="2" destId="21" srcOrd="0" destOrd="0"/>
+        <dgm:cxn modelId="24" srcId="2" destId="22" srcOrd="1" destOrd="0"/>
+        <dgm:cxn modelId="33" srcId="3" destId="31" srcOrd="0" destOrd="0"/>
+        <dgm:cxn modelId="34" srcId="3" destId="32" srcOrd="1" destOrd="0"/>
+      </dgm:cxnLst>
+      <dgm:bg/>
+      <dgm:whole/>
+    </dgm:dataModel>
+  </dgm:sampData>
+  <dgm:styleData>
+    <dgm:dataModel>
+      <dgm:ptLst>
+        <dgm:pt modelId="0" type="doc"/>
+        <dgm:pt modelId="1"/>
+        <dgm:pt modelId="11"/>
+        <dgm:pt modelId="2"/>
+        <dgm:pt modelId="21"/>
+      </dgm:ptLst>
+      <dgm:cxnLst>
+        <dgm:cxn modelId="4" srcId="0" destId="1" srcOrd="0" destOrd="0"/>
+        <dgm:cxn modelId="5" srcId="0" destId="2" srcOrd="1" destOrd="0"/>
+        <dgm:cxn modelId="13" srcId="1" destId="11" srcOrd="0" destOrd="0"/>
+        <dgm:cxn modelId="23" srcId="2" destId="21" srcOrd="0" destOrd="0"/>
+      </dgm:cxnLst>
+      <dgm:bg/>
+      <dgm:whole/>
+    </dgm:dataModel>
+  </dgm:styleData>
+  <dgm:clrData>
+    <dgm:dataModel>
+      <dgm:ptLst>
+        <dgm:pt modelId="0" type="doc"/>
+        <dgm:pt modelId="1"/>
+        <dgm:pt modelId="11"/>
+        <dgm:pt modelId="2"/>
+        <dgm:pt modelId="21"/>
+        <dgm:pt modelId="3"/>
+        <dgm:pt modelId="31"/>
+        <dgm:pt modelId="4"/>
+        <dgm:pt modelId="41"/>
+      </dgm:ptLst>
+      <dgm:cxnLst>
+        <dgm:cxn modelId="5" srcId="0" destId="1" srcOrd="0" destOrd="0"/>
+        <dgm:cxn modelId="6" srcId="0" destId="2" srcOrd="1" destOrd="0"/>
+        <dgm:cxn modelId="7" srcId="0" destId="3" srcOrd="2" destOrd="0"/>
+        <dgm:cxn modelId="8" srcId="0" destId="4" srcOrd="3" destOrd="0"/>
+        <dgm:cxn modelId="13" srcId="1" destId="11" srcOrd="0" destOrd="0"/>
+        <dgm:cxn modelId="23" srcId="2" destId="21" srcOrd="0" destOrd="0"/>
+        <dgm:cxn modelId="33" srcId="3" destId="31" srcOrd="0" destOrd="0"/>
+        <dgm:cxn modelId="43" srcId="4" destId="41" srcOrd="0" destOrd="0"/>
+      </dgm:cxnLst>
+      <dgm:bg/>
+      <dgm:whole/>
+    </dgm:dataModel>
+  </dgm:clrData>
+  <dgm:layoutNode name="Name0">
+    <dgm:varLst>
+      <dgm:dir/>
+      <dgm:animLvl val="lvl"/>
+      <dgm:resizeHandles val="exact"/>
+    </dgm:varLst>
+    <dgm:alg type="lin">
+      <dgm:param type="linDir" val="fromB"/>
+    </dgm:alg>
+    <dgm:shape xmlns:r="http://schemas.openxmlformats.org/officeDocument/2006/relationships" r:blip="">
+      <dgm:adjLst/>
+    </dgm:shape>
+    <dgm:presOf/>
+    <dgm:constrLst>
+      <dgm:constr type="h" for="ch" forName="boxAndChildren" refType="h"/>
+      <dgm:constr type="h" for="ch" forName="arrowAndChildren" refType="h" refFor="ch" refForName="boxAndChildren" op="equ" fact="1.538"/>
+      <dgm:constr type="w" for="ch" forName="arrowAndChildren" refType="w"/>
+      <dgm:constr type="w" for="ch" forName="boxAndChildren" refType="w"/>
+      <dgm:constr type="h" for="ch" forName="sp" refType="h" fact="-0.015"/>
+      <dgm:constr type="primFontSz" for="des" forName="parentTextBox" val="65"/>
+      <dgm:constr type="primFontSz" for="des" forName="parentTextArrow" refType="primFontSz" refFor="des" refForName="parentTextBox" op="equ"/>
+      <dgm:constr type="primFontSz" for="des" forName="childTextArrow" val="65"/>
+      <dgm:constr type="primFontSz" for="des" forName="childTextBox" refType="primFontSz" refFor="des" refForName="childTextArrow" op="equ"/>
+    </dgm:constrLst>
+    <dgm:ruleLst/>
+    <dgm:forEach name="Name1" axis="ch" ptType="node" st="-1" step="-1">
+      <dgm:choose name="Name2">
+        <dgm:if name="Name3" axis="self" ptType="node" func="revPos" op="equ" val="1">
+          <dgm:layoutNode name="boxAndChildren">
+            <dgm:alg type="composite"/>
+            <dgm:shape xmlns:r="http://schemas.openxmlformats.org/officeDocument/2006/relationships" r:blip="">
+              <dgm:adjLst/>
+            </dgm:shape>
+            <dgm:presOf/>
+            <dgm:choose name="Name4">
+              <dgm:if name="Name5" axis="ch" ptType="node" func="cnt" op="gte" val="1">
+                <dgm:constrLst>
+                  <dgm:constr type="w" for="ch" forName="parentTextBox" refType="w"/>
+                  <dgm:constr type="h" for="ch" forName="parentTextBox" refType="h" fact="0.54"/>
+                  <dgm:constr type="t" for="ch" forName="parentTextBox"/>
+                  <dgm:constr type="w" for="ch" forName="entireBox" refType="w"/>
+                  <dgm:constr type="h" for="ch" forName="entireBox" refType="h"/>
+                  <dgm:constr type="w" for="ch" forName="descendantBox" refType="w"/>
+                  <dgm:constr type="b" for="ch" forName="descendantBox" refType="h" fact="0.98"/>
+                  <dgm:constr type="h" for="ch" forName="descendantBox" refType="h" fact="0.46"/>
+                </dgm:constrLst>
+              </dgm:if>
+              <dgm:else name="Name6">
+                <dgm:constrLst>
+                  <dgm:constr type="w" for="ch" forName="parentTextBox" refType="w"/>
+                  <dgm:constr type="h" for="ch" forName="parentTextBox" refType="h"/>
+                </dgm:constrLst>
+              </dgm:else>
+            </dgm:choose>
+            <dgm:ruleLst/>
+            <dgm:layoutNode name="parentTextBox">
+              <dgm:alg type="tx"/>
+              <dgm:choose name="Name7">
+                <dgm:if name="Name8" axis="ch" ptType="node" func="cnt" op="gte" val="1">
+                  <dgm:shape xmlns:r="http://schemas.openxmlformats.org/officeDocument/2006/relationships" type="rect" r:blip="" zOrderOff="1" hideGeom="1">
+                    <dgm:adjLst/>
+                  </dgm:shape>
+                </dgm:if>
+                <dgm:else name="Name9">
+                  <dgm:shape xmlns:r="http://schemas.openxmlformats.org/officeDocument/2006/relationships" type="rect" r:blip="">
+                    <dgm:adjLst/>
+                  </dgm:shape>
+                </dgm:else>
+              </dgm:choose>
+              <dgm:presOf axis="self"/>
+              <dgm:constrLst/>
+              <dgm:ruleLst>
+                <dgm:rule type="primFontSz" val="5" fact="NaN" max="NaN"/>
+              </dgm:ruleLst>
+            </dgm:layoutNode>
+            <dgm:choose name="Name10">
+              <dgm:if name="Name11" axis="ch" ptType="node" func="cnt" op="gte" val="1">
+                <dgm:layoutNode name="entireBox">
+                  <dgm:alg type="sp"/>
+                  <dgm:shape xmlns:r="http://schemas.openxmlformats.org/officeDocument/2006/relationships" type="rect" r:blip="">
+                    <dgm:adjLst/>
+                  </dgm:shape>
+                  <dgm:presOf axis="self"/>
+                  <dgm:constrLst/>
+                  <dgm:ruleLst/>
+                </dgm:layoutNode>
+                <dgm:layoutNode name="descendantBox" styleLbl="fgAccFollowNode1">
+                  <dgm:choose name="Name12">
+                    <dgm:if name="Name13" func="var" arg="dir" op="equ" val="norm">
+                      <dgm:alg type="lin"/>
+                    </dgm:if>
+                    <dgm:else name="Name14">
+                      <dgm:alg type="lin">
+                        <dgm:param type="linDir" val="fromR"/>
+                      </dgm:alg>
+                    </dgm:else>
+                  </dgm:choose>
+                  <dgm:shape xmlns:r="http://schemas.openxmlformats.org/officeDocument/2006/relationships" r:blip="">
+                    <dgm:adjLst/>
+                  </dgm:shape>
+                  <dgm:presOf/>
+                  <dgm:constrLst>
+                    <dgm:constr type="w" for="ch" forName="childTextBox" refType="w"/>
+                    <dgm:constr type="h" for="ch" forName="childTextBox" refType="h"/>
+                  </dgm:constrLst>
+                  <dgm:ruleLst/>
+                  <dgm:forEach name="Name15" axis="ch" ptType="node">
+                    <dgm:layoutNode name="childTextBox" styleLbl="fgAccFollowNode1">
+                      <dgm:varLst>
+                        <dgm:bulletEnabled val="1"/>
+                      </dgm:varLst>
+                      <dgm:alg type="tx"/>
+                      <dgm:shape xmlns:r="http://schemas.openxmlformats.org/officeDocument/2006/relationships" type="rect" r:blip="">
+                        <dgm:adjLst/>
+                      </dgm:shape>
+                      <dgm:presOf axis="desOrSelf" ptType="node"/>
+                      <dgm:constrLst>
+                        <dgm:constr type="tMarg" refType="primFontSz" fact="0.1"/>
+                        <dgm:constr type="bMarg" refType="primFontSz" fact="0.1"/>
+                      </dgm:constrLst>
+                      <dgm:ruleLst>
+                        <dgm:rule type="primFontSz" val="5" fact="NaN" max="NaN"/>
+                      </dgm:ruleLst>
+                    </dgm:layoutNode>
+                  </dgm:forEach>
+                </dgm:layoutNode>
+              </dgm:if>
+              <dgm:else name="Name16"/>
+            </dgm:choose>
+          </dgm:layoutNode>
+        </dgm:if>
+        <dgm:else name="Name17">
+          <dgm:layoutNode name="arrowAndChildren">
+            <dgm:alg type="composite"/>
+            <dgm:shape xmlns:r="http://schemas.openxmlformats.org/officeDocument/2006/relationships" r:blip="">
+              <dgm:adjLst/>
+            </dgm:shape>
+            <dgm:presOf/>
+            <dgm:choose name="Name18">
+              <dgm:if name="Name19" axis="ch" ptType="node" func="cnt" op="gte" val="1">
+                <dgm:constrLst>
+                  <dgm:constr type="w" for="ch" forName="parentTextArrow" refType="w"/>
+                  <dgm:constr type="t" for="ch" forName="parentTextArrow"/>
+                  <dgm:constr type="h" for="ch" forName="parentTextArrow" refType="h" fact="0.351"/>
+                  <dgm:constr type="w" for="ch" forName="arrow" refType="w"/>
+                  <dgm:constr type="h" for="ch" forName="arrow" refType="h"/>
+                  <dgm:constr type="w" for="ch" forName="descendantArrow" refType="w"/>
+                  <dgm:constr type="b" for="ch" forName="descendantArrow" refType="h" fact="0.65"/>
+                  <dgm:constr type="h" for="ch" forName="descendantArrow" refType="h" fact="0.299"/>
+                </dgm:constrLst>
+              </dgm:if>
+              <dgm:else name="Name20">
+                <dgm:constrLst>
+                  <dgm:constr type="w" for="ch" forName="parentTextArrow" refType="w"/>
+                  <dgm:constr type="h" for="ch" forName="parentTextArrow" refType="h"/>
+                </dgm:constrLst>
+              </dgm:else>
+            </dgm:choose>
+            <dgm:ruleLst/>
+            <dgm:layoutNode name="parentTextArrow">
+              <dgm:alg type="tx"/>
+              <dgm:choose name="Name21">
+                <dgm:if name="Name22" axis="ch" ptType="node" func="cnt" op="gte" val="1">
+                  <dgm:shape xmlns:r="http://schemas.openxmlformats.org/officeDocument/2006/relationships" type="rect" r:blip="" zOrderOff="1" hideGeom="1">
+                    <dgm:adjLst/>
+                  </dgm:shape>
+                </dgm:if>
+                <dgm:else name="Name23">
+                  <dgm:shape xmlns:r="http://schemas.openxmlformats.org/officeDocument/2006/relationships" rot="180" type="upArrowCallout" r:blip="">
+                    <dgm:adjLst/>
+                  </dgm:shape>
+                </dgm:else>
+              </dgm:choose>
+              <dgm:presOf axis="self"/>
+              <dgm:constrLst/>
+              <dgm:ruleLst>
+                <dgm:rule type="primFontSz" val="5" fact="NaN" max="NaN"/>
+              </dgm:ruleLst>
+            </dgm:layoutNode>
+            <dgm:choose name="Name24">
+              <dgm:if name="Name25" axis="ch" ptType="node" func="cnt" op="gte" val="1">
+                <dgm:layoutNode name="arrow">
+                  <dgm:alg type="sp"/>
+                  <dgm:shape xmlns:r="http://schemas.openxmlformats.org/officeDocument/2006/relationships" rot="180" type="upArrowCallout" r:blip="">
+                    <dgm:adjLst/>
+                  </dgm:shape>
+                  <dgm:presOf axis="self"/>
+                  <dgm:constrLst/>
+                  <dgm:ruleLst/>
+                </dgm:layoutNode>
+                <dgm:layoutNode name="descendantArrow">
+                  <dgm:choose name="Name26">
+                    <dgm:if name="Name27" func="var" arg="dir" op="equ" val="norm">
+                      <dgm:alg type="lin"/>
+                    </dgm:if>
+                    <dgm:else name="Name28">
+                      <dgm:alg type="lin">
+                        <dgm:param type="linDir" val="fromR"/>
+                      </dgm:alg>
+                    </dgm:else>
+                  </dgm:choose>
+                  <dgm:shape xmlns:r="http://schemas.openxmlformats.org/officeDocument/2006/relationships" r:blip="">
+                    <dgm:adjLst/>
+                  </dgm:shape>
+                  <dgm:presOf/>
+                  <dgm:constrLst>
+                    <dgm:constr type="w" for="ch" forName="childTextArrow" refType="w"/>
+                    <dgm:constr type="h" for="ch" forName="childTextArrow" refType="h"/>
+                  </dgm:constrLst>
+                  <dgm:ruleLst/>
+                  <dgm:forEach name="Name29" axis="ch" ptType="node">
+                    <dgm:layoutNode name="childTextArrow" styleLbl="fgAccFollowNode1">
+                      <dgm:varLst>
+                        <dgm:bulletEnabled val="1"/>
+                      </dgm:varLst>
+                      <dgm:alg type="tx"/>
+                      <dgm:shape xmlns:r="http://schemas.openxmlformats.org/officeDocument/2006/relationships" type="rect" r:blip="">
+                        <dgm:adjLst/>
+                      </dgm:shape>
+                      <dgm:presOf axis="desOrSelf" ptType="node"/>
+                      <dgm:constrLst>
+                        <dgm:constr type="tMarg" refType="primFontSz" fact="0.1"/>
+                        <dgm:constr type="bMarg" refType="primFontSz" fact="0.1"/>
+                      </dgm:constrLst>
+                      <dgm:ruleLst>
+                        <dgm:rule type="primFontSz" val="5" fact="NaN" max="NaN"/>
+                      </dgm:ruleLst>
+                    </dgm:layoutNode>
+                  </dgm:forEach>
+                </dgm:layoutNode>
+              </dgm:if>
+              <dgm:else name="Name30"/>
+            </dgm:choose>
+          </dgm:layoutNode>
+        </dgm:else>
+      </dgm:choose>
+      <dgm:forEach name="Name31" axis="precedSib" ptType="sibTrans" st="-1" cnt="1">
+        <dgm:layoutNode name="sp">
+          <dgm:alg type="sp"/>
+          <dgm:shape xmlns:r="http://schemas.openxmlformats.org/officeDocument/2006/relationships" r:blip="">
+            <dgm:adjLst/>
+          </dgm:shape>
+          <dgm:presOf axis="self"/>
+          <dgm:constrLst/>
+          <dgm:ruleLst/>
+        </dgm:layoutNode>
+      </dgm:forEach>
+    </dgm:forEach>
+  </dgm:layoutNode>
+</dgm:layoutDef>
+</file>
+
 <file path=ppt/diagrams/quickStyle1.xml><?xml version="1.0" encoding="utf-8"?>
 <dgm:styleDef xmlns:dgm="http://schemas.openxmlformats.org/drawingml/2006/diagram" xmlns:a="http://schemas.openxmlformats.org/drawingml/2006/main" uniqueId="urn:microsoft.com/office/officeart/2005/8/quickstyle/simple4">
   <dgm:title val=""/>
@@ -7060,6 +8707,1040 @@
 </file>
 
 <file path=ppt/diagrams/quickStyle3.xml><?xml version="1.0" encoding="utf-8"?>
+<dgm:styleDef xmlns:dgm="http://schemas.openxmlformats.org/drawingml/2006/diagram" xmlns:a="http://schemas.openxmlformats.org/drawingml/2006/main" uniqueId="urn:microsoft.com/office/officeart/2005/8/quickstyle/simple4">
+  <dgm:title val=""/>
+  <dgm:desc val=""/>
+  <dgm:catLst>
+    <dgm:cat type="simple" pri="10400"/>
+  </dgm:catLst>
+  <dgm:scene3d>
+    <a:camera prst="orthographicFront"/>
+    <a:lightRig rig="threePt" dir="t"/>
+  </dgm:scene3d>
+  <dgm:styleLbl name="node0">
+    <dgm:scene3d>
+      <a:camera prst="orthographicFront"/>
+      <a:lightRig rig="threePt" dir="t"/>
+    </dgm:scene3d>
+    <dgm:sp3d/>
+    <dgm:txPr/>
+    <dgm:style>
+      <a:lnRef idx="0">
+        <a:scrgbClr r="0" g="0" b="0"/>
+      </a:lnRef>
+      <a:fillRef idx="3">
+        <a:scrgbClr r="0" g="0" b="0"/>
+      </a:fillRef>
+      <a:effectRef idx="2">
+        <a:scrgbClr r="0" g="0" b="0"/>
+      </a:effectRef>
+      <a:fontRef idx="minor">
+        <a:schemeClr val="lt1"/>
+      </a:fontRef>
+    </dgm:style>
+  </dgm:styleLbl>
+  <dgm:styleLbl name="lnNode1">
+    <dgm:scene3d>
+      <a:camera prst="orthographicFront"/>
+      <a:lightRig rig="threePt" dir="t"/>
+    </dgm:scene3d>
+    <dgm:sp3d/>
+    <dgm:txPr/>
+    <dgm:style>
+      <a:lnRef idx="1">
+        <a:scrgbClr r="0" g="0" b="0"/>
+      </a:lnRef>
+      <a:fillRef idx="3">
+        <a:scrgbClr r="0" g="0" b="0"/>
+      </a:fillRef>
+      <a:effectRef idx="2">
+        <a:scrgbClr r="0" g="0" b="0"/>
+      </a:effectRef>
+      <a:fontRef idx="minor">
+        <a:schemeClr val="lt1"/>
+      </a:fontRef>
+    </dgm:style>
+  </dgm:styleLbl>
+  <dgm:styleLbl name="vennNode1">
+    <dgm:scene3d>
+      <a:camera prst="orthographicFront"/>
+      <a:lightRig rig="threePt" dir="t"/>
+    </dgm:scene3d>
+    <dgm:sp3d/>
+    <dgm:txPr/>
+    <dgm:style>
+      <a:lnRef idx="0">
+        <a:scrgbClr r="0" g="0" b="0"/>
+      </a:lnRef>
+      <a:fillRef idx="3">
+        <a:scrgbClr r="0" g="0" b="0"/>
+      </a:fillRef>
+      <a:effectRef idx="0">
+        <a:scrgbClr r="0" g="0" b="0"/>
+      </a:effectRef>
+      <a:fontRef idx="minor">
+        <a:schemeClr val="tx1"/>
+      </a:fontRef>
+    </dgm:style>
+  </dgm:styleLbl>
+  <dgm:styleLbl name="alignNode1">
+    <dgm:scene3d>
+      <a:camera prst="orthographicFront"/>
+      <a:lightRig rig="threePt" dir="t"/>
+    </dgm:scene3d>
+    <dgm:sp3d/>
+    <dgm:txPr/>
+    <dgm:style>
+      <a:lnRef idx="1">
+        <a:scrgbClr r="0" g="0" b="0"/>
+      </a:lnRef>
+      <a:fillRef idx="3">
+        <a:scrgbClr r="0" g="0" b="0"/>
+      </a:fillRef>
+      <a:effectRef idx="2">
+        <a:scrgbClr r="0" g="0" b="0"/>
+      </a:effectRef>
+      <a:fontRef idx="minor">
+        <a:schemeClr val="lt1"/>
+      </a:fontRef>
+    </dgm:style>
+  </dgm:styleLbl>
+  <dgm:styleLbl name="node1">
+    <dgm:scene3d>
+      <a:camera prst="orthographicFront"/>
+      <a:lightRig rig="threePt" dir="t"/>
+    </dgm:scene3d>
+    <dgm:sp3d/>
+    <dgm:txPr/>
+    <dgm:style>
+      <a:lnRef idx="0">
+        <a:scrgbClr r="0" g="0" b="0"/>
+      </a:lnRef>
+      <a:fillRef idx="3">
+        <a:scrgbClr r="0" g="0" b="0"/>
+      </a:fillRef>
+      <a:effectRef idx="2">
+        <a:scrgbClr r="0" g="0" b="0"/>
+      </a:effectRef>
+      <a:fontRef idx="minor">
+        <a:schemeClr val="lt1"/>
+      </a:fontRef>
+    </dgm:style>
+  </dgm:styleLbl>
+  <dgm:styleLbl name="node2">
+    <dgm:scene3d>
+      <a:camera prst="orthographicFront"/>
+      <a:lightRig rig="threePt" dir="t"/>
+    </dgm:scene3d>
+    <dgm:sp3d/>
+    <dgm:txPr/>
+    <dgm:style>
+      <a:lnRef idx="0">
+        <a:scrgbClr r="0" g="0" b="0"/>
+      </a:lnRef>
+      <a:fillRef idx="3">
+        <a:scrgbClr r="0" g="0" b="0"/>
+      </a:fillRef>
+      <a:effectRef idx="2">
+        <a:scrgbClr r="0" g="0" b="0"/>
+      </a:effectRef>
+      <a:fontRef idx="minor">
+        <a:schemeClr val="lt1"/>
+      </a:fontRef>
+    </dgm:style>
+  </dgm:styleLbl>
+  <dgm:styleLbl name="node3">
+    <dgm:scene3d>
+      <a:camera prst="orthographicFront"/>
+      <a:lightRig rig="threePt" dir="t"/>
+    </dgm:scene3d>
+    <dgm:sp3d/>
+    <dgm:txPr/>
+    <dgm:style>
+      <a:lnRef idx="0">
+        <a:scrgbClr r="0" g="0" b="0"/>
+      </a:lnRef>
+      <a:fillRef idx="3">
+        <a:scrgbClr r="0" g="0" b="0"/>
+      </a:fillRef>
+      <a:effectRef idx="2">
+        <a:scrgbClr r="0" g="0" b="0"/>
+      </a:effectRef>
+      <a:fontRef idx="minor">
+        <a:schemeClr val="lt1"/>
+      </a:fontRef>
+    </dgm:style>
+  </dgm:styleLbl>
+  <dgm:styleLbl name="node4">
+    <dgm:scene3d>
+      <a:camera prst="orthographicFront"/>
+      <a:lightRig rig="threePt" dir="t"/>
+    </dgm:scene3d>
+    <dgm:sp3d/>
+    <dgm:txPr/>
+    <dgm:style>
+      <a:lnRef idx="0">
+        <a:scrgbClr r="0" g="0" b="0"/>
+      </a:lnRef>
+      <a:fillRef idx="3">
+        <a:scrgbClr r="0" g="0" b="0"/>
+      </a:fillRef>
+      <a:effectRef idx="2">
+        <a:scrgbClr r="0" g="0" b="0"/>
+      </a:effectRef>
+      <a:fontRef idx="minor">
+        <a:schemeClr val="lt1"/>
+      </a:fontRef>
+    </dgm:style>
+  </dgm:styleLbl>
+  <dgm:styleLbl name="fgImgPlace1">
+    <dgm:scene3d>
+      <a:camera prst="orthographicFront"/>
+      <a:lightRig rig="threePt" dir="t"/>
+    </dgm:scene3d>
+    <dgm:sp3d/>
+    <dgm:txPr/>
+    <dgm:style>
+      <a:lnRef idx="0">
+        <a:scrgbClr r="0" g="0" b="0"/>
+      </a:lnRef>
+      <a:fillRef idx="1">
+        <a:scrgbClr r="0" g="0" b="0"/>
+      </a:fillRef>
+      <a:effectRef idx="2">
+        <a:scrgbClr r="0" g="0" b="0"/>
+      </a:effectRef>
+      <a:fontRef idx="minor"/>
+    </dgm:style>
+  </dgm:styleLbl>
+  <dgm:styleLbl name="alignImgPlace1">
+    <dgm:scene3d>
+      <a:camera prst="orthographicFront"/>
+      <a:lightRig rig="threePt" dir="t"/>
+    </dgm:scene3d>
+    <dgm:sp3d/>
+    <dgm:txPr/>
+    <dgm:style>
+      <a:lnRef idx="0">
+        <a:scrgbClr r="0" g="0" b="0"/>
+      </a:lnRef>
+      <a:fillRef idx="1">
+        <a:scrgbClr r="0" g="0" b="0"/>
+      </a:fillRef>
+      <a:effectRef idx="2">
+        <a:scrgbClr r="0" g="0" b="0"/>
+      </a:effectRef>
+      <a:fontRef idx="minor"/>
+    </dgm:style>
+  </dgm:styleLbl>
+  <dgm:styleLbl name="bgImgPlace1">
+    <dgm:scene3d>
+      <a:camera prst="orthographicFront"/>
+      <a:lightRig rig="threePt" dir="t"/>
+    </dgm:scene3d>
+    <dgm:sp3d/>
+    <dgm:txPr/>
+    <dgm:style>
+      <a:lnRef idx="0">
+        <a:scrgbClr r="0" g="0" b="0"/>
+      </a:lnRef>
+      <a:fillRef idx="1">
+        <a:scrgbClr r="0" g="0" b="0"/>
+      </a:fillRef>
+      <a:effectRef idx="2">
+        <a:scrgbClr r="0" g="0" b="0"/>
+      </a:effectRef>
+      <a:fontRef idx="minor"/>
+    </dgm:style>
+  </dgm:styleLbl>
+  <dgm:styleLbl name="sibTrans2D1">
+    <dgm:scene3d>
+      <a:camera prst="orthographicFront"/>
+      <a:lightRig rig="threePt" dir="t"/>
+    </dgm:scene3d>
+    <dgm:sp3d/>
+    <dgm:txPr/>
+    <dgm:style>
+      <a:lnRef idx="0">
+        <a:scrgbClr r="0" g="0" b="0"/>
+      </a:lnRef>
+      <a:fillRef idx="3">
+        <a:scrgbClr r="0" g="0" b="0"/>
+      </a:fillRef>
+      <a:effectRef idx="2">
+        <a:scrgbClr r="0" g="0" b="0"/>
+      </a:effectRef>
+      <a:fontRef idx="minor">
+        <a:schemeClr val="lt1"/>
+      </a:fontRef>
+    </dgm:style>
+  </dgm:styleLbl>
+  <dgm:styleLbl name="fgSibTrans2D1">
+    <dgm:scene3d>
+      <a:camera prst="orthographicFront"/>
+      <a:lightRig rig="threePt" dir="t"/>
+    </dgm:scene3d>
+    <dgm:sp3d/>
+    <dgm:txPr/>
+    <dgm:style>
+      <a:lnRef idx="0">
+        <a:scrgbClr r="0" g="0" b="0"/>
+      </a:lnRef>
+      <a:fillRef idx="3">
+        <a:scrgbClr r="0" g="0" b="0"/>
+      </a:fillRef>
+      <a:effectRef idx="2">
+        <a:scrgbClr r="0" g="0" b="0"/>
+      </a:effectRef>
+      <a:fontRef idx="minor">
+        <a:schemeClr val="lt1"/>
+      </a:fontRef>
+    </dgm:style>
+  </dgm:styleLbl>
+  <dgm:styleLbl name="bgSibTrans2D1">
+    <dgm:scene3d>
+      <a:camera prst="orthographicFront"/>
+      <a:lightRig rig="threePt" dir="t"/>
+    </dgm:scene3d>
+    <dgm:sp3d/>
+    <dgm:txPr/>
+    <dgm:style>
+      <a:lnRef idx="0">
+        <a:scrgbClr r="0" g="0" b="0"/>
+      </a:lnRef>
+      <a:fillRef idx="3">
+        <a:scrgbClr r="0" g="0" b="0"/>
+      </a:fillRef>
+      <a:effectRef idx="2">
+        <a:scrgbClr r="0" g="0" b="0"/>
+      </a:effectRef>
+      <a:fontRef idx="minor">
+        <a:schemeClr val="lt1"/>
+      </a:fontRef>
+    </dgm:style>
+  </dgm:styleLbl>
+  <dgm:styleLbl name="sibTrans1D1">
+    <dgm:scene3d>
+      <a:camera prst="orthographicFront"/>
+      <a:lightRig rig="threePt" dir="t"/>
+    </dgm:scene3d>
+    <dgm:sp3d/>
+    <dgm:txPr/>
+    <dgm:style>
+      <a:lnRef idx="1">
+        <a:scrgbClr r="0" g="0" b="0"/>
+      </a:lnRef>
+      <a:fillRef idx="0">
+        <a:scrgbClr r="0" g="0" b="0"/>
+      </a:fillRef>
+      <a:effectRef idx="0">
+        <a:scrgbClr r="0" g="0" b="0"/>
+      </a:effectRef>
+      <a:fontRef idx="minor"/>
+    </dgm:style>
+  </dgm:styleLbl>
+  <dgm:styleLbl name="callout">
+    <dgm:scene3d>
+      <a:camera prst="orthographicFront"/>
+      <a:lightRig rig="threePt" dir="t"/>
+    </dgm:scene3d>
+    <dgm:sp3d/>
+    <dgm:txPr/>
+    <dgm:style>
+      <a:lnRef idx="2">
+        <a:scrgbClr r="0" g="0" b="0"/>
+      </a:lnRef>
+      <a:fillRef idx="1">
+        <a:scrgbClr r="0" g="0" b="0"/>
+      </a:fillRef>
+      <a:effectRef idx="1">
+        <a:scrgbClr r="0" g="0" b="0"/>
+      </a:effectRef>
+      <a:fontRef idx="minor"/>
+    </dgm:style>
+  </dgm:styleLbl>
+  <dgm:styleLbl name="asst0">
+    <dgm:scene3d>
+      <a:camera prst="orthographicFront"/>
+      <a:lightRig rig="threePt" dir="t"/>
+    </dgm:scene3d>
+    <dgm:sp3d/>
+    <dgm:txPr/>
+    <dgm:style>
+      <a:lnRef idx="0">
+        <a:scrgbClr r="0" g="0" b="0"/>
+      </a:lnRef>
+      <a:fillRef idx="3">
+        <a:scrgbClr r="0" g="0" b="0"/>
+      </a:fillRef>
+      <a:effectRef idx="2">
+        <a:scrgbClr r="0" g="0" b="0"/>
+      </a:effectRef>
+      <a:fontRef idx="minor">
+        <a:schemeClr val="lt1"/>
+      </a:fontRef>
+    </dgm:style>
+  </dgm:styleLbl>
+  <dgm:styleLbl name="asst1">
+    <dgm:scene3d>
+      <a:camera prst="orthographicFront"/>
+      <a:lightRig rig="threePt" dir="t"/>
+    </dgm:scene3d>
+    <dgm:sp3d/>
+    <dgm:txPr/>
+    <dgm:style>
+      <a:lnRef idx="0">
+        <a:scrgbClr r="0" g="0" b="0"/>
+      </a:lnRef>
+      <a:fillRef idx="3">
+        <a:scrgbClr r="0" g="0" b="0"/>
+      </a:fillRef>
+      <a:effectRef idx="2">
+        <a:scrgbClr r="0" g="0" b="0"/>
+      </a:effectRef>
+      <a:fontRef idx="minor">
+        <a:schemeClr val="lt1"/>
+      </a:fontRef>
+    </dgm:style>
+  </dgm:styleLbl>
+  <dgm:styleLbl name="asst2">
+    <dgm:scene3d>
+      <a:camera prst="orthographicFront"/>
+      <a:lightRig rig="threePt" dir="t"/>
+    </dgm:scene3d>
+    <dgm:sp3d/>
+    <dgm:txPr/>
+    <dgm:style>
+      <a:lnRef idx="0">
+        <a:scrgbClr r="0" g="0" b="0"/>
+      </a:lnRef>
+      <a:fillRef idx="3">
+        <a:scrgbClr r="0" g="0" b="0"/>
+      </a:fillRef>
+      <a:effectRef idx="2">
+        <a:scrgbClr r="0" g="0" b="0"/>
+      </a:effectRef>
+      <a:fontRef idx="minor">
+        <a:schemeClr val="lt1"/>
+      </a:fontRef>
+    </dgm:style>
+  </dgm:styleLbl>
+  <dgm:styleLbl name="asst3">
+    <dgm:scene3d>
+      <a:camera prst="orthographicFront"/>
+      <a:lightRig rig="threePt" dir="t"/>
+    </dgm:scene3d>
+    <dgm:sp3d/>
+    <dgm:txPr/>
+    <dgm:style>
+      <a:lnRef idx="0">
+        <a:scrgbClr r="0" g="0" b="0"/>
+      </a:lnRef>
+      <a:fillRef idx="3">
+        <a:scrgbClr r="0" g="0" b="0"/>
+      </a:fillRef>
+      <a:effectRef idx="2">
+        <a:scrgbClr r="0" g="0" b="0"/>
+      </a:effectRef>
+      <a:fontRef idx="minor">
+        <a:schemeClr val="lt1"/>
+      </a:fontRef>
+    </dgm:style>
+  </dgm:styleLbl>
+  <dgm:styleLbl name="asst4">
+    <dgm:scene3d>
+      <a:camera prst="orthographicFront"/>
+      <a:lightRig rig="threePt" dir="t"/>
+    </dgm:scene3d>
+    <dgm:sp3d/>
+    <dgm:txPr/>
+    <dgm:style>
+      <a:lnRef idx="0">
+        <a:scrgbClr r="0" g="0" b="0"/>
+      </a:lnRef>
+      <a:fillRef idx="3">
+        <a:scrgbClr r="0" g="0" b="0"/>
+      </a:fillRef>
+      <a:effectRef idx="2">
+        <a:scrgbClr r="0" g="0" b="0"/>
+      </a:effectRef>
+      <a:fontRef idx="minor">
+        <a:schemeClr val="lt1"/>
+      </a:fontRef>
+    </dgm:style>
+  </dgm:styleLbl>
+  <dgm:styleLbl name="parChTrans2D1">
+    <dgm:scene3d>
+      <a:camera prst="orthographicFront"/>
+      <a:lightRig rig="threePt" dir="t"/>
+    </dgm:scene3d>
+    <dgm:sp3d/>
+    <dgm:txPr/>
+    <dgm:style>
+      <a:lnRef idx="0">
+        <a:scrgbClr r="0" g="0" b="0"/>
+      </a:lnRef>
+      <a:fillRef idx="3">
+        <a:scrgbClr r="0" g="0" b="0"/>
+      </a:fillRef>
+      <a:effectRef idx="2">
+        <a:scrgbClr r="0" g="0" b="0"/>
+      </a:effectRef>
+      <a:fontRef idx="minor">
+        <a:schemeClr val="lt1"/>
+      </a:fontRef>
+    </dgm:style>
+  </dgm:styleLbl>
+  <dgm:styleLbl name="parChTrans2D2">
+    <dgm:scene3d>
+      <a:camera prst="orthographicFront"/>
+      <a:lightRig rig="threePt" dir="t"/>
+    </dgm:scene3d>
+    <dgm:sp3d/>
+    <dgm:txPr/>
+    <dgm:style>
+      <a:lnRef idx="0">
+        <a:scrgbClr r="0" g="0" b="0"/>
+      </a:lnRef>
+      <a:fillRef idx="3">
+        <a:scrgbClr r="0" g="0" b="0"/>
+      </a:fillRef>
+      <a:effectRef idx="2">
+        <a:scrgbClr r="0" g="0" b="0"/>
+      </a:effectRef>
+      <a:fontRef idx="minor">
+        <a:schemeClr val="lt1"/>
+      </a:fontRef>
+    </dgm:style>
+  </dgm:styleLbl>
+  <dgm:styleLbl name="parChTrans2D3">
+    <dgm:scene3d>
+      <a:camera prst="orthographicFront"/>
+      <a:lightRig rig="threePt" dir="t"/>
+    </dgm:scene3d>
+    <dgm:sp3d/>
+    <dgm:txPr/>
+    <dgm:style>
+      <a:lnRef idx="1">
+        <a:scrgbClr r="0" g="0" b="0"/>
+      </a:lnRef>
+      <a:fillRef idx="3">
+        <a:scrgbClr r="0" g="0" b="0"/>
+      </a:fillRef>
+      <a:effectRef idx="2">
+        <a:scrgbClr r="0" g="0" b="0"/>
+      </a:effectRef>
+      <a:fontRef idx="minor">
+        <a:schemeClr val="lt1"/>
+      </a:fontRef>
+    </dgm:style>
+  </dgm:styleLbl>
+  <dgm:styleLbl name="parChTrans2D4">
+    <dgm:scene3d>
+      <a:camera prst="orthographicFront"/>
+      <a:lightRig rig="threePt" dir="t"/>
+    </dgm:scene3d>
+    <dgm:sp3d/>
+    <dgm:txPr/>
+    <dgm:style>
+      <a:lnRef idx="1">
+        <a:scrgbClr r="0" g="0" b="0"/>
+      </a:lnRef>
+      <a:fillRef idx="3">
+        <a:scrgbClr r="0" g="0" b="0"/>
+      </a:fillRef>
+      <a:effectRef idx="2">
+        <a:scrgbClr r="0" g="0" b="0"/>
+      </a:effectRef>
+      <a:fontRef idx="minor">
+        <a:schemeClr val="lt1"/>
+      </a:fontRef>
+    </dgm:style>
+  </dgm:styleLbl>
+  <dgm:styleLbl name="parChTrans1D1">
+    <dgm:scene3d>
+      <a:camera prst="orthographicFront"/>
+      <a:lightRig rig="threePt" dir="t"/>
+    </dgm:scene3d>
+    <dgm:sp3d/>
+    <dgm:txPr/>
+    <dgm:style>
+      <a:lnRef idx="1">
+        <a:scrgbClr r="0" g="0" b="0"/>
+      </a:lnRef>
+      <a:fillRef idx="0">
+        <a:scrgbClr r="0" g="0" b="0"/>
+      </a:fillRef>
+      <a:effectRef idx="0">
+        <a:scrgbClr r="0" g="0" b="0"/>
+      </a:effectRef>
+      <a:fontRef idx="minor"/>
+    </dgm:style>
+  </dgm:styleLbl>
+  <dgm:styleLbl name="parChTrans1D2">
+    <dgm:scene3d>
+      <a:camera prst="orthographicFront"/>
+      <a:lightRig rig="threePt" dir="t"/>
+    </dgm:scene3d>
+    <dgm:sp3d/>
+    <dgm:txPr/>
+    <dgm:style>
+      <a:lnRef idx="1">
+        <a:scrgbClr r="0" g="0" b="0"/>
+      </a:lnRef>
+      <a:fillRef idx="0">
+        <a:scrgbClr r="0" g="0" b="0"/>
+      </a:fillRef>
+      <a:effectRef idx="0">
+        <a:scrgbClr r="0" g="0" b="0"/>
+      </a:effectRef>
+      <a:fontRef idx="minor"/>
+    </dgm:style>
+  </dgm:styleLbl>
+  <dgm:styleLbl name="parChTrans1D3">
+    <dgm:scene3d>
+      <a:camera prst="orthographicFront"/>
+      <a:lightRig rig="threePt" dir="t"/>
+    </dgm:scene3d>
+    <dgm:sp3d/>
+    <dgm:txPr/>
+    <dgm:style>
+      <a:lnRef idx="1">
+        <a:scrgbClr r="0" g="0" b="0"/>
+      </a:lnRef>
+      <a:fillRef idx="0">
+        <a:scrgbClr r="0" g="0" b="0"/>
+      </a:fillRef>
+      <a:effectRef idx="0">
+        <a:scrgbClr r="0" g="0" b="0"/>
+      </a:effectRef>
+      <a:fontRef idx="minor"/>
+    </dgm:style>
+  </dgm:styleLbl>
+  <dgm:styleLbl name="parChTrans1D4">
+    <dgm:scene3d>
+      <a:camera prst="orthographicFront"/>
+      <a:lightRig rig="threePt" dir="t"/>
+    </dgm:scene3d>
+    <dgm:sp3d/>
+    <dgm:txPr/>
+    <dgm:style>
+      <a:lnRef idx="1">
+        <a:scrgbClr r="0" g="0" b="0"/>
+      </a:lnRef>
+      <a:fillRef idx="0">
+        <a:scrgbClr r="0" g="0" b="0"/>
+      </a:fillRef>
+      <a:effectRef idx="0">
+        <a:scrgbClr r="0" g="0" b="0"/>
+      </a:effectRef>
+      <a:fontRef idx="minor"/>
+    </dgm:style>
+  </dgm:styleLbl>
+  <dgm:styleLbl name="fgAcc1">
+    <dgm:scene3d>
+      <a:camera prst="orthographicFront"/>
+      <a:lightRig rig="threePt" dir="t"/>
+    </dgm:scene3d>
+    <dgm:sp3d/>
+    <dgm:txPr/>
+    <dgm:style>
+      <a:lnRef idx="1">
+        <a:scrgbClr r="0" g="0" b="0"/>
+      </a:lnRef>
+      <a:fillRef idx="1">
+        <a:scrgbClr r="0" g="0" b="0"/>
+      </a:fillRef>
+      <a:effectRef idx="0">
+        <a:scrgbClr r="0" g="0" b="0"/>
+      </a:effectRef>
+      <a:fontRef idx="minor"/>
+    </dgm:style>
+  </dgm:styleLbl>
+  <dgm:styleLbl name="conFgAcc1">
+    <dgm:scene3d>
+      <a:camera prst="orthographicFront"/>
+      <a:lightRig rig="threePt" dir="t"/>
+    </dgm:scene3d>
+    <dgm:sp3d/>
+    <dgm:txPr/>
+    <dgm:style>
+      <a:lnRef idx="1">
+        <a:scrgbClr r="0" g="0" b="0"/>
+      </a:lnRef>
+      <a:fillRef idx="1">
+        <a:scrgbClr r="0" g="0" b="0"/>
+      </a:fillRef>
+      <a:effectRef idx="0">
+        <a:scrgbClr r="0" g="0" b="0"/>
+      </a:effectRef>
+      <a:fontRef idx="minor"/>
+    </dgm:style>
+  </dgm:styleLbl>
+  <dgm:styleLbl name="alignAcc1">
+    <dgm:scene3d>
+      <a:camera prst="orthographicFront"/>
+      <a:lightRig rig="threePt" dir="t"/>
+    </dgm:scene3d>
+    <dgm:sp3d/>
+    <dgm:txPr/>
+    <dgm:style>
+      <a:lnRef idx="1">
+        <a:scrgbClr r="0" g="0" b="0"/>
+      </a:lnRef>
+      <a:fillRef idx="1">
+        <a:scrgbClr r="0" g="0" b="0"/>
+      </a:fillRef>
+      <a:effectRef idx="0">
+        <a:scrgbClr r="0" g="0" b="0"/>
+      </a:effectRef>
+      <a:fontRef idx="minor"/>
+    </dgm:style>
+  </dgm:styleLbl>
+  <dgm:styleLbl name="trAlignAcc1">
+    <dgm:scene3d>
+      <a:camera prst="orthographicFront"/>
+      <a:lightRig rig="threePt" dir="t"/>
+    </dgm:scene3d>
+    <dgm:sp3d/>
+    <dgm:txPr/>
+    <dgm:style>
+      <a:lnRef idx="1">
+        <a:scrgbClr r="0" g="0" b="0"/>
+      </a:lnRef>
+      <a:fillRef idx="1">
+        <a:scrgbClr r="0" g="0" b="0"/>
+      </a:fillRef>
+      <a:effectRef idx="0">
+        <a:scrgbClr r="0" g="0" b="0"/>
+      </a:effectRef>
+      <a:fontRef idx="minor"/>
+    </dgm:style>
+  </dgm:styleLbl>
+  <dgm:styleLbl name="bgAcc1">
+    <dgm:scene3d>
+      <a:camera prst="orthographicFront"/>
+      <a:lightRig rig="threePt" dir="t"/>
+    </dgm:scene3d>
+    <dgm:sp3d/>
+    <dgm:txPr/>
+    <dgm:style>
+      <a:lnRef idx="1">
+        <a:scrgbClr r="0" g="0" b="0"/>
+      </a:lnRef>
+      <a:fillRef idx="1">
+        <a:scrgbClr r="0" g="0" b="0"/>
+      </a:fillRef>
+      <a:effectRef idx="0">
+        <a:scrgbClr r="0" g="0" b="0"/>
+      </a:effectRef>
+      <a:fontRef idx="minor"/>
+    </dgm:style>
+  </dgm:styleLbl>
+  <dgm:styleLbl name="solidFgAcc1">
+    <dgm:scene3d>
+      <a:camera prst="orthographicFront"/>
+      <a:lightRig rig="threePt" dir="t"/>
+    </dgm:scene3d>
+    <dgm:sp3d/>
+    <dgm:txPr/>
+    <dgm:style>
+      <a:lnRef idx="1">
+        <a:scrgbClr r="0" g="0" b="0"/>
+      </a:lnRef>
+      <a:fillRef idx="1">
+        <a:scrgbClr r="0" g="0" b="0"/>
+      </a:fillRef>
+      <a:effectRef idx="0">
+        <a:scrgbClr r="0" g="0" b="0"/>
+      </a:effectRef>
+      <a:fontRef idx="minor"/>
+    </dgm:style>
+  </dgm:styleLbl>
+  <dgm:styleLbl name="solidAlignAcc1">
+    <dgm:scene3d>
+      <a:camera prst="orthographicFront"/>
+      <a:lightRig rig="threePt" dir="t"/>
+    </dgm:scene3d>
+    <dgm:sp3d/>
+    <dgm:txPr/>
+    <dgm:style>
+      <a:lnRef idx="1">
+        <a:scrgbClr r="0" g="0" b="0"/>
+      </a:lnRef>
+      <a:fillRef idx="1">
+        <a:scrgbClr r="0" g="0" b="0"/>
+      </a:fillRef>
+      <a:effectRef idx="0">
+        <a:scrgbClr r="0" g="0" b="0"/>
+      </a:effectRef>
+      <a:fontRef idx="minor"/>
+    </dgm:style>
+  </dgm:styleLbl>
+  <dgm:styleLbl name="solidBgAcc1">
+    <dgm:scene3d>
+      <a:camera prst="orthographicFront"/>
+      <a:lightRig rig="threePt" dir="t"/>
+    </dgm:scene3d>
+    <dgm:sp3d/>
+    <dgm:txPr/>
+    <dgm:style>
+      <a:lnRef idx="1">
+        <a:scrgbClr r="0" g="0" b="0"/>
+      </a:lnRef>
+      <a:fillRef idx="1">
+        <a:scrgbClr r="0" g="0" b="0"/>
+      </a:fillRef>
+      <a:effectRef idx="0">
+        <a:scrgbClr r="0" g="0" b="0"/>
+      </a:effectRef>
+      <a:fontRef idx="minor"/>
+    </dgm:style>
+  </dgm:styleLbl>
+  <dgm:styleLbl name="fgAccFollowNode1">
+    <dgm:scene3d>
+      <a:camera prst="orthographicFront"/>
+      <a:lightRig rig="threePt" dir="t"/>
+    </dgm:scene3d>
+    <dgm:sp3d/>
+    <dgm:txPr/>
+    <dgm:style>
+      <a:lnRef idx="1">
+        <a:scrgbClr r="0" g="0" b="0"/>
+      </a:lnRef>
+      <a:fillRef idx="1">
+        <a:scrgbClr r="0" g="0" b="0"/>
+      </a:fillRef>
+      <a:effectRef idx="0">
+        <a:scrgbClr r="0" g="0" b="0"/>
+      </a:effectRef>
+      <a:fontRef idx="minor"/>
+    </dgm:style>
+  </dgm:styleLbl>
+  <dgm:styleLbl name="alignAccFollowNode1">
+    <dgm:scene3d>
+      <a:camera prst="orthographicFront"/>
+      <a:lightRig rig="threePt" dir="t"/>
+    </dgm:scene3d>
+    <dgm:sp3d/>
+    <dgm:txPr/>
+    <dgm:style>
+      <a:lnRef idx="1">
+        <a:scrgbClr r="0" g="0" b="0"/>
+      </a:lnRef>
+      <a:fillRef idx="1">
+        <a:scrgbClr r="0" g="0" b="0"/>
+      </a:fillRef>
+      <a:effectRef idx="0">
+        <a:scrgbClr r="0" g="0" b="0"/>
+      </a:effectRef>
+      <a:fontRef idx="minor"/>
+    </dgm:style>
+  </dgm:styleLbl>
+  <dgm:styleLbl name="bgAccFollowNode1">
+    <dgm:scene3d>
+      <a:camera prst="orthographicFront"/>
+      <a:lightRig rig="threePt" dir="t"/>
+    </dgm:scene3d>
+    <dgm:sp3d/>
+    <dgm:txPr/>
+    <dgm:style>
+      <a:lnRef idx="1">
+        <a:scrgbClr r="0" g="0" b="0"/>
+      </a:lnRef>
+      <a:fillRef idx="1">
+        <a:scrgbClr r="0" g="0" b="0"/>
+      </a:fillRef>
+      <a:effectRef idx="0">
+        <a:scrgbClr r="0" g="0" b="0"/>
+      </a:effectRef>
+      <a:fontRef idx="minor"/>
+    </dgm:style>
+  </dgm:styleLbl>
+  <dgm:styleLbl name="fgAcc0">
+    <dgm:scene3d>
+      <a:camera prst="orthographicFront"/>
+      <a:lightRig rig="threePt" dir="t"/>
+    </dgm:scene3d>
+    <dgm:sp3d/>
+    <dgm:txPr/>
+    <dgm:style>
+      <a:lnRef idx="1">
+        <a:scrgbClr r="0" g="0" b="0"/>
+      </a:lnRef>
+      <a:fillRef idx="1">
+        <a:scrgbClr r="0" g="0" b="0"/>
+      </a:fillRef>
+      <a:effectRef idx="0">
+        <a:scrgbClr r="0" g="0" b="0"/>
+      </a:effectRef>
+      <a:fontRef idx="minor"/>
+    </dgm:style>
+  </dgm:styleLbl>
+  <dgm:styleLbl name="fgAcc2">
+    <dgm:scene3d>
+      <a:camera prst="orthographicFront"/>
+      <a:lightRig rig="threePt" dir="t"/>
+    </dgm:scene3d>
+    <dgm:sp3d/>
+    <dgm:txPr/>
+    <dgm:style>
+      <a:lnRef idx="1">
+        <a:scrgbClr r="0" g="0" b="0"/>
+      </a:lnRef>
+      <a:fillRef idx="1">
+        <a:scrgbClr r="0" g="0" b="0"/>
+      </a:fillRef>
+      <a:effectRef idx="0">
+        <a:scrgbClr r="0" g="0" b="0"/>
+      </a:effectRef>
+      <a:fontRef idx="minor"/>
+    </dgm:style>
+  </dgm:styleLbl>
+  <dgm:styleLbl name="fgAcc3">
+    <dgm:scene3d>
+      <a:camera prst="orthographicFront"/>
+      <a:lightRig rig="threePt" dir="t"/>
+    </dgm:scene3d>
+    <dgm:sp3d/>
+    <dgm:txPr/>
+    <dgm:style>
+      <a:lnRef idx="1">
+        <a:scrgbClr r="0" g="0" b="0"/>
+      </a:lnRef>
+      <a:fillRef idx="1">
+        <a:scrgbClr r="0" g="0" b="0"/>
+      </a:fillRef>
+      <a:effectRef idx="0">
+        <a:scrgbClr r="0" g="0" b="0"/>
+      </a:effectRef>
+      <a:fontRef idx="minor"/>
+    </dgm:style>
+  </dgm:styleLbl>
+  <dgm:styleLbl name="fgAcc4">
+    <dgm:scene3d>
+      <a:camera prst="orthographicFront"/>
+      <a:lightRig rig="threePt" dir="t"/>
+    </dgm:scene3d>
+    <dgm:sp3d/>
+    <dgm:txPr/>
+    <dgm:style>
+      <a:lnRef idx="1">
+        <a:scrgbClr r="0" g="0" b="0"/>
+      </a:lnRef>
+      <a:fillRef idx="1">
+        <a:scrgbClr r="0" g="0" b="0"/>
+      </a:fillRef>
+      <a:effectRef idx="0">
+        <a:scrgbClr r="0" g="0" b="0"/>
+      </a:effectRef>
+      <a:fontRef idx="minor"/>
+    </dgm:style>
+  </dgm:styleLbl>
+  <dgm:styleLbl name="bgShp">
+    <dgm:scene3d>
+      <a:camera prst="orthographicFront"/>
+      <a:lightRig rig="threePt" dir="t"/>
+    </dgm:scene3d>
+    <dgm:sp3d/>
+    <dgm:txPr/>
+    <dgm:style>
+      <a:lnRef idx="0">
+        <a:scrgbClr r="0" g="0" b="0"/>
+      </a:lnRef>
+      <a:fillRef idx="1">
+        <a:scrgbClr r="0" g="0" b="0"/>
+      </a:fillRef>
+      <a:effectRef idx="2">
+        <a:scrgbClr r="0" g="0" b="0"/>
+      </a:effectRef>
+      <a:fontRef idx="minor"/>
+    </dgm:style>
+  </dgm:styleLbl>
+  <dgm:styleLbl name="dkBgShp">
+    <dgm:scene3d>
+      <a:camera prst="orthographicFront"/>
+      <a:lightRig rig="threePt" dir="t"/>
+    </dgm:scene3d>
+    <dgm:sp3d/>
+    <dgm:txPr/>
+    <dgm:style>
+      <a:lnRef idx="0">
+        <a:scrgbClr r="0" g="0" b="0"/>
+      </a:lnRef>
+      <a:fillRef idx="1">
+        <a:scrgbClr r="0" g="0" b="0"/>
+      </a:fillRef>
+      <a:effectRef idx="2">
+        <a:scrgbClr r="0" g="0" b="0"/>
+      </a:effectRef>
+      <a:fontRef idx="minor"/>
+    </dgm:style>
+  </dgm:styleLbl>
+  <dgm:styleLbl name="trBgShp">
+    <dgm:scene3d>
+      <a:camera prst="orthographicFront"/>
+      <a:lightRig rig="threePt" dir="t"/>
+    </dgm:scene3d>
+    <dgm:sp3d/>
+    <dgm:txPr/>
+    <dgm:style>
+      <a:lnRef idx="0">
+        <a:scrgbClr r="0" g="0" b="0"/>
+      </a:lnRef>
+      <a:fillRef idx="1">
+        <a:scrgbClr r="0" g="0" b="0"/>
+      </a:fillRef>
+      <a:effectRef idx="0">
+        <a:scrgbClr r="0" g="0" b="0"/>
+      </a:effectRef>
+      <a:fontRef idx="minor"/>
+    </dgm:style>
+  </dgm:styleLbl>
+  <dgm:styleLbl name="fgShp">
+    <dgm:scene3d>
+      <a:camera prst="orthographicFront"/>
+      <a:lightRig rig="threePt" dir="t"/>
+    </dgm:scene3d>
+    <dgm:sp3d/>
+    <dgm:txPr/>
+    <dgm:style>
+      <a:lnRef idx="0">
+        <a:scrgbClr r="0" g="0" b="0"/>
+      </a:lnRef>
+      <a:fillRef idx="3">
+        <a:scrgbClr r="0" g="0" b="0"/>
+      </a:fillRef>
+      <a:effectRef idx="2">
+        <a:scrgbClr r="0" g="0" b="0"/>
+      </a:effectRef>
+      <a:fontRef idx="minor"/>
+    </dgm:style>
+  </dgm:styleLbl>
+  <dgm:styleLbl name="revTx">
+    <dgm:scene3d>
+      <a:camera prst="orthographicFront"/>
+      <a:lightRig rig="threePt" dir="t"/>
+    </dgm:scene3d>
+    <dgm:sp3d/>
+    <dgm:txPr/>
+    <dgm:style>
+      <a:lnRef idx="0">
+        <a:scrgbClr r="0" g="0" b="0"/>
+      </a:lnRef>
+      <a:fillRef idx="0">
+        <a:scrgbClr r="0" g="0" b="0"/>
+      </a:fillRef>
+      <a:effectRef idx="0">
+        <a:scrgbClr r="0" g="0" b="0"/>
+      </a:effectRef>
+      <a:fontRef idx="minor"/>
+    </dgm:style>
+  </dgm:styleLbl>
+</dgm:styleDef>
+</file>
+
+<file path=ppt/diagrams/quickStyle4.xml><?xml version="1.0" encoding="utf-8"?>
 <dgm:styleDef xmlns:dgm="http://schemas.openxmlformats.org/drawingml/2006/diagram" xmlns:a="http://schemas.openxmlformats.org/drawingml/2006/main" uniqueId="urn:microsoft.com/office/officeart/2005/8/quickstyle/simple4">
   <dgm:title val=""/>
   <dgm:desc val=""/>
@@ -8889,6 +11570,368 @@
     <p:extLst>
       <p:ext uri="{BB962C8B-B14F-4D97-AF65-F5344CB8AC3E}">
         <p14:creationId xmlns:p14="http://schemas.microsoft.com/office/powerpoint/2010/main" val="4137077791"/>
+      </p:ext>
+    </p:extLst>
+  </p:cSld>
+  <p:clrMapOvr>
+    <a:masterClrMapping/>
+  </p:clrMapOvr>
+</p:notes>
+</file>
+
+<file path=ppt/notesSlides/notesSlide6.xml><?xml version="1.0" encoding="utf-8"?>
+<p:notes xmlns:a="http://schemas.openxmlformats.org/drawingml/2006/main" xmlns:r="http://schemas.openxmlformats.org/officeDocument/2006/relationships" xmlns:p="http://schemas.openxmlformats.org/presentationml/2006/main">
+  <p:cSld>
+    <p:spTree>
+      <p:nvGrpSpPr>
+        <p:cNvPr id="1" name=""/>
+        <p:cNvGrpSpPr/>
+        <p:nvPr/>
+      </p:nvGrpSpPr>
+      <p:grpSpPr>
+        <a:xfrm>
+          <a:off x="0" y="0"/>
+          <a:ext cx="0" cy="0"/>
+          <a:chOff x="0" y="0"/>
+          <a:chExt cx="0" cy="0"/>
+        </a:xfrm>
+      </p:grpSpPr>
+      <p:sp>
+        <p:nvSpPr>
+          <p:cNvPr id="2" name="Slide Image Placeholder 1"/>
+          <p:cNvSpPr>
+            <a:spLocks noGrp="1" noRot="1" noChangeAspect="1"/>
+          </p:cNvSpPr>
+          <p:nvPr>
+            <p:ph type="sldImg"/>
+          </p:nvPr>
+        </p:nvSpPr>
+        <p:spPr/>
+      </p:sp>
+      <p:sp>
+        <p:nvSpPr>
+          <p:cNvPr id="3" name="Notes Placeholder 2"/>
+          <p:cNvSpPr>
+            <a:spLocks noGrp="1"/>
+          </p:cNvSpPr>
+          <p:nvPr>
+            <p:ph type="body" idx="1"/>
+          </p:nvPr>
+        </p:nvSpPr>
+        <p:spPr/>
+        <p:txBody>
+          <a:bodyPr>
+            <a:normAutofit/>
+          </a:bodyPr>
+          <a:lstStyle/>
+          <a:p>
+            <a:pPr lvl="1"/>
+            <a:r>
+              <a:rPr lang="en-US" dirty="0"/>
+              <a:t>Designing</a:t>
+            </a:r>
+          </a:p>
+          <a:p>
+            <a:pPr lvl="2"/>
+            <a:r>
+              <a:rPr lang="en-US" dirty="0"/>
+              <a:t>Sensitive:  accurately identifies problem and characterizes the problem</a:t>
+            </a:r>
+          </a:p>
+          <a:p>
+            <a:pPr lvl="2"/>
+            <a:r>
+              <a:rPr lang="en-US" dirty="0"/>
+              <a:t>Comprehensive: characterizes the problem on diverse aspects of the person’s life and skills, including how the problem affects </a:t>
+            </a:r>
+            <a:r>
+              <a:rPr lang="en-US" dirty="0" err="1"/>
+              <a:t>daiily</a:t>
+            </a:r>
+            <a:r>
+              <a:rPr lang="en-US" dirty="0"/>
+              <a:t> living activities at home, school, and work</a:t>
+            </a:r>
+          </a:p>
+          <a:p>
+            <a:pPr lvl="2"/>
+            <a:r>
+              <a:rPr lang="en-US" dirty="0"/>
+              <a:t>Non-biased:  performance regardless of race, ethnicity, gender, SES, culture or language</a:t>
+            </a:r>
+          </a:p>
+          <a:p>
+            <a:pPr lvl="2"/>
+            <a:r>
+              <a:rPr lang="en-US" dirty="0"/>
+              <a:t>Family-centered</a:t>
+            </a:r>
+          </a:p>
+          <a:p>
+            <a:endParaRPr lang="en-US" dirty="0"/>
+          </a:p>
+        </p:txBody>
+      </p:sp>
+      <p:sp>
+        <p:nvSpPr>
+          <p:cNvPr id="4" name="Slide Number Placeholder 3"/>
+          <p:cNvSpPr>
+            <a:spLocks noGrp="1"/>
+          </p:cNvSpPr>
+          <p:nvPr>
+            <p:ph type="sldNum" sz="quarter" idx="10"/>
+          </p:nvPr>
+        </p:nvSpPr>
+        <p:spPr/>
+        <p:txBody>
+          <a:bodyPr/>
+          <a:lstStyle/>
+          <a:p>
+            <a:fld id="{2CF9A2DE-64BF-6643-B328-F1620775E56E}" type="slidenum">
+              <a:rPr lang="en-US" smtClean="0"/>
+              <a:pPr/>
+              <a:t>18</a:t>
+            </a:fld>
+            <a:endParaRPr lang="en-US"/>
+          </a:p>
+        </p:txBody>
+      </p:sp>
+    </p:spTree>
+    <p:extLst>
+      <p:ext uri="{BB962C8B-B14F-4D97-AF65-F5344CB8AC3E}">
+        <p14:creationId xmlns:p14="http://schemas.microsoft.com/office/powerpoint/2010/main" val="1110514635"/>
+      </p:ext>
+    </p:extLst>
+  </p:cSld>
+  <p:clrMapOvr>
+    <a:masterClrMapping/>
+  </p:clrMapOvr>
+</p:notes>
+</file>
+
+<file path=ppt/notesSlides/notesSlide7.xml><?xml version="1.0" encoding="utf-8"?>
+<p:notes xmlns:a="http://schemas.openxmlformats.org/drawingml/2006/main" xmlns:r="http://schemas.openxmlformats.org/officeDocument/2006/relationships" xmlns:p="http://schemas.openxmlformats.org/presentationml/2006/main">
+  <p:cSld>
+    <p:spTree>
+      <p:nvGrpSpPr>
+        <p:cNvPr id="1" name=""/>
+        <p:cNvGrpSpPr/>
+        <p:nvPr/>
+      </p:nvGrpSpPr>
+      <p:grpSpPr>
+        <a:xfrm>
+          <a:off x="0" y="0"/>
+          <a:ext cx="0" cy="0"/>
+          <a:chOff x="0" y="0"/>
+          <a:chExt cx="0" cy="0"/>
+        </a:xfrm>
+      </p:grpSpPr>
+      <p:sp>
+        <p:nvSpPr>
+          <p:cNvPr id="2" name="Slide Image Placeholder 1"/>
+          <p:cNvSpPr>
+            <a:spLocks noGrp="1" noRot="1" noChangeAspect="1"/>
+          </p:cNvSpPr>
+          <p:nvPr>
+            <p:ph type="sldImg"/>
+          </p:nvPr>
+        </p:nvSpPr>
+        <p:spPr/>
+      </p:sp>
+      <p:sp>
+        <p:nvSpPr>
+          <p:cNvPr id="3" name="Notes Placeholder 2"/>
+          <p:cNvSpPr>
+            <a:spLocks noGrp="1"/>
+          </p:cNvSpPr>
+          <p:nvPr>
+            <p:ph type="body" idx="1"/>
+          </p:nvPr>
+        </p:nvSpPr>
+        <p:spPr/>
+        <p:txBody>
+          <a:bodyPr/>
+          <a:lstStyle/>
+          <a:p>
+            <a:r>
+              <a:rPr lang="en-US" dirty="0"/>
+              <a:t>Differential Diagnosis: </a:t>
+            </a:r>
+            <a:r>
+              <a:rPr lang="en-US" sz="1200" b="0" i="0" kern="1200" dirty="0">
+                <a:solidFill>
+                  <a:schemeClr val="tx1"/>
+                </a:solidFill>
+                <a:effectLst/>
+                <a:latin typeface="+mn-lt"/>
+                <a:ea typeface="+mn-ea"/>
+                <a:cs typeface="+mn-cs"/>
+              </a:rPr>
+              <a:t>the process of differentiating between two or more conditions which share similar signs or symptoms.</a:t>
+            </a:r>
+          </a:p>
+          <a:p>
+            <a:pPr marL="0" marR="0" lvl="0" indent="0" algn="l" defTabSz="457200" rtl="0" eaLnBrk="1" fontAlgn="auto" latinLnBrk="0" hangingPunct="1">
+              <a:lnSpc>
+                <a:spcPct val="100000"/>
+              </a:lnSpc>
+              <a:spcBef>
+                <a:spcPts val="0"/>
+              </a:spcBef>
+              <a:spcAft>
+                <a:spcPts val="0"/>
+              </a:spcAft>
+              <a:buClrTx/>
+              <a:buSzTx/>
+              <a:buFontTx/>
+              <a:buNone/>
+              <a:tabLst/>
+              <a:defRPr/>
+            </a:pPr>
+            <a:r>
+              <a:rPr lang="en-US" sz="1200" b="0" i="0" kern="1200" dirty="0">
+                <a:solidFill>
+                  <a:schemeClr val="tx1"/>
+                </a:solidFill>
+                <a:effectLst/>
+                <a:latin typeface="+mn-lt"/>
+                <a:ea typeface="+mn-ea"/>
+                <a:cs typeface="+mn-cs"/>
+              </a:rPr>
+              <a:t>Eligibility:  </a:t>
+            </a:r>
+            <a:r>
+              <a:rPr lang="en-US" sz="1200" kern="1200" dirty="0">
+                <a:solidFill>
+                  <a:schemeClr val="tx1"/>
+                </a:solidFill>
+                <a:effectLst/>
+                <a:latin typeface="+mn-lt"/>
+                <a:ea typeface="+mn-ea"/>
+                <a:cs typeface="+mn-cs"/>
+              </a:rPr>
+              <a:t>Meets regulations/rules/professional standard for services.  In schools, having a speech-language delay or difference doesn’t ensure eligibility.</a:t>
+            </a:r>
+          </a:p>
+          <a:p>
+            <a:endParaRPr lang="en-US" dirty="0"/>
+          </a:p>
+        </p:txBody>
+      </p:sp>
+      <p:sp>
+        <p:nvSpPr>
+          <p:cNvPr id="4" name="Slide Number Placeholder 3"/>
+          <p:cNvSpPr>
+            <a:spLocks noGrp="1"/>
+          </p:cNvSpPr>
+          <p:nvPr>
+            <p:ph type="sldNum" sz="quarter" idx="5"/>
+          </p:nvPr>
+        </p:nvSpPr>
+        <p:spPr/>
+        <p:txBody>
+          <a:bodyPr/>
+          <a:lstStyle/>
+          <a:p>
+            <a:fld id="{AA0A589D-B577-494C-AEB5-A5D4F1908003}" type="slidenum">
+              <a:rPr lang="en-US" smtClean="0"/>
+              <a:t>19</a:t>
+            </a:fld>
+            <a:endParaRPr lang="en-US"/>
+          </a:p>
+        </p:txBody>
+      </p:sp>
+    </p:spTree>
+    <p:extLst>
+      <p:ext uri="{BB962C8B-B14F-4D97-AF65-F5344CB8AC3E}">
+        <p14:creationId xmlns:p14="http://schemas.microsoft.com/office/powerpoint/2010/main" val="3704931728"/>
+      </p:ext>
+    </p:extLst>
+  </p:cSld>
+  <p:clrMapOvr>
+    <a:masterClrMapping/>
+  </p:clrMapOvr>
+</p:notes>
+</file>
+
+<file path=ppt/notesSlides/notesSlide8.xml><?xml version="1.0" encoding="utf-8"?>
+<p:notes xmlns:a="http://schemas.openxmlformats.org/drawingml/2006/main" xmlns:r="http://schemas.openxmlformats.org/officeDocument/2006/relationships" xmlns:p="http://schemas.openxmlformats.org/presentationml/2006/main">
+  <p:cSld>
+    <p:spTree>
+      <p:nvGrpSpPr>
+        <p:cNvPr id="1" name=""/>
+        <p:cNvGrpSpPr/>
+        <p:nvPr/>
+      </p:nvGrpSpPr>
+      <p:grpSpPr>
+        <a:xfrm>
+          <a:off x="0" y="0"/>
+          <a:ext cx="0" cy="0"/>
+          <a:chOff x="0" y="0"/>
+          <a:chExt cx="0" cy="0"/>
+        </a:xfrm>
+      </p:grpSpPr>
+      <p:sp>
+        <p:nvSpPr>
+          <p:cNvPr id="2" name="Slide Image Placeholder 1"/>
+          <p:cNvSpPr>
+            <a:spLocks noGrp="1" noRot="1" noChangeAspect="1"/>
+          </p:cNvSpPr>
+          <p:nvPr>
+            <p:ph type="sldImg"/>
+          </p:nvPr>
+        </p:nvSpPr>
+        <p:spPr/>
+      </p:sp>
+      <p:sp>
+        <p:nvSpPr>
+          <p:cNvPr id="3" name="Notes Placeholder 2"/>
+          <p:cNvSpPr>
+            <a:spLocks noGrp="1"/>
+          </p:cNvSpPr>
+          <p:nvPr>
+            <p:ph type="body" idx="1"/>
+          </p:nvPr>
+        </p:nvSpPr>
+        <p:spPr/>
+        <p:txBody>
+          <a:bodyPr/>
+          <a:lstStyle/>
+          <a:p>
+            <a:r>
+              <a:rPr lang="en-US" dirty="0"/>
+              <a:t>Large group activity</a:t>
+            </a:r>
+          </a:p>
+        </p:txBody>
+      </p:sp>
+      <p:sp>
+        <p:nvSpPr>
+          <p:cNvPr id="4" name="Slide Number Placeholder 3"/>
+          <p:cNvSpPr>
+            <a:spLocks noGrp="1"/>
+          </p:cNvSpPr>
+          <p:nvPr>
+            <p:ph type="sldNum" sz="quarter" idx="10"/>
+          </p:nvPr>
+        </p:nvSpPr>
+        <p:spPr/>
+        <p:txBody>
+          <a:bodyPr/>
+          <a:lstStyle/>
+          <a:p>
+            <a:fld id="{AA0A589D-B577-494C-AEB5-A5D4F1908003}" type="slidenum">
+              <a:rPr lang="en-US" smtClean="0"/>
+              <a:t>20</a:t>
+            </a:fld>
+            <a:endParaRPr lang="en-US"/>
+          </a:p>
+        </p:txBody>
+      </p:sp>
+    </p:spTree>
+    <p:extLst>
+      <p:ext uri="{BB962C8B-B14F-4D97-AF65-F5344CB8AC3E}">
+        <p14:creationId xmlns:p14="http://schemas.microsoft.com/office/powerpoint/2010/main" val="1112789848"/>
       </p:ext>
     </p:extLst>
   </p:cSld>
@@ -15723,6 +18766,478 @@
 </p:sld>
 </file>
 
+<file path=ppt/slides/slide17.xml><?xml version="1.0" encoding="utf-8"?>
+<p:sld xmlns:a="http://schemas.openxmlformats.org/drawingml/2006/main" xmlns:r="http://schemas.openxmlformats.org/officeDocument/2006/relationships" xmlns:p="http://schemas.openxmlformats.org/presentationml/2006/main">
+  <p:cSld>
+    <p:spTree>
+      <p:nvGrpSpPr>
+        <p:cNvPr id="1" name=""/>
+        <p:cNvGrpSpPr/>
+        <p:nvPr/>
+      </p:nvGrpSpPr>
+      <p:grpSpPr>
+        <a:xfrm>
+          <a:off x="0" y="0"/>
+          <a:ext cx="0" cy="0"/>
+          <a:chOff x="0" y="0"/>
+          <a:chExt cx="0" cy="0"/>
+        </a:xfrm>
+      </p:grpSpPr>
+      <p:sp>
+        <p:nvSpPr>
+          <p:cNvPr id="2" name="Title 1"/>
+          <p:cNvSpPr>
+            <a:spLocks noGrp="1"/>
+          </p:cNvSpPr>
+          <p:nvPr>
+            <p:ph type="title"/>
+          </p:nvPr>
+        </p:nvSpPr>
+        <p:spPr/>
+        <p:txBody>
+          <a:bodyPr/>
+          <a:lstStyle/>
+          <a:p>
+            <a:r>
+              <a:rPr lang="en-US" dirty="0">
+                <a:latin typeface="Copperplate Gothic Light" charset="0"/>
+                <a:ea typeface="Copperplate Gothic Light" charset="0"/>
+                <a:cs typeface="Copperplate Gothic Light" charset="0"/>
+              </a:rPr>
+              <a:t>Initial Assessment</a:t>
+            </a:r>
+            <a:r>
+              <a:rPr lang="en-US" dirty="0"/>
+              <a:t> Process</a:t>
+            </a:r>
+          </a:p>
+        </p:txBody>
+      </p:sp>
+      <p:graphicFrame>
+        <p:nvGraphicFramePr>
+          <p:cNvPr id="5" name="Content Placeholder 4"/>
+          <p:cNvGraphicFramePr>
+            <a:graphicFrameLocks noGrp="1"/>
+          </p:cNvGraphicFramePr>
+          <p:nvPr>
+            <p:ph idx="1"/>
+          </p:nvPr>
+        </p:nvGraphicFramePr>
+        <p:xfrm>
+          <a:off x="2394785" y="1825625"/>
+          <a:ext cx="7675562" cy="4351338"/>
+        </p:xfrm>
+        <a:graphic>
+          <a:graphicData uri="http://schemas.openxmlformats.org/drawingml/2006/diagram">
+            <dgm:relIds xmlns:dgm="http://schemas.openxmlformats.org/drawingml/2006/diagram" xmlns:r="http://schemas.openxmlformats.org/officeDocument/2006/relationships" r:dm="rId2" r:lo="rId3" r:qs="rId4" r:cs="rId5"/>
+          </a:graphicData>
+        </a:graphic>
+      </p:graphicFrame>
+    </p:spTree>
+    <p:extLst>
+      <p:ext uri="{BB962C8B-B14F-4D97-AF65-F5344CB8AC3E}">
+        <p14:creationId xmlns:p14="http://schemas.microsoft.com/office/powerpoint/2010/main" val="2029371638"/>
+      </p:ext>
+    </p:extLst>
+  </p:cSld>
+  <p:clrMapOvr>
+    <a:masterClrMapping/>
+  </p:clrMapOvr>
+</p:sld>
+</file>
+
+<file path=ppt/slides/slide18.xml><?xml version="1.0" encoding="utf-8"?>
+<p:sld xmlns:a="http://schemas.openxmlformats.org/drawingml/2006/main" xmlns:r="http://schemas.openxmlformats.org/officeDocument/2006/relationships" xmlns:p="http://schemas.openxmlformats.org/presentationml/2006/main">
+  <p:cSld>
+    <p:spTree>
+      <p:nvGrpSpPr>
+        <p:cNvPr id="1" name=""/>
+        <p:cNvGrpSpPr/>
+        <p:nvPr/>
+      </p:nvGrpSpPr>
+      <p:grpSpPr>
+        <a:xfrm>
+          <a:off x="0" y="0"/>
+          <a:ext cx="0" cy="0"/>
+          <a:chOff x="0" y="0"/>
+          <a:chExt cx="0" cy="0"/>
+        </a:xfrm>
+      </p:grpSpPr>
+      <p:sp>
+        <p:nvSpPr>
+          <p:cNvPr id="2" name="Title 1"/>
+          <p:cNvSpPr>
+            <a:spLocks noGrp="1"/>
+          </p:cNvSpPr>
+          <p:nvPr>
+            <p:ph type="title"/>
+          </p:nvPr>
+        </p:nvSpPr>
+        <p:spPr>
+          <a:xfrm>
+            <a:off x="2035444" y="274638"/>
+            <a:ext cx="8338088" cy="1339009"/>
+          </a:xfrm>
+        </p:spPr>
+        <p:txBody>
+          <a:bodyPr>
+            <a:normAutofit/>
+          </a:bodyPr>
+          <a:lstStyle/>
+          <a:p>
+            <a:r>
+              <a:rPr lang="en-US" dirty="0">
+                <a:latin typeface="Copperplate Gothic Light" charset="0"/>
+                <a:ea typeface="Copperplate Gothic Light" charset="0"/>
+                <a:cs typeface="Copperplate Gothic Light" charset="0"/>
+              </a:rPr>
+              <a:t>Designing and Administering Assessment</a:t>
+            </a:r>
+            <a:endParaRPr lang="en-US" dirty="0"/>
+          </a:p>
+        </p:txBody>
+      </p:sp>
+      <p:sp>
+        <p:nvSpPr>
+          <p:cNvPr id="3" name="Content Placeholder 2"/>
+          <p:cNvSpPr>
+            <a:spLocks noGrp="1"/>
+          </p:cNvSpPr>
+          <p:nvPr>
+            <p:ph idx="1"/>
+          </p:nvPr>
+        </p:nvSpPr>
+        <p:spPr/>
+        <p:txBody>
+          <a:bodyPr>
+            <a:normAutofit/>
+          </a:bodyPr>
+          <a:lstStyle/>
+          <a:p>
+            <a:pPr marL="0" indent="0">
+              <a:buNone/>
+            </a:pPr>
+            <a:r>
+              <a:rPr lang="en-US" sz="2400" dirty="0">
+                <a:latin typeface="Garamond" charset="0"/>
+                <a:ea typeface="Garamond" charset="0"/>
+                <a:cs typeface="Garamond" charset="0"/>
+              </a:rPr>
+              <a:t>General rules to remember</a:t>
+            </a:r>
+            <a:r>
+              <a:rPr lang="is-IS" sz="2400" dirty="0">
+                <a:latin typeface="Garamond" charset="0"/>
+                <a:ea typeface="Garamond" charset="0"/>
+                <a:cs typeface="Garamond" charset="0"/>
+              </a:rPr>
+              <a:t>…</a:t>
+            </a:r>
+            <a:r>
+              <a:rPr lang="en-US" sz="2400" dirty="0">
+                <a:latin typeface="Garamond" charset="0"/>
+                <a:ea typeface="Garamond" charset="0"/>
+                <a:cs typeface="Garamond" charset="0"/>
+              </a:rPr>
+              <a:t>assessments should be designed to be</a:t>
+            </a:r>
+          </a:p>
+          <a:p>
+            <a:pPr lvl="2"/>
+            <a:r>
+              <a:rPr lang="en-US" sz="2400" dirty="0">
+                <a:latin typeface="Garamond" charset="0"/>
+                <a:ea typeface="Garamond" charset="0"/>
+                <a:cs typeface="Garamond" charset="0"/>
+              </a:rPr>
+              <a:t>Sensitive</a:t>
+            </a:r>
+          </a:p>
+          <a:p>
+            <a:pPr lvl="2"/>
+            <a:r>
+              <a:rPr lang="en-US" sz="2400" dirty="0">
+                <a:latin typeface="Garamond" charset="0"/>
+                <a:ea typeface="Garamond" charset="0"/>
+                <a:cs typeface="Garamond" charset="0"/>
+              </a:rPr>
+              <a:t>Comprehensive</a:t>
+            </a:r>
+          </a:p>
+          <a:p>
+            <a:pPr lvl="2"/>
+            <a:r>
+              <a:rPr lang="en-US" sz="2400" dirty="0">
+                <a:latin typeface="Garamond" charset="0"/>
+                <a:ea typeface="Garamond" charset="0"/>
+                <a:cs typeface="Garamond" charset="0"/>
+              </a:rPr>
+              <a:t>Non-biased</a:t>
+            </a:r>
+          </a:p>
+          <a:p>
+            <a:pPr lvl="2"/>
+            <a:r>
+              <a:rPr lang="en-US" sz="2400" dirty="0">
+                <a:latin typeface="Garamond" charset="0"/>
+                <a:ea typeface="Garamond" charset="0"/>
+                <a:cs typeface="Garamond" charset="0"/>
+              </a:rPr>
+              <a:t>Family-centered</a:t>
+            </a:r>
+          </a:p>
+        </p:txBody>
+      </p:sp>
+    </p:spTree>
+    <p:extLst>
+      <p:ext uri="{BB962C8B-B14F-4D97-AF65-F5344CB8AC3E}">
+        <p14:creationId xmlns:p14="http://schemas.microsoft.com/office/powerpoint/2010/main" val="213958359"/>
+      </p:ext>
+    </p:extLst>
+  </p:cSld>
+  <p:clrMapOvr>
+    <a:masterClrMapping/>
+  </p:clrMapOvr>
+</p:sld>
+</file>
+
+<file path=ppt/slides/slide19.xml><?xml version="1.0" encoding="utf-8"?>
+<p:sld xmlns:a="http://schemas.openxmlformats.org/drawingml/2006/main" xmlns:r="http://schemas.openxmlformats.org/officeDocument/2006/relationships" xmlns:p="http://schemas.openxmlformats.org/presentationml/2006/main">
+  <p:cSld>
+    <p:spTree>
+      <p:nvGrpSpPr>
+        <p:cNvPr id="1" name=""/>
+        <p:cNvGrpSpPr/>
+        <p:nvPr/>
+      </p:nvGrpSpPr>
+      <p:grpSpPr>
+        <a:xfrm>
+          <a:off x="0" y="0"/>
+          <a:ext cx="0" cy="0"/>
+          <a:chOff x="0" y="0"/>
+          <a:chExt cx="0" cy="0"/>
+        </a:xfrm>
+      </p:grpSpPr>
+      <p:sp>
+        <p:nvSpPr>
+          <p:cNvPr id="2" name="Title 1"/>
+          <p:cNvSpPr>
+            <a:spLocks noGrp="1"/>
+          </p:cNvSpPr>
+          <p:nvPr>
+            <p:ph type="title"/>
+          </p:nvPr>
+        </p:nvSpPr>
+        <p:spPr>
+          <a:xfrm>
+            <a:off x="1873625" y="274638"/>
+            <a:ext cx="8623895" cy="1339009"/>
+          </a:xfrm>
+        </p:spPr>
+        <p:txBody>
+          <a:bodyPr/>
+          <a:lstStyle/>
+          <a:p>
+            <a:r>
+              <a:rPr lang="en-US" dirty="0">
+                <a:latin typeface="Copperplate Gothic Light" charset="0"/>
+                <a:ea typeface="Copperplate Gothic Light" charset="0"/>
+                <a:cs typeface="Copperplate Gothic Light" charset="0"/>
+              </a:rPr>
+              <a:t>Designing and Administering Assessment</a:t>
+            </a:r>
+            <a:endParaRPr lang="en-US" dirty="0"/>
+          </a:p>
+        </p:txBody>
+      </p:sp>
+      <p:sp>
+        <p:nvSpPr>
+          <p:cNvPr id="3" name="Content Placeholder 2"/>
+          <p:cNvSpPr>
+            <a:spLocks noGrp="1"/>
+          </p:cNvSpPr>
+          <p:nvPr>
+            <p:ph idx="1"/>
+          </p:nvPr>
+        </p:nvSpPr>
+        <p:spPr>
+          <a:xfrm>
+            <a:off x="2050943" y="1801907"/>
+            <a:ext cx="7834421" cy="4324257"/>
+          </a:xfrm>
+        </p:spPr>
+        <p:txBody>
+          <a:bodyPr>
+            <a:normAutofit/>
+          </a:bodyPr>
+          <a:lstStyle/>
+          <a:p>
+            <a:pPr marL="0" indent="0">
+              <a:buNone/>
+            </a:pPr>
+            <a:r>
+              <a:rPr lang="en-US" sz="2400" b="1" dirty="0"/>
+              <a:t>Determine the purpose of the assessment</a:t>
+            </a:r>
+          </a:p>
+          <a:p>
+            <a:r>
+              <a:rPr lang="en-US" sz="2400" dirty="0">
+                <a:latin typeface="Garamond" charset="0"/>
+                <a:ea typeface="Garamond" charset="0"/>
+                <a:cs typeface="Garamond" charset="0"/>
+              </a:rPr>
+              <a:t>To identify the presence of a disorder, describe it,  and determine the need for intervention</a:t>
+            </a:r>
+          </a:p>
+          <a:p>
+            <a:pPr lvl="2"/>
+            <a:r>
+              <a:rPr lang="en-US" sz="2400" b="1" dirty="0">
+                <a:solidFill>
+                  <a:srgbClr val="7030A0"/>
+                </a:solidFill>
+                <a:latin typeface="Garamond" charset="0"/>
+                <a:ea typeface="Garamond" charset="0"/>
+                <a:cs typeface="Garamond" charset="0"/>
+              </a:rPr>
+              <a:t>Differential diagnosis</a:t>
+            </a:r>
+          </a:p>
+          <a:p>
+            <a:pPr lvl="2"/>
+            <a:r>
+              <a:rPr lang="en-US" sz="2400" b="1" dirty="0">
+                <a:solidFill>
+                  <a:srgbClr val="7030A0"/>
+                </a:solidFill>
+                <a:latin typeface="Garamond" charset="0"/>
+                <a:ea typeface="Garamond" charset="0"/>
+                <a:cs typeface="Garamond" charset="0"/>
+              </a:rPr>
+              <a:t>Eligibility</a:t>
+            </a:r>
+          </a:p>
+          <a:p>
+            <a:r>
+              <a:rPr lang="en-US" sz="2400" dirty="0">
+                <a:latin typeface="Garamond" charset="0"/>
+                <a:ea typeface="Garamond" charset="0"/>
+                <a:cs typeface="Garamond" charset="0"/>
+              </a:rPr>
+              <a:t>To design intervention (</a:t>
+            </a:r>
+            <a:r>
+              <a:rPr lang="en-US" sz="2400" b="1" dirty="0">
+                <a:solidFill>
+                  <a:srgbClr val="7030A0"/>
+                </a:solidFill>
+                <a:latin typeface="Garamond" charset="0"/>
+                <a:ea typeface="Garamond" charset="0"/>
+                <a:cs typeface="Garamond" charset="0"/>
+              </a:rPr>
+              <a:t>programmatic assessment</a:t>
+            </a:r>
+            <a:r>
+              <a:rPr lang="en-US" sz="2400" dirty="0">
+                <a:latin typeface="Garamond" charset="0"/>
+                <a:ea typeface="Garamond" charset="0"/>
+                <a:cs typeface="Garamond" charset="0"/>
+              </a:rPr>
+              <a:t>)</a:t>
+            </a:r>
+          </a:p>
+          <a:p>
+            <a:pPr lvl="2"/>
+            <a:r>
+              <a:rPr lang="en-US" sz="2400" dirty="0">
+                <a:latin typeface="Garamond" charset="0"/>
+                <a:ea typeface="Garamond" charset="0"/>
+                <a:cs typeface="Garamond" charset="0"/>
+              </a:rPr>
+              <a:t>Develop goals</a:t>
+            </a:r>
+          </a:p>
+          <a:p>
+            <a:pPr lvl="2"/>
+            <a:r>
+              <a:rPr lang="en-US" sz="2400" dirty="0">
+                <a:latin typeface="Garamond" charset="0"/>
+                <a:ea typeface="Garamond" charset="0"/>
+                <a:cs typeface="Garamond" charset="0"/>
+              </a:rPr>
+              <a:t>Identify intervention approach, strategies, and contexts</a:t>
+            </a:r>
+          </a:p>
+          <a:p>
+            <a:pPr lvl="2"/>
+            <a:r>
+              <a:rPr lang="en-US" sz="2400" dirty="0">
+                <a:latin typeface="Garamond" charset="0"/>
+                <a:ea typeface="Garamond" charset="0"/>
+                <a:cs typeface="Garamond" charset="0"/>
+              </a:rPr>
+              <a:t>Establish </a:t>
+            </a:r>
+            <a:r>
+              <a:rPr lang="en-US" sz="2400" b="1" dirty="0">
+                <a:solidFill>
+                  <a:srgbClr val="7030A0"/>
+                </a:solidFill>
+                <a:latin typeface="Garamond" charset="0"/>
+                <a:ea typeface="Garamond" charset="0"/>
+                <a:cs typeface="Garamond" charset="0"/>
+              </a:rPr>
+              <a:t>baseline</a:t>
+            </a:r>
+            <a:r>
+              <a:rPr lang="en-US" sz="2400" dirty="0">
+                <a:latin typeface="Garamond" charset="0"/>
+                <a:ea typeface="Garamond" charset="0"/>
+                <a:cs typeface="Garamond" charset="0"/>
+              </a:rPr>
+              <a:t> </a:t>
+            </a:r>
+            <a:r>
+              <a:rPr lang="en-US" sz="2400" b="1" dirty="0">
+                <a:solidFill>
+                  <a:srgbClr val="7030A0"/>
+                </a:solidFill>
+                <a:latin typeface="Garamond" charset="0"/>
+                <a:ea typeface="Garamond" charset="0"/>
+                <a:cs typeface="Garamond" charset="0"/>
+              </a:rPr>
+              <a:t>performance</a:t>
+            </a:r>
+          </a:p>
+          <a:p>
+            <a:r>
+              <a:rPr lang="en-US" sz="2400" dirty="0">
+                <a:latin typeface="Garamond" charset="0"/>
+                <a:ea typeface="Garamond" charset="0"/>
+                <a:cs typeface="Garamond" charset="0"/>
+              </a:rPr>
+              <a:t>To monitor progress over time</a:t>
+            </a:r>
+          </a:p>
+          <a:p>
+            <a:endParaRPr lang="en-US" dirty="0"/>
+          </a:p>
+        </p:txBody>
+      </p:sp>
+    </p:spTree>
+    <p:extLst>
+      <p:ext uri="{BB962C8B-B14F-4D97-AF65-F5344CB8AC3E}">
+        <p14:creationId xmlns:p14="http://schemas.microsoft.com/office/powerpoint/2010/main" val="1333907851"/>
+      </p:ext>
+    </p:extLst>
+  </p:cSld>
+  <p:clrMapOvr>
+    <a:masterClrMapping/>
+  </p:clrMapOvr>
+</p:sld>
+</file>
+
 <file path=ppt/slides/slide2.xml><?xml version="1.0" encoding="utf-8"?>
 <p:sld xmlns:a="http://schemas.openxmlformats.org/drawingml/2006/main" xmlns:r="http://schemas.openxmlformats.org/officeDocument/2006/relationships" xmlns:p="http://schemas.openxmlformats.org/presentationml/2006/main">
   <p:cSld>
@@ -16278,6 +19793,363 @@
       <p:bldP spid="15" grpId="0"/>
     </p:bldLst>
   </p:timing>
+</p:sld>
+</file>
+
+<file path=ppt/slides/slide20.xml><?xml version="1.0" encoding="utf-8"?>
+<p:sld xmlns:a="http://schemas.openxmlformats.org/drawingml/2006/main" xmlns:r="http://schemas.openxmlformats.org/officeDocument/2006/relationships" xmlns:p="http://schemas.openxmlformats.org/presentationml/2006/main">
+  <p:cSld>
+    <p:spTree>
+      <p:nvGrpSpPr>
+        <p:cNvPr id="1" name=""/>
+        <p:cNvGrpSpPr/>
+        <p:nvPr/>
+      </p:nvGrpSpPr>
+      <p:grpSpPr>
+        <a:xfrm>
+          <a:off x="0" y="0"/>
+          <a:ext cx="0" cy="0"/>
+          <a:chOff x="0" y="0"/>
+          <a:chExt cx="0" cy="0"/>
+        </a:xfrm>
+      </p:grpSpPr>
+      <p:sp>
+        <p:nvSpPr>
+          <p:cNvPr id="2" name="Title 1"/>
+          <p:cNvSpPr>
+            <a:spLocks noGrp="1"/>
+          </p:cNvSpPr>
+          <p:nvPr>
+            <p:ph type="title"/>
+          </p:nvPr>
+        </p:nvSpPr>
+        <p:spPr/>
+        <p:txBody>
+          <a:bodyPr/>
+          <a:lstStyle/>
+          <a:p>
+            <a:r>
+              <a:rPr lang="en-US" b="1" dirty="0">
+                <a:solidFill>
+                  <a:srgbClr val="FF0000"/>
+                </a:solidFill>
+              </a:rPr>
+              <a:t>Activity #2:  Specify Reasons for Assessment</a:t>
+            </a:r>
+            <a:br>
+              <a:rPr lang="en-US" dirty="0"/>
+            </a:br>
+            <a:r>
+              <a:rPr lang="en-US" sz="1800" dirty="0"/>
+              <a:t>Large Group Activity</a:t>
+            </a:r>
+            <a:endParaRPr lang="en-US" dirty="0"/>
+          </a:p>
+        </p:txBody>
+      </p:sp>
+      <p:graphicFrame>
+        <p:nvGraphicFramePr>
+          <p:cNvPr id="4" name="Table 3"/>
+          <p:cNvGraphicFramePr>
+            <a:graphicFrameLocks noGrp="1"/>
+          </p:cNvGraphicFramePr>
+          <p:nvPr/>
+        </p:nvGraphicFramePr>
+        <p:xfrm>
+          <a:off x="2029945" y="1962718"/>
+          <a:ext cx="8009405" cy="4023360"/>
+        </p:xfrm>
+        <a:graphic>
+          <a:graphicData uri="http://schemas.openxmlformats.org/drawingml/2006/table">
+            <a:tbl>
+              <a:tblPr firstRow="1" firstCol="1" lastRow="1" lastCol="1" bandRow="1" bandCol="1">
+                <a:tableStyleId>{5C22544A-7EE6-4342-B048-85BDC9FD1C3A}</a:tableStyleId>
+              </a:tblPr>
+              <a:tblGrid>
+                <a:gridCol w="3900232">
+                  <a:extLst>
+                    <a:ext uri="{9D8B030D-6E8A-4147-A177-3AD203B41FA5}">
+                      <a16:colId xmlns:a16="http://schemas.microsoft.com/office/drawing/2014/main" val="20000"/>
+                    </a:ext>
+                  </a:extLst>
+                </a:gridCol>
+                <a:gridCol w="4109173">
+                  <a:extLst>
+                    <a:ext uri="{9D8B030D-6E8A-4147-A177-3AD203B41FA5}">
+                      <a16:colId xmlns:a16="http://schemas.microsoft.com/office/drawing/2014/main" val="20001"/>
+                    </a:ext>
+                  </a:extLst>
+                </a:gridCol>
+              </a:tblGrid>
+              <a:tr h="3523681">
+                <a:tc>
+                  <a:txBody>
+                    <a:bodyPr/>
+                    <a:lstStyle/>
+                    <a:p>
+                      <a:pPr marL="0" marR="0">
+                        <a:spcBef>
+                          <a:spcPts val="0"/>
+                        </a:spcBef>
+                        <a:spcAft>
+                          <a:spcPts val="0"/>
+                        </a:spcAft>
+                      </a:pPr>
+                      <a:r>
+                        <a:rPr lang="en-US" sz="2400" dirty="0">
+                          <a:effectLst/>
+                        </a:rPr>
+                        <a:t>Diagnostic:</a:t>
+                      </a:r>
+                    </a:p>
+                    <a:p>
+                      <a:pPr marL="0" marR="0">
+                        <a:spcBef>
+                          <a:spcPts val="0"/>
+                        </a:spcBef>
+                        <a:spcAft>
+                          <a:spcPts val="0"/>
+                        </a:spcAft>
+                      </a:pPr>
+                      <a:r>
+                        <a:rPr lang="en-US" sz="2400" dirty="0">
+                          <a:effectLst/>
+                        </a:rPr>
+                        <a:t>__Make a (new) diagnosis</a:t>
+                      </a:r>
+                    </a:p>
+                    <a:p>
+                      <a:pPr marL="0" marR="0">
+                        <a:spcBef>
+                          <a:spcPts val="0"/>
+                        </a:spcBef>
+                        <a:spcAft>
+                          <a:spcPts val="0"/>
+                        </a:spcAft>
+                      </a:pPr>
+                      <a:r>
+                        <a:rPr lang="en-US" sz="2400" dirty="0">
+                          <a:effectLst/>
+                        </a:rPr>
+                        <a:t>__Determine whether a diagnosis is still present</a:t>
+                      </a:r>
+                    </a:p>
+                    <a:p>
+                      <a:pPr marL="0" marR="0">
+                        <a:spcBef>
+                          <a:spcPts val="0"/>
+                        </a:spcBef>
+                        <a:spcAft>
+                          <a:spcPts val="0"/>
+                        </a:spcAft>
+                      </a:pPr>
+                      <a:r>
+                        <a:rPr lang="en-US" sz="2400" dirty="0">
+                          <a:effectLst/>
+                        </a:rPr>
+                        <a:t>__Determine (ongoing) eligibility/need for service</a:t>
+                      </a:r>
+                    </a:p>
+                    <a:p>
+                      <a:pPr marL="0" marR="0">
+                        <a:spcBef>
+                          <a:spcPts val="0"/>
+                        </a:spcBef>
+                        <a:spcAft>
+                          <a:spcPts val="0"/>
+                        </a:spcAft>
+                      </a:pPr>
+                      <a:r>
+                        <a:rPr lang="en-US" sz="2400" dirty="0">
+                          <a:effectLst/>
+                        </a:rPr>
+                        <a:t>__ Other: </a:t>
+                      </a:r>
+                    </a:p>
+                    <a:p>
+                      <a:pPr marL="0" marR="0">
+                        <a:spcBef>
+                          <a:spcPts val="0"/>
+                        </a:spcBef>
+                        <a:spcAft>
+                          <a:spcPts val="0"/>
+                        </a:spcAft>
+                      </a:pPr>
+                      <a:r>
+                        <a:rPr lang="en-US" sz="2400" dirty="0">
+                          <a:effectLst/>
+                        </a:rPr>
+                        <a:t> </a:t>
+                      </a:r>
+                    </a:p>
+                    <a:p>
+                      <a:pPr marL="0" marR="0">
+                        <a:spcBef>
+                          <a:spcPts val="0"/>
+                        </a:spcBef>
+                        <a:spcAft>
+                          <a:spcPts val="0"/>
+                        </a:spcAft>
+                      </a:pPr>
+                      <a:r>
+                        <a:rPr lang="en-US" sz="2400" dirty="0">
+                          <a:effectLst/>
+                        </a:rPr>
+                        <a:t> </a:t>
+                      </a:r>
+                      <a:endParaRPr lang="en-US" sz="2400" dirty="0">
+                        <a:effectLst/>
+                        <a:latin typeface="Times New Roman" charset="0"/>
+                        <a:ea typeface="Times New Roman" charset="0"/>
+                      </a:endParaRPr>
+                    </a:p>
+                  </a:txBody>
+                  <a:tcPr marL="68580" marR="68580" marT="0" marB="0"/>
+                </a:tc>
+                <a:tc>
+                  <a:txBody>
+                    <a:bodyPr/>
+                    <a:lstStyle/>
+                    <a:p>
+                      <a:pPr marL="0" marR="0">
+                        <a:spcBef>
+                          <a:spcPts val="0"/>
+                        </a:spcBef>
+                        <a:spcAft>
+                          <a:spcPts val="0"/>
+                        </a:spcAft>
+                      </a:pPr>
+                      <a:r>
+                        <a:rPr lang="en-US" sz="2400" dirty="0">
+                          <a:effectLst/>
+                        </a:rPr>
+                        <a:t>Programmatic:</a:t>
+                      </a:r>
+                    </a:p>
+                    <a:p>
+                      <a:pPr marL="0" marR="0">
+                        <a:spcBef>
+                          <a:spcPts val="0"/>
+                        </a:spcBef>
+                        <a:spcAft>
+                          <a:spcPts val="0"/>
+                        </a:spcAft>
+                      </a:pPr>
+                      <a:r>
+                        <a:rPr lang="en-US" sz="2400" dirty="0">
+                          <a:effectLst/>
+                        </a:rPr>
+                        <a:t>__Establish (new) goals</a:t>
+                      </a:r>
+                    </a:p>
+                    <a:p>
+                      <a:pPr marL="0" marR="0">
+                        <a:spcBef>
+                          <a:spcPts val="0"/>
+                        </a:spcBef>
+                        <a:spcAft>
+                          <a:spcPts val="0"/>
+                        </a:spcAft>
+                      </a:pPr>
+                      <a:r>
+                        <a:rPr lang="en-US" sz="2400" dirty="0">
+                          <a:effectLst/>
+                        </a:rPr>
+                        <a:t>__Determine (new) intervention approach </a:t>
+                      </a:r>
+                    </a:p>
+                    <a:p>
+                      <a:pPr marL="0" marR="0">
+                        <a:spcBef>
+                          <a:spcPts val="0"/>
+                        </a:spcBef>
+                        <a:spcAft>
+                          <a:spcPts val="0"/>
+                        </a:spcAft>
+                      </a:pPr>
+                      <a:r>
+                        <a:rPr lang="en-US" sz="2400" dirty="0">
+                          <a:effectLst/>
+                        </a:rPr>
+                        <a:t>__Establish a (new) baseline of performance </a:t>
+                      </a:r>
+                    </a:p>
+                    <a:p>
+                      <a:pPr marL="0" marR="0">
+                        <a:spcBef>
+                          <a:spcPts val="0"/>
+                        </a:spcBef>
+                        <a:spcAft>
+                          <a:spcPts val="0"/>
+                        </a:spcAft>
+                      </a:pPr>
+                      <a:r>
+                        <a:rPr lang="en-US" sz="2400" dirty="0">
+                          <a:effectLst/>
+                        </a:rPr>
+                        <a:t>__Document progress on current goals</a:t>
+                      </a:r>
+                    </a:p>
+                    <a:p>
+                      <a:pPr marL="0" marR="0">
+                        <a:spcBef>
+                          <a:spcPts val="0"/>
+                        </a:spcBef>
+                        <a:spcAft>
+                          <a:spcPts val="0"/>
+                        </a:spcAft>
+                      </a:pPr>
+                      <a:r>
+                        <a:rPr lang="en-US" sz="2400" dirty="0">
+                          <a:effectLst/>
+                        </a:rPr>
+                        <a:t>__Document progress in areas currently not targeted</a:t>
+                      </a:r>
+                    </a:p>
+                    <a:p>
+                      <a:pPr marL="0" marR="0">
+                        <a:spcBef>
+                          <a:spcPts val="0"/>
+                        </a:spcBef>
+                        <a:spcAft>
+                          <a:spcPts val="0"/>
+                        </a:spcAft>
+                      </a:pPr>
+                      <a:r>
+                        <a:rPr lang="en-US" sz="2400" dirty="0">
+                          <a:effectLst/>
+                        </a:rPr>
+                        <a:t>__Other:</a:t>
+                      </a:r>
+                      <a:endParaRPr lang="en-US" sz="2400" dirty="0">
+                        <a:effectLst/>
+                        <a:latin typeface="Times New Roman" charset="0"/>
+                        <a:ea typeface="Times New Roman" charset="0"/>
+                      </a:endParaRPr>
+                    </a:p>
+                  </a:txBody>
+                  <a:tcPr marL="68580" marR="68580" marT="0" marB="0"/>
+                </a:tc>
+                <a:extLst>
+                  <a:ext uri="{0D108BD9-81ED-4DB2-BD59-A6C34878D82A}">
+                    <a16:rowId xmlns:a16="http://schemas.microsoft.com/office/drawing/2014/main" val="10000"/>
+                  </a:ext>
+                </a:extLst>
+              </a:tr>
+            </a:tbl>
+          </a:graphicData>
+        </a:graphic>
+      </p:graphicFrame>
+    </p:spTree>
+    <p:extLst>
+      <p:ext uri="{BB962C8B-B14F-4D97-AF65-F5344CB8AC3E}">
+        <p14:creationId xmlns:p14="http://schemas.microsoft.com/office/powerpoint/2010/main" val="959160148"/>
+      </p:ext>
+    </p:extLst>
+  </p:cSld>
+  <p:clrMapOvr>
+    <a:masterClrMapping/>
+  </p:clrMapOvr>
 </p:sld>
 </file>
 

</xml_diff>

<commit_message>
edits to weeks 1-3_1 material
</commit_message>
<xml_diff>
--- a/slides/cds431_week1_2.pptx
+++ b/slides/cds431_week1_2.pptx
@@ -10856,7 +10856,7 @@
           <a:p>
             <a:fld id="{AE3BA3A9-D2EB-6942-9E16-EDE8889D48A0}" type="datetimeFigureOut">
               <a:rPr lang="en-US" smtClean="0"/>
-              <a:t>1/11/22</a:t>
+              <a:t>1/25/22</a:t>
             </a:fld>
             <a:endParaRPr lang="en-US"/>
           </a:p>
@@ -12088,7 +12088,7 @@
           <a:p>
             <a:fld id="{0B25AB07-0BA4-BD4C-8240-4EBC65ED6196}" type="datetimeFigureOut">
               <a:rPr lang="en-US" smtClean="0"/>
-              <a:t>1/11/22</a:t>
+              <a:t>1/25/22</a:t>
             </a:fld>
             <a:endParaRPr lang="en-US"/>
           </a:p>
@@ -12286,7 +12286,7 @@
           <a:p>
             <a:fld id="{0B25AB07-0BA4-BD4C-8240-4EBC65ED6196}" type="datetimeFigureOut">
               <a:rPr lang="en-US" smtClean="0"/>
-              <a:t>1/11/22</a:t>
+              <a:t>1/25/22</a:t>
             </a:fld>
             <a:endParaRPr lang="en-US"/>
           </a:p>
@@ -12494,7 +12494,7 @@
           <a:p>
             <a:fld id="{0B25AB07-0BA4-BD4C-8240-4EBC65ED6196}" type="datetimeFigureOut">
               <a:rPr lang="en-US" smtClean="0"/>
-              <a:t>1/11/22</a:t>
+              <a:t>1/25/22</a:t>
             </a:fld>
             <a:endParaRPr lang="en-US"/>
           </a:p>
@@ -12692,7 +12692,7 @@
           <a:p>
             <a:fld id="{0B25AB07-0BA4-BD4C-8240-4EBC65ED6196}" type="datetimeFigureOut">
               <a:rPr lang="en-US" smtClean="0"/>
-              <a:t>1/11/22</a:t>
+              <a:t>1/25/22</a:t>
             </a:fld>
             <a:endParaRPr lang="en-US"/>
           </a:p>
@@ -12967,7 +12967,7 @@
           <a:p>
             <a:fld id="{0B25AB07-0BA4-BD4C-8240-4EBC65ED6196}" type="datetimeFigureOut">
               <a:rPr lang="en-US" smtClean="0"/>
-              <a:t>1/11/22</a:t>
+              <a:t>1/25/22</a:t>
             </a:fld>
             <a:endParaRPr lang="en-US"/>
           </a:p>
@@ -13232,7 +13232,7 @@
           <a:p>
             <a:fld id="{0B25AB07-0BA4-BD4C-8240-4EBC65ED6196}" type="datetimeFigureOut">
               <a:rPr lang="en-US" smtClean="0"/>
-              <a:t>1/11/22</a:t>
+              <a:t>1/25/22</a:t>
             </a:fld>
             <a:endParaRPr lang="en-US"/>
           </a:p>
@@ -13644,7 +13644,7 @@
           <a:p>
             <a:fld id="{0B25AB07-0BA4-BD4C-8240-4EBC65ED6196}" type="datetimeFigureOut">
               <a:rPr lang="en-US" smtClean="0"/>
-              <a:t>1/11/22</a:t>
+              <a:t>1/25/22</a:t>
             </a:fld>
             <a:endParaRPr lang="en-US"/>
           </a:p>
@@ -13785,7 +13785,7 @@
           <a:p>
             <a:fld id="{0B25AB07-0BA4-BD4C-8240-4EBC65ED6196}" type="datetimeFigureOut">
               <a:rPr lang="en-US" smtClean="0"/>
-              <a:t>1/11/22</a:t>
+              <a:t>1/25/22</a:t>
             </a:fld>
             <a:endParaRPr lang="en-US"/>
           </a:p>
@@ -13898,7 +13898,7 @@
           <a:p>
             <a:fld id="{0B25AB07-0BA4-BD4C-8240-4EBC65ED6196}" type="datetimeFigureOut">
               <a:rPr lang="en-US" smtClean="0"/>
-              <a:t>1/11/22</a:t>
+              <a:t>1/25/22</a:t>
             </a:fld>
             <a:endParaRPr lang="en-US"/>
           </a:p>
@@ -14209,7 +14209,7 @@
           <a:p>
             <a:fld id="{0B25AB07-0BA4-BD4C-8240-4EBC65ED6196}" type="datetimeFigureOut">
               <a:rPr lang="en-US" smtClean="0"/>
-              <a:t>1/11/22</a:t>
+              <a:t>1/25/22</a:t>
             </a:fld>
             <a:endParaRPr lang="en-US"/>
           </a:p>
@@ -14497,7 +14497,7 @@
           <a:p>
             <a:fld id="{0B25AB07-0BA4-BD4C-8240-4EBC65ED6196}" type="datetimeFigureOut">
               <a:rPr lang="en-US" smtClean="0"/>
-              <a:t>1/11/22</a:t>
+              <a:t>1/25/22</a:t>
             </a:fld>
             <a:endParaRPr lang="en-US"/>
           </a:p>
@@ -14768,7 +14768,7 @@
           <a:p>
             <a:fld id="{0B25AB07-0BA4-BD4C-8240-4EBC65ED6196}" type="datetimeFigureOut">
               <a:rPr lang="en-US" smtClean="0"/>
-              <a:t>1/11/22</a:t>
+              <a:t>1/25/22</a:t>
             </a:fld>
             <a:endParaRPr lang="en-US"/>
           </a:p>
@@ -16324,7 +16324,7 @@
         <p:spPr>
           <a:xfrm>
             <a:off x="1673088" y="782401"/>
-            <a:ext cx="8994913" cy="5632311"/>
+            <a:ext cx="8994913" cy="5139869"/>
           </a:xfrm>
           <a:prstGeom prst="rect">
             <a:avLst/>
@@ -16342,20 +16342,6 @@
               <a:t>Break out groups: Choose one member of each group to be the scribe, open OneDrive doc, Save As: Save a Copy Online, title Group #</a:t>
             </a:r>
             <a:endParaRPr lang="en-US" sz="1600" dirty="0"/>
-          </a:p>
-          <a:p>
-            <a:r>
-              <a:rPr lang="en-US" sz="3200" dirty="0"/>
-              <a:t>https://</a:t>
-            </a:r>
-            <a:r>
-              <a:rPr lang="en-US" sz="3200" dirty="0" err="1"/>
-              <a:t>tinyurl.com</a:t>
-            </a:r>
-            <a:r>
-              <a:rPr lang="en-US" sz="3200" dirty="0"/>
-              <a:t>/Activity1-CDS-431</a:t>
-            </a:r>
           </a:p>
           <a:p>
             <a:pPr marL="457200" indent="-457200">

</xml_diff>

<commit_message>
week 1 thursday slides edited and tweaks to course agenda
</commit_message>
<xml_diff>
--- a/slides/cds431_week1_2.pptx
+++ b/slides/cds431_week1_2.pptx
@@ -10856,7 +10856,7 @@
           <a:p>
             <a:fld id="{AE3BA3A9-D2EB-6942-9E16-EDE8889D48A0}" type="datetimeFigureOut">
               <a:rPr lang="en-US" smtClean="0"/>
-              <a:t>1/25/22</a:t>
+              <a:t>3/29/22</a:t>
             </a:fld>
             <a:endParaRPr lang="en-US"/>
           </a:p>
@@ -11265,8 +11265,112 @@
           <a:p>
             <a:r>
               <a:rPr lang="en-US" dirty="0"/>
-              <a:t>May need to finish out of class</a:t>
+              <a:t>IEP: </a:t>
             </a:r>
+            <a:r>
+              <a:rPr lang="en-US" sz="1200" kern="1200" dirty="0">
+                <a:solidFill>
+                  <a:schemeClr val="tx1"/>
+                </a:solidFill>
+                <a:effectLst/>
+                <a:latin typeface="+mn-lt"/>
+                <a:ea typeface="+mn-ea"/>
+                <a:cs typeface="+mn-cs"/>
+              </a:rPr>
+              <a:t>Individual Education Plan for school age students with a disability requiring specially designed instruction.</a:t>
+            </a:r>
+            <a:r>
+              <a:rPr lang="en-US" dirty="0">
+                <a:effectLst/>
+              </a:rPr>
+              <a:t> </a:t>
+            </a:r>
+          </a:p>
+          <a:p>
+            <a:r>
+              <a:rPr lang="en-US" dirty="0">
+                <a:effectLst/>
+              </a:rPr>
+              <a:t>IFSP: </a:t>
+            </a:r>
+            <a:r>
+              <a:rPr lang="en-US" sz="1200" kern="1200" dirty="0">
+                <a:solidFill>
+                  <a:schemeClr val="tx1"/>
+                </a:solidFill>
+                <a:effectLst/>
+                <a:latin typeface="+mn-lt"/>
+                <a:ea typeface="+mn-ea"/>
+                <a:cs typeface="+mn-cs"/>
+              </a:rPr>
+              <a:t>Individual Family Service Plan – preschool</a:t>
+            </a:r>
+          </a:p>
+          <a:p>
+            <a:r>
+              <a:rPr lang="en-US" sz="1200" kern="1200" dirty="0">
+                <a:solidFill>
+                  <a:schemeClr val="tx1"/>
+                </a:solidFill>
+                <a:effectLst/>
+                <a:latin typeface="+mn-lt"/>
+                <a:ea typeface="+mn-ea"/>
+                <a:cs typeface="+mn-cs"/>
+              </a:rPr>
+              <a:t>Oregon:  IFSP up to kindergarten</a:t>
+            </a:r>
+          </a:p>
+          <a:p>
+            <a:r>
+              <a:rPr lang="en-US" sz="1200" kern="1200" dirty="0">
+                <a:solidFill>
+                  <a:schemeClr val="tx1"/>
+                </a:solidFill>
+                <a:effectLst/>
+                <a:latin typeface="+mn-lt"/>
+                <a:ea typeface="+mn-ea"/>
+                <a:cs typeface="+mn-cs"/>
+              </a:rPr>
+              <a:t>Other states: change to IEP at 3 years of age</a:t>
+            </a:r>
+            <a:r>
+              <a:rPr lang="en-US" dirty="0">
+                <a:effectLst/>
+              </a:rPr>
+              <a:t> </a:t>
+            </a:r>
+          </a:p>
+          <a:p>
+            <a:endParaRPr lang="en-US" dirty="0">
+              <a:effectLst/>
+            </a:endParaRPr>
+          </a:p>
+          <a:p>
+            <a:r>
+              <a:rPr lang="en-US" dirty="0">
+                <a:effectLst/>
+              </a:rPr>
+              <a:t>504Plan: </a:t>
+            </a:r>
+            <a:r>
+              <a:rPr lang="en-US" sz="1200" kern="1200" dirty="0">
+                <a:solidFill>
+                  <a:schemeClr val="tx1"/>
+                </a:solidFill>
+                <a:effectLst/>
+                <a:latin typeface="+mn-lt"/>
+                <a:ea typeface="+mn-ea"/>
+                <a:cs typeface="+mn-cs"/>
+              </a:rPr>
+              <a:t>Accommodations or modifications that are needed by a student with a disability in order to be successful in the regular classroom.  No specially designed instruction is needed.</a:t>
+            </a:r>
+            <a:r>
+              <a:rPr lang="en-US" dirty="0">
+                <a:effectLst/>
+              </a:rPr>
+              <a:t> </a:t>
+            </a:r>
+            <a:endParaRPr lang="en-US" dirty="0"/>
           </a:p>
         </p:txBody>
       </p:sp>
@@ -11277,7 +11381,7 @@
             <a:spLocks noGrp="1"/>
           </p:cNvSpPr>
           <p:nvPr>
-            <p:ph type="sldNum" sz="quarter" idx="10"/>
+            <p:ph type="sldNum" sz="quarter" idx="5"/>
           </p:nvPr>
         </p:nvSpPr>
         <p:spPr/>
@@ -11285,9 +11389,9 @@
           <a:bodyPr/>
           <a:lstStyle/>
           <a:p>
-            <a:fld id="{AA0A589D-B577-494C-AEB5-A5D4F1908003}" type="slidenum">
+            <a:fld id="{FA5E79D7-C559-1142-9F6E-D64DC5BBD379}" type="slidenum">
               <a:rPr lang="en-US" smtClean="0"/>
-              <a:t>9</a:t>
+              <a:t>8</a:t>
             </a:fld>
             <a:endParaRPr lang="en-US"/>
           </a:p>
@@ -11296,7 +11400,7 @@
     </p:spTree>
     <p:extLst>
       <p:ext uri="{BB962C8B-B14F-4D97-AF65-F5344CB8AC3E}">
-        <p14:creationId xmlns:p14="http://schemas.microsoft.com/office/powerpoint/2010/main" val="1055823032"/>
+        <p14:creationId xmlns:p14="http://schemas.microsoft.com/office/powerpoint/2010/main" val="203358222"/>
       </p:ext>
     </p:extLst>
   </p:cSld>
@@ -11350,7 +11454,10 @@
           <a:bodyPr/>
           <a:lstStyle/>
           <a:p>
-            <a:endParaRPr lang="en-US" dirty="0"/>
+            <a:r>
+              <a:rPr lang="en-US" dirty="0"/>
+              <a:t>May need to finish out of class</a:t>
+            </a:r>
           </a:p>
         </p:txBody>
       </p:sp>
@@ -11361,7 +11468,7 @@
             <a:spLocks noGrp="1"/>
           </p:cNvSpPr>
           <p:nvPr>
-            <p:ph type="sldNum" sz="quarter" idx="5"/>
+            <p:ph type="sldNum" sz="quarter" idx="10"/>
           </p:nvPr>
         </p:nvSpPr>
         <p:spPr/>
@@ -11371,7 +11478,7 @@
           <a:p>
             <a:fld id="{AA0A589D-B577-494C-AEB5-A5D4F1908003}" type="slidenum">
               <a:rPr lang="en-US" smtClean="0"/>
-              <a:t>10</a:t>
+              <a:t>9</a:t>
             </a:fld>
             <a:endParaRPr lang="en-US"/>
           </a:p>
@@ -11380,7 +11487,7 @@
     </p:spTree>
     <p:extLst>
       <p:ext uri="{BB962C8B-B14F-4D97-AF65-F5344CB8AC3E}">
-        <p14:creationId xmlns:p14="http://schemas.microsoft.com/office/powerpoint/2010/main" val="3155311548"/>
+        <p14:creationId xmlns:p14="http://schemas.microsoft.com/office/powerpoint/2010/main" val="1055823032"/>
       </p:ext>
     </p:extLst>
   </p:cSld>
@@ -11434,28 +11541,7 @@
           <a:bodyPr/>
           <a:lstStyle/>
           <a:p>
-            <a:r>
-              <a:rPr lang="en-US" dirty="0"/>
-              <a:t>AEPS:  assessment and curriculum, Diane Bricker, update in 2020. 2 levels: Birth to 3 and 3-6</a:t>
-            </a:r>
-          </a:p>
-          <a:p>
-            <a:r>
-              <a:rPr lang="en-US" dirty="0"/>
-              <a:t>Battelle:  Birth to 7-11</a:t>
-            </a:r>
-          </a:p>
-          <a:p>
-            <a:r>
-              <a:rPr lang="en-US" dirty="0"/>
-              <a:t>Gesell – unclear what measurement is being used, but the current Gesell Development Observation ages 2 ½ to 9. five strands: Developmental,</a:t>
-            </a:r>
-          </a:p>
-          <a:p>
-            <a:r>
-              <a:rPr lang="en-US" dirty="0"/>
-              <a:t>Letters/Numbers, Language/Comprehension, Visual/Spatial Discrimination, Social/Emotional/Adaptive</a:t>
-            </a:r>
+            <a:endParaRPr lang="en-US" dirty="0"/>
           </a:p>
         </p:txBody>
       </p:sp>
@@ -11476,7 +11562,7 @@
           <a:p>
             <a:fld id="{AA0A589D-B577-494C-AEB5-A5D4F1908003}" type="slidenum">
               <a:rPr lang="en-US" smtClean="0"/>
-              <a:t>11</a:t>
+              <a:t>10</a:t>
             </a:fld>
             <a:endParaRPr lang="en-US"/>
           </a:p>
@@ -11485,7 +11571,7 @@
     </p:spTree>
     <p:extLst>
       <p:ext uri="{BB962C8B-B14F-4D97-AF65-F5344CB8AC3E}">
-        <p14:creationId xmlns:p14="http://schemas.microsoft.com/office/powerpoint/2010/main" val="473596141"/>
+        <p14:creationId xmlns:p14="http://schemas.microsoft.com/office/powerpoint/2010/main" val="3155311548"/>
       </p:ext>
     </p:extLst>
   </p:cSld>
@@ -11539,7 +11625,28 @@
           <a:bodyPr/>
           <a:lstStyle/>
           <a:p>
-            <a:endParaRPr lang="en-US" dirty="0"/>
+            <a:r>
+              <a:rPr lang="en-US" dirty="0"/>
+              <a:t>AEPS:  assessment and curriculum, Diane Bricker, update in 2020. 2 levels: Birth to 3 and 3-6</a:t>
+            </a:r>
+          </a:p>
+          <a:p>
+            <a:r>
+              <a:rPr lang="en-US" dirty="0"/>
+              <a:t>Battelle:  Birth to 7-11</a:t>
+            </a:r>
+          </a:p>
+          <a:p>
+            <a:r>
+              <a:rPr lang="en-US" dirty="0"/>
+              <a:t>Gesell – unclear what measurement is being used, but the current Gesell Development Observation ages 2 ½ to 9. five strands: Developmental,</a:t>
+            </a:r>
+          </a:p>
+          <a:p>
+            <a:r>
+              <a:rPr lang="en-US" dirty="0"/>
+              <a:t>Letters/Numbers, Language/Comprehension, Visual/Spatial Discrimination, Social/Emotional/Adaptive</a:t>
+            </a:r>
           </a:p>
         </p:txBody>
       </p:sp>
@@ -11560,7 +11667,7 @@
           <a:p>
             <a:fld id="{AA0A589D-B577-494C-AEB5-A5D4F1908003}" type="slidenum">
               <a:rPr lang="en-US" smtClean="0"/>
-              <a:t>13</a:t>
+              <a:t>11</a:t>
             </a:fld>
             <a:endParaRPr lang="en-US"/>
           </a:p>
@@ -11569,7 +11676,7 @@
     </p:spTree>
     <p:extLst>
       <p:ext uri="{BB962C8B-B14F-4D97-AF65-F5344CB8AC3E}">
-        <p14:creationId xmlns:p14="http://schemas.microsoft.com/office/powerpoint/2010/main" val="4137077791"/>
+        <p14:creationId xmlns:p14="http://schemas.microsoft.com/office/powerpoint/2010/main" val="473596141"/>
       </p:ext>
     </p:extLst>
   </p:cSld>
@@ -11620,53 +11727,8 @@
         </p:nvSpPr>
         <p:spPr/>
         <p:txBody>
-          <a:bodyPr>
-            <a:normAutofit/>
-          </a:bodyPr>
+          <a:bodyPr/>
           <a:lstStyle/>
-          <a:p>
-            <a:pPr lvl="1"/>
-            <a:r>
-              <a:rPr lang="en-US" dirty="0"/>
-              <a:t>Designing</a:t>
-            </a:r>
-          </a:p>
-          <a:p>
-            <a:pPr lvl="2"/>
-            <a:r>
-              <a:rPr lang="en-US" dirty="0"/>
-              <a:t>Sensitive:  accurately identifies problem and characterizes the problem</a:t>
-            </a:r>
-          </a:p>
-          <a:p>
-            <a:pPr lvl="2"/>
-            <a:r>
-              <a:rPr lang="en-US" dirty="0"/>
-              <a:t>Comprehensive: characterizes the problem on diverse aspects of the person’s life and skills, including how the problem affects </a:t>
-            </a:r>
-            <a:r>
-              <a:rPr lang="en-US" dirty="0" err="1"/>
-              <a:t>daiily</a:t>
-            </a:r>
-            <a:r>
-              <a:rPr lang="en-US" dirty="0"/>
-              <a:t> living activities at home, school, and work</a:t>
-            </a:r>
-          </a:p>
-          <a:p>
-            <a:pPr lvl="2"/>
-            <a:r>
-              <a:rPr lang="en-US" dirty="0"/>
-              <a:t>Non-biased:  performance regardless of race, ethnicity, gender, SES, culture or language</a:t>
-            </a:r>
-          </a:p>
-          <a:p>
-            <a:pPr lvl="2"/>
-            <a:r>
-              <a:rPr lang="en-US" dirty="0"/>
-              <a:t>Family-centered</a:t>
-            </a:r>
-          </a:p>
           <a:p>
             <a:endParaRPr lang="en-US" dirty="0"/>
           </a:p>
@@ -11679,7 +11741,7 @@
             <a:spLocks noGrp="1"/>
           </p:cNvSpPr>
           <p:nvPr>
-            <p:ph type="sldNum" sz="quarter" idx="10"/>
+            <p:ph type="sldNum" sz="quarter" idx="5"/>
           </p:nvPr>
         </p:nvSpPr>
         <p:spPr/>
@@ -11687,10 +11749,9 @@
           <a:bodyPr/>
           <a:lstStyle/>
           <a:p>
-            <a:fld id="{2CF9A2DE-64BF-6643-B328-F1620775E56E}" type="slidenum">
+            <a:fld id="{AA0A589D-B577-494C-AEB5-A5D4F1908003}" type="slidenum">
               <a:rPr lang="en-US" smtClean="0"/>
-              <a:pPr/>
-              <a:t>18</a:t>
+              <a:t>13</a:t>
             </a:fld>
             <a:endParaRPr lang="en-US"/>
           </a:p>
@@ -11699,7 +11760,7 @@
     </p:spTree>
     <p:extLst>
       <p:ext uri="{BB962C8B-B14F-4D97-AF65-F5344CB8AC3E}">
-        <p14:creationId xmlns:p14="http://schemas.microsoft.com/office/powerpoint/2010/main" val="1110514635"/>
+        <p14:creationId xmlns:p14="http://schemas.microsoft.com/office/powerpoint/2010/main" val="4137077791"/>
       </p:ext>
     </p:extLst>
   </p:cSld>
@@ -11750,67 +11811,43 @@
         </p:nvSpPr>
         <p:spPr/>
         <p:txBody>
-          <a:bodyPr/>
+          <a:bodyPr>
+            <a:normAutofit/>
+          </a:bodyPr>
           <a:lstStyle/>
           <a:p>
+            <a:pPr lvl="1"/>
             <a:r>
               <a:rPr lang="en-US" dirty="0"/>
-              <a:t>Differential Diagnosis: </a:t>
+              <a:t>Designing</a:t>
             </a:r>
+          </a:p>
+          <a:p>
+            <a:pPr lvl="2"/>
             <a:r>
-              <a:rPr lang="en-US" sz="1200" b="0" i="0" kern="1200" dirty="0">
-                <a:solidFill>
-                  <a:schemeClr val="tx1"/>
-                </a:solidFill>
-                <a:effectLst/>
-                <a:latin typeface="+mn-lt"/>
-                <a:ea typeface="+mn-ea"/>
-                <a:cs typeface="+mn-cs"/>
-              </a:rPr>
-              <a:t>the process of differentiating between two or more conditions which share similar signs or symptoms.</a:t>
+              <a:rPr lang="en-US" dirty="0"/>
+              <a:t>Sensitive:  accurately identifies problem and characterizes the problem</a:t>
             </a:r>
           </a:p>
           <a:p>
-            <a:pPr marL="0" marR="0" lvl="0" indent="0" algn="l" defTabSz="457200" rtl="0" eaLnBrk="1" fontAlgn="auto" latinLnBrk="0" hangingPunct="1">
-              <a:lnSpc>
-                <a:spcPct val="100000"/>
-              </a:lnSpc>
-              <a:spcBef>
-                <a:spcPts val="0"/>
-              </a:spcBef>
-              <a:spcAft>
-                <a:spcPts val="0"/>
-              </a:spcAft>
-              <a:buClrTx/>
-              <a:buSzTx/>
-              <a:buFontTx/>
-              <a:buNone/>
-              <a:tabLst/>
-              <a:defRPr/>
-            </a:pPr>
+            <a:pPr lvl="2"/>
             <a:r>
-              <a:rPr lang="en-US" sz="1200" b="0" i="0" kern="1200" dirty="0">
-                <a:solidFill>
-                  <a:schemeClr val="tx1"/>
-                </a:solidFill>
-                <a:effectLst/>
-                <a:latin typeface="+mn-lt"/>
-                <a:ea typeface="+mn-ea"/>
-                <a:cs typeface="+mn-cs"/>
-              </a:rPr>
-              <a:t>Eligibility:  </a:t>
+              <a:rPr lang="en-US" dirty="0"/>
+              <a:t>Comprehensive: characterizes the problem on diverse aspects of the person’s life and skills, including how the problem affects daily living activities at home, school, and work</a:t>
             </a:r>
+          </a:p>
+          <a:p>
+            <a:pPr lvl="2"/>
             <a:r>
-              <a:rPr lang="en-US" sz="1200" kern="1200" dirty="0">
-                <a:solidFill>
-                  <a:schemeClr val="tx1"/>
-                </a:solidFill>
-                <a:effectLst/>
-                <a:latin typeface="+mn-lt"/>
-                <a:ea typeface="+mn-ea"/>
-                <a:cs typeface="+mn-cs"/>
-              </a:rPr>
-              <a:t>Meets regulations/rules/professional standard for services.  In schools, having a speech-language delay or difference doesn’t ensure eligibility.</a:t>
+              <a:rPr lang="en-US" dirty="0"/>
+              <a:t>Non-biased:  performance regardless of race, ethnicity, gender, SES, culture or language</a:t>
+            </a:r>
+          </a:p>
+          <a:p>
+            <a:pPr lvl="2"/>
+            <a:r>
+              <a:rPr lang="en-US" dirty="0"/>
+              <a:t>Family-centered</a:t>
             </a:r>
           </a:p>
           <a:p>
@@ -11825,7 +11862,7 @@
             <a:spLocks noGrp="1"/>
           </p:cNvSpPr>
           <p:nvPr>
-            <p:ph type="sldNum" sz="quarter" idx="5"/>
+            <p:ph type="sldNum" sz="quarter" idx="10"/>
           </p:nvPr>
         </p:nvSpPr>
         <p:spPr/>
@@ -11833,9 +11870,10 @@
           <a:bodyPr/>
           <a:lstStyle/>
           <a:p>
-            <a:fld id="{AA0A589D-B577-494C-AEB5-A5D4F1908003}" type="slidenum">
+            <a:fld id="{2CF9A2DE-64BF-6643-B328-F1620775E56E}" type="slidenum">
               <a:rPr lang="en-US" smtClean="0"/>
-              <a:t>19</a:t>
+              <a:pPr/>
+              <a:t>18</a:t>
             </a:fld>
             <a:endParaRPr lang="en-US"/>
           </a:p>
@@ -11844,7 +11882,7 @@
     </p:spTree>
     <p:extLst>
       <p:ext uri="{BB962C8B-B14F-4D97-AF65-F5344CB8AC3E}">
-        <p14:creationId xmlns:p14="http://schemas.microsoft.com/office/powerpoint/2010/main" val="3704931728"/>
+        <p14:creationId xmlns:p14="http://schemas.microsoft.com/office/powerpoint/2010/main" val="1110514635"/>
       </p:ext>
     </p:extLst>
   </p:cSld>
@@ -11900,7 +11938,216 @@
           <a:p>
             <a:r>
               <a:rPr lang="en-US" dirty="0"/>
-              <a:t>Large group activity</a:t>
+              <a:t>Differential Diagnosis: </a:t>
+            </a:r>
+            <a:r>
+              <a:rPr lang="en-US" sz="1200" b="0" i="0" kern="1200" dirty="0">
+                <a:solidFill>
+                  <a:schemeClr val="tx1"/>
+                </a:solidFill>
+                <a:effectLst/>
+                <a:latin typeface="+mn-lt"/>
+                <a:ea typeface="+mn-ea"/>
+                <a:cs typeface="+mn-cs"/>
+              </a:rPr>
+              <a:t>the process of differentiating between two or more conditions which share similar signs or symptoms.</a:t>
+            </a:r>
+          </a:p>
+          <a:p>
+            <a:pPr marL="0" marR="0" lvl="0" indent="0" algn="l" defTabSz="457200" rtl="0" eaLnBrk="1" fontAlgn="auto" latinLnBrk="0" hangingPunct="1">
+              <a:lnSpc>
+                <a:spcPct val="100000"/>
+              </a:lnSpc>
+              <a:spcBef>
+                <a:spcPts val="0"/>
+              </a:spcBef>
+              <a:spcAft>
+                <a:spcPts val="0"/>
+              </a:spcAft>
+              <a:buClrTx/>
+              <a:buSzTx/>
+              <a:buFontTx/>
+              <a:buNone/>
+              <a:tabLst/>
+              <a:defRPr/>
+            </a:pPr>
+            <a:r>
+              <a:rPr lang="en-US" sz="1200" b="0" i="0" kern="1200" dirty="0">
+                <a:solidFill>
+                  <a:schemeClr val="tx1"/>
+                </a:solidFill>
+                <a:effectLst/>
+                <a:latin typeface="+mn-lt"/>
+                <a:ea typeface="+mn-ea"/>
+                <a:cs typeface="+mn-cs"/>
+              </a:rPr>
+              <a:t>Eligibility:  </a:t>
+            </a:r>
+            <a:r>
+              <a:rPr lang="en-US" sz="1200" kern="1200" dirty="0">
+                <a:solidFill>
+                  <a:schemeClr val="tx1"/>
+                </a:solidFill>
+                <a:effectLst/>
+                <a:latin typeface="+mn-lt"/>
+                <a:ea typeface="+mn-ea"/>
+                <a:cs typeface="+mn-cs"/>
+              </a:rPr>
+              <a:t>Meets regulations/rules/professional standard for services.  In schools, having a speech-language delay or difference doesn’t ensure eligibility.</a:t>
+            </a:r>
+          </a:p>
+          <a:p>
+            <a:endParaRPr lang="en-US" dirty="0"/>
+          </a:p>
+          <a:p>
+            <a:endParaRPr lang="en-US" dirty="0"/>
+          </a:p>
+          <a:p>
+            <a:pPr marL="0" marR="0" lvl="0" indent="0" algn="l" defTabSz="914400" rtl="0" eaLnBrk="1" fontAlgn="auto" latinLnBrk="0" hangingPunct="1">
+              <a:lnSpc>
+                <a:spcPct val="100000"/>
+              </a:lnSpc>
+              <a:spcBef>
+                <a:spcPts val="0"/>
+              </a:spcBef>
+              <a:spcAft>
+                <a:spcPts val="0"/>
+              </a:spcAft>
+              <a:buClrTx/>
+              <a:buSzTx/>
+              <a:buFontTx/>
+              <a:buNone/>
+              <a:tabLst/>
+              <a:defRPr/>
+            </a:pPr>
+            <a:r>
+              <a:rPr lang="en-US" dirty="0"/>
+              <a:t>Programmatic assessment: </a:t>
+            </a:r>
+            <a:r>
+              <a:rPr lang="en-US" sz="1200" kern="1200" dirty="0">
+                <a:solidFill>
+                  <a:schemeClr val="tx1"/>
+                </a:solidFill>
+                <a:effectLst/>
+                <a:latin typeface="+mn-lt"/>
+                <a:ea typeface="+mn-ea"/>
+                <a:cs typeface="+mn-cs"/>
+              </a:rPr>
+              <a:t>Assessments to design intervention: determine goals, make decisions</a:t>
+            </a:r>
+          </a:p>
+          <a:p>
+            <a:endParaRPr lang="en-US" dirty="0"/>
+          </a:p>
+          <a:p>
+            <a:endParaRPr lang="en-US" dirty="0"/>
+          </a:p>
+          <a:p>
+            <a:r>
+              <a:rPr lang="en-US" dirty="0"/>
+              <a:t>Baseline performance: How well does client perform on skill prior </a:t>
+            </a:r>
+            <a:r>
+              <a:rPr lang="en-US"/>
+              <a:t>to treatment </a:t>
+            </a:r>
+            <a:endParaRPr lang="en-US" dirty="0"/>
+          </a:p>
+        </p:txBody>
+      </p:sp>
+      <p:sp>
+        <p:nvSpPr>
+          <p:cNvPr id="4" name="Slide Number Placeholder 3"/>
+          <p:cNvSpPr>
+            <a:spLocks noGrp="1"/>
+          </p:cNvSpPr>
+          <p:nvPr>
+            <p:ph type="sldNum" sz="quarter" idx="5"/>
+          </p:nvPr>
+        </p:nvSpPr>
+        <p:spPr/>
+        <p:txBody>
+          <a:bodyPr/>
+          <a:lstStyle/>
+          <a:p>
+            <a:fld id="{AA0A589D-B577-494C-AEB5-A5D4F1908003}" type="slidenum">
+              <a:rPr lang="en-US" smtClean="0"/>
+              <a:t>19</a:t>
+            </a:fld>
+            <a:endParaRPr lang="en-US"/>
+          </a:p>
+        </p:txBody>
+      </p:sp>
+    </p:spTree>
+    <p:extLst>
+      <p:ext uri="{BB962C8B-B14F-4D97-AF65-F5344CB8AC3E}">
+        <p14:creationId xmlns:p14="http://schemas.microsoft.com/office/powerpoint/2010/main" val="3704931728"/>
+      </p:ext>
+    </p:extLst>
+  </p:cSld>
+  <p:clrMapOvr>
+    <a:masterClrMapping/>
+  </p:clrMapOvr>
+</p:notes>
+</file>
+
+<file path=ppt/notesSlides/notesSlide9.xml><?xml version="1.0" encoding="utf-8"?>
+<p:notes xmlns:a="http://schemas.openxmlformats.org/drawingml/2006/main" xmlns:r="http://schemas.openxmlformats.org/officeDocument/2006/relationships" xmlns:p="http://schemas.openxmlformats.org/presentationml/2006/main">
+  <p:cSld>
+    <p:spTree>
+      <p:nvGrpSpPr>
+        <p:cNvPr id="1" name=""/>
+        <p:cNvGrpSpPr/>
+        <p:nvPr/>
+      </p:nvGrpSpPr>
+      <p:grpSpPr>
+        <a:xfrm>
+          <a:off x="0" y="0"/>
+          <a:ext cx="0" cy="0"/>
+          <a:chOff x="0" y="0"/>
+          <a:chExt cx="0" cy="0"/>
+        </a:xfrm>
+      </p:grpSpPr>
+      <p:sp>
+        <p:nvSpPr>
+          <p:cNvPr id="2" name="Slide Image Placeholder 1"/>
+          <p:cNvSpPr>
+            <a:spLocks noGrp="1" noRot="1" noChangeAspect="1"/>
+          </p:cNvSpPr>
+          <p:nvPr>
+            <p:ph type="sldImg"/>
+          </p:nvPr>
+        </p:nvSpPr>
+        <p:spPr/>
+      </p:sp>
+      <p:sp>
+        <p:nvSpPr>
+          <p:cNvPr id="3" name="Notes Placeholder 2"/>
+          <p:cNvSpPr>
+            <a:spLocks noGrp="1"/>
+          </p:cNvSpPr>
+          <p:nvPr>
+            <p:ph type="body" idx="1"/>
+          </p:nvPr>
+        </p:nvSpPr>
+        <p:spPr/>
+        <p:txBody>
+          <a:bodyPr/>
+          <a:lstStyle/>
+          <a:p>
+            <a:r>
+              <a:rPr lang="en-US" dirty="0"/>
+              <a:t>All of them! </a:t>
+            </a:r>
+          </a:p>
+          <a:p>
+            <a:endParaRPr lang="en-US" dirty="0"/>
+          </a:p>
+          <a:p>
+            <a:r>
+              <a:rPr lang="en-US" dirty="0"/>
+              <a:t>I like to consider formal assessments for diagnostic purposes and informal/formal assessments for programmatic purposes </a:t>
             </a:r>
           </a:p>
         </p:txBody>
@@ -12088,7 +12335,7 @@
           <a:p>
             <a:fld id="{0B25AB07-0BA4-BD4C-8240-4EBC65ED6196}" type="datetimeFigureOut">
               <a:rPr lang="en-US" smtClean="0"/>
-              <a:t>1/25/22</a:t>
+              <a:t>3/29/22</a:t>
             </a:fld>
             <a:endParaRPr lang="en-US"/>
           </a:p>
@@ -12286,7 +12533,7 @@
           <a:p>
             <a:fld id="{0B25AB07-0BA4-BD4C-8240-4EBC65ED6196}" type="datetimeFigureOut">
               <a:rPr lang="en-US" smtClean="0"/>
-              <a:t>1/25/22</a:t>
+              <a:t>3/29/22</a:t>
             </a:fld>
             <a:endParaRPr lang="en-US"/>
           </a:p>
@@ -12494,7 +12741,7 @@
           <a:p>
             <a:fld id="{0B25AB07-0BA4-BD4C-8240-4EBC65ED6196}" type="datetimeFigureOut">
               <a:rPr lang="en-US" smtClean="0"/>
-              <a:t>1/25/22</a:t>
+              <a:t>3/29/22</a:t>
             </a:fld>
             <a:endParaRPr lang="en-US"/>
           </a:p>
@@ -12692,7 +12939,7 @@
           <a:p>
             <a:fld id="{0B25AB07-0BA4-BD4C-8240-4EBC65ED6196}" type="datetimeFigureOut">
               <a:rPr lang="en-US" smtClean="0"/>
-              <a:t>1/25/22</a:t>
+              <a:t>3/29/22</a:t>
             </a:fld>
             <a:endParaRPr lang="en-US"/>
           </a:p>
@@ -12967,7 +13214,7 @@
           <a:p>
             <a:fld id="{0B25AB07-0BA4-BD4C-8240-4EBC65ED6196}" type="datetimeFigureOut">
               <a:rPr lang="en-US" smtClean="0"/>
-              <a:t>1/25/22</a:t>
+              <a:t>3/29/22</a:t>
             </a:fld>
             <a:endParaRPr lang="en-US"/>
           </a:p>
@@ -13232,7 +13479,7 @@
           <a:p>
             <a:fld id="{0B25AB07-0BA4-BD4C-8240-4EBC65ED6196}" type="datetimeFigureOut">
               <a:rPr lang="en-US" smtClean="0"/>
-              <a:t>1/25/22</a:t>
+              <a:t>3/29/22</a:t>
             </a:fld>
             <a:endParaRPr lang="en-US"/>
           </a:p>
@@ -13644,7 +13891,7 @@
           <a:p>
             <a:fld id="{0B25AB07-0BA4-BD4C-8240-4EBC65ED6196}" type="datetimeFigureOut">
               <a:rPr lang="en-US" smtClean="0"/>
-              <a:t>1/25/22</a:t>
+              <a:t>3/29/22</a:t>
             </a:fld>
             <a:endParaRPr lang="en-US"/>
           </a:p>
@@ -13785,7 +14032,7 @@
           <a:p>
             <a:fld id="{0B25AB07-0BA4-BD4C-8240-4EBC65ED6196}" type="datetimeFigureOut">
               <a:rPr lang="en-US" smtClean="0"/>
-              <a:t>1/25/22</a:t>
+              <a:t>3/29/22</a:t>
             </a:fld>
             <a:endParaRPr lang="en-US"/>
           </a:p>
@@ -13898,7 +14145,7 @@
           <a:p>
             <a:fld id="{0B25AB07-0BA4-BD4C-8240-4EBC65ED6196}" type="datetimeFigureOut">
               <a:rPr lang="en-US" smtClean="0"/>
-              <a:t>1/25/22</a:t>
+              <a:t>3/29/22</a:t>
             </a:fld>
             <a:endParaRPr lang="en-US"/>
           </a:p>
@@ -14209,7 +14456,7 @@
           <a:p>
             <a:fld id="{0B25AB07-0BA4-BD4C-8240-4EBC65ED6196}" type="datetimeFigureOut">
               <a:rPr lang="en-US" smtClean="0"/>
-              <a:t>1/25/22</a:t>
+              <a:t>3/29/22</a:t>
             </a:fld>
             <a:endParaRPr lang="en-US"/>
           </a:p>
@@ -14497,7 +14744,7 @@
           <a:p>
             <a:fld id="{0B25AB07-0BA4-BD4C-8240-4EBC65ED6196}" type="datetimeFigureOut">
               <a:rPr lang="en-US" smtClean="0"/>
-              <a:t>1/25/22</a:t>
+              <a:t>3/29/22</a:t>
             </a:fld>
             <a:endParaRPr lang="en-US"/>
           </a:p>
@@ -14768,7 +15015,7 @@
           <a:p>
             <a:fld id="{0B25AB07-0BA4-BD4C-8240-4EBC65ED6196}" type="datetimeFigureOut">
               <a:rPr lang="en-US" smtClean="0"/>
-              <a:t>1/25/22</a:t>
+              <a:t>3/29/22</a:t>
             </a:fld>
             <a:endParaRPr lang="en-US"/>
           </a:p>
@@ -16324,7 +16571,7 @@
         <p:spPr>
           <a:xfrm>
             <a:off x="1673088" y="782401"/>
-            <a:ext cx="8994913" cy="5139869"/>
+            <a:ext cx="8994913" cy="4955203"/>
           </a:xfrm>
           <a:prstGeom prst="rect">
             <a:avLst/>
@@ -16338,10 +16585,10 @@
           <a:lstStyle/>
           <a:p>
             <a:r>
-              <a:rPr lang="en-US" sz="2000" dirty="0"/>
-              <a:t>Break out groups: Choose one member of each group to be the scribe, open OneDrive doc, Save As: Save a Copy Online, title Group #</a:t>
+              <a:rPr lang="en-US" sz="2800" dirty="0"/>
+              <a:t>Follow-up questions for group discussion: </a:t>
             </a:r>
-            <a:endParaRPr lang="en-US" sz="1600" dirty="0"/>
+            <a:endParaRPr lang="en-US" sz="2000" dirty="0"/>
           </a:p>
           <a:p>
             <a:pPr marL="457200" indent="-457200">
@@ -18586,7 +18833,7 @@
 </file>
 
 <file path=ppt/slides/slide15.xml><?xml version="1.0" encoding="utf-8"?>
-<p:sld xmlns:a="http://schemas.openxmlformats.org/drawingml/2006/main" xmlns:r="http://schemas.openxmlformats.org/officeDocument/2006/relationships" xmlns:p="http://schemas.openxmlformats.org/presentationml/2006/main">
+<p:sld xmlns:a="http://schemas.openxmlformats.org/drawingml/2006/main" xmlns:r="http://schemas.openxmlformats.org/officeDocument/2006/relationships" xmlns:p="http://schemas.openxmlformats.org/presentationml/2006/main" show="0">
   <p:cSld>
     <p:spTree>
       <p:nvGrpSpPr>
@@ -18693,7 +18940,7 @@
 </file>
 
 <file path=ppt/slides/slide16.xml><?xml version="1.0" encoding="utf-8"?>
-<p:sld xmlns:a="http://schemas.openxmlformats.org/drawingml/2006/main" xmlns:r="http://schemas.openxmlformats.org/officeDocument/2006/relationships" xmlns:p="http://schemas.openxmlformats.org/presentationml/2006/main">
+<p:sld xmlns:a="http://schemas.openxmlformats.org/drawingml/2006/main" xmlns:r="http://schemas.openxmlformats.org/officeDocument/2006/relationships" xmlns:p="http://schemas.openxmlformats.org/presentationml/2006/main" show="0">
   <p:cSld>
     <p:spTree>
       <p:nvGrpSpPr>
@@ -20271,7 +20518,7 @@
         <p:spPr/>
         <p:txBody>
           <a:bodyPr>
-            <a:normAutofit/>
+            <a:normAutofit fontScale="85000" lnSpcReduction="20000"/>
           </a:bodyPr>
           <a:lstStyle/>
           <a:p>
@@ -20285,6 +20532,13 @@
             </a:r>
           </a:p>
           <a:p>
+            <a:pPr lvl="1"/>
+            <a:r>
+              <a:rPr lang="en-US" sz="2800" dirty="0"/>
+              <a:t>the initiation of services. Can be self-referred or by another professional</a:t>
+            </a:r>
+          </a:p>
+          <a:p>
             <a:r>
               <a:rPr lang="en-US" sz="3200" b="1" dirty="0">
                 <a:solidFill>
@@ -20295,6 +20549,13 @@
             </a:r>
           </a:p>
           <a:p>
+            <a:pPr lvl="1"/>
+            <a:r>
+              <a:rPr lang="en-US" sz="2800" dirty="0"/>
+              <a:t>Gathering information to make decisions on whether client should be seen, and if so, what assessment/treatment needed (includes questionnaires, phone interview, reports from other agencies)</a:t>
+            </a:r>
+          </a:p>
+          <a:p>
             <a:r>
               <a:rPr lang="en-US" sz="3200" b="1" dirty="0">
                 <a:solidFill>
@@ -20302,6 +20563,13 @@
                 </a:solidFill>
               </a:rPr>
               <a:t>Screening</a:t>
+            </a:r>
+          </a:p>
+          <a:p>
+            <a:pPr lvl="1"/>
+            <a:r>
+              <a:rPr lang="en-US" sz="2800" dirty="0"/>
+              <a:t>Brief assessment to determine if in-depth testing is warranted </a:t>
             </a:r>
           </a:p>
           <a:p>

</xml_diff>